<commit_message>
Update Python trainees part 1
</commit_message>
<xml_diff>
--- a/python_trainees/1_basics_classes/python_traineeship_1.pptx
+++ b/python_trainees/1_basics_classes/python_traineeship_1.pptx
@@ -50,10 +50,12 @@
     <p:sldId id="312" r:id="rId44"/>
     <p:sldId id="313" r:id="rId45"/>
     <p:sldId id="323" r:id="rId46"/>
-    <p:sldId id="324" r:id="rId47"/>
-    <p:sldId id="325" r:id="rId48"/>
-    <p:sldId id="326" r:id="rId49"/>
-    <p:sldId id="327" r:id="rId50"/>
+    <p:sldId id="331" r:id="rId47"/>
+    <p:sldId id="332" r:id="rId48"/>
+    <p:sldId id="324" r:id="rId49"/>
+    <p:sldId id="325" r:id="rId50"/>
+    <p:sldId id="326" r:id="rId51"/>
+    <p:sldId id="327" r:id="rId52"/>
   </p:sldIdLst>
   <p:sldSz cx="12192000" cy="6858000"/>
   <p:notesSz cx="6858000" cy="9144000"/>
@@ -7087,7 +7089,30 @@
             </a:pPr>
             <a:r>
               <a:rPr lang="nl-NL" sz="2000" noProof="0" dirty="0"/>
-              <a:t>Python: wat is het?</a:t>
+              <a:t>Python</a:t>
+            </a:r>
+            <a:endParaRPr lang="nl-NL" sz="2000" dirty="0"/>
+          </a:p>
+          <a:p>
+            <a:pPr lvl="1">
+              <a:spcAft>
+                <a:spcPts val="600"/>
+              </a:spcAft>
+            </a:pPr>
+            <a:r>
+              <a:rPr lang="nl-NL" sz="1600" noProof="0" dirty="0"/>
+              <a:t>Hoe werkt Python?</a:t>
+            </a:r>
+          </a:p>
+          <a:p>
+            <a:pPr lvl="1">
+              <a:spcAft>
+                <a:spcPts val="600"/>
+              </a:spcAft>
+            </a:pPr>
+            <a:r>
+              <a:rPr lang="nl-NL" sz="1600" noProof="0" dirty="0"/>
+              <a:t>Omgevingen en packages</a:t>
             </a:r>
           </a:p>
           <a:p>
@@ -7098,8 +7123,46 @@
             </a:pPr>
             <a:r>
               <a:rPr lang="nl-NL" sz="2000" noProof="0" dirty="0"/>
-              <a:t>Python voor Windows:</a:t>
-            </a:r>
+              <a:t>Python voor Windows</a:t>
+            </a:r>
+          </a:p>
+          <a:p>
+            <a:pPr lvl="1">
+              <a:spcAft>
+                <a:spcPts val="600"/>
+              </a:spcAft>
+            </a:pPr>
+            <a:r>
+              <a:rPr lang="nl-NL" sz="1600" dirty="0"/>
+              <a:t>Anaconda</a:t>
+            </a:r>
+          </a:p>
+          <a:p>
+            <a:pPr lvl="1">
+              <a:spcAft>
+                <a:spcPts val="600"/>
+              </a:spcAft>
+            </a:pPr>
+            <a:r>
+              <a:rPr lang="nl-NL" sz="1600" noProof="0" dirty="0" err="1"/>
+              <a:t>Jupyter</a:t>
+            </a:r>
+            <a:r>
+              <a:rPr lang="nl-NL" sz="1600" noProof="0" dirty="0"/>
+              <a:t> Notebook</a:t>
+            </a:r>
+          </a:p>
+          <a:p>
+            <a:pPr lvl="1">
+              <a:spcAft>
+                <a:spcPts val="600"/>
+              </a:spcAft>
+            </a:pPr>
+            <a:r>
+              <a:rPr lang="nl-NL" sz="1600" dirty="0"/>
+              <a:t>Visual Studio Code</a:t>
+            </a:r>
+            <a:endParaRPr lang="nl-NL" sz="1600" noProof="0" dirty="0"/>
           </a:p>
           <a:p>
             <a:pPr>
@@ -7124,14 +7187,25 @@
             </a:r>
           </a:p>
           <a:p>
-            <a:pPr>
+            <a:pPr lvl="1">
               <a:spcAft>
                 <a:spcPts val="600"/>
               </a:spcAft>
             </a:pPr>
             <a:r>
-              <a:rPr lang="nl-NL" sz="2000" noProof="0" dirty="0"/>
-              <a:t>Correcte code</a:t>
+              <a:rPr lang="nl-NL" sz="1600" dirty="0"/>
+              <a:t>Basis</a:t>
+            </a:r>
+          </a:p>
+          <a:p>
+            <a:pPr lvl="1">
+              <a:spcAft>
+                <a:spcPts val="600"/>
+              </a:spcAft>
+            </a:pPr>
+            <a:r>
+              <a:rPr lang="nl-NL" sz="1600" noProof="0" dirty="0"/>
+              <a:t>Overerving</a:t>
             </a:r>
           </a:p>
         </p:txBody>
@@ -11502,7 +11576,7 @@
           <a:p>
             <a:r>
               <a:rPr lang="nl-NL" sz="3600" noProof="0" dirty="0"/>
-              <a:t>Oefeningen</a:t>
+              <a:t>Oefeningen I</a:t>
             </a:r>
           </a:p>
         </p:txBody>
@@ -11526,7 +11600,7 @@
         <p:spPr>
           <a:xfrm>
             <a:off x="838200" y="1456267"/>
-            <a:ext cx="8428630" cy="4720696"/>
+            <a:ext cx="10375900" cy="4720696"/>
           </a:xfrm>
         </p:spPr>
         <p:txBody>
@@ -11564,7 +11638,6 @@
           </a:p>
           <a:p>
             <a:pPr marL="457200" indent="-457200">
-              <a:buFont typeface="Arial" panose="020B0604020202020204" pitchFamily="34" charset="0"/>
               <a:buAutoNum type="arabicPeriod"/>
             </a:pPr>
             <a:r>
@@ -11576,7 +11649,7 @@
                 <a:latin typeface="Courier New" panose="02070309020205020404" pitchFamily="49" charset="0"/>
                 <a:cs typeface="Courier New" panose="02070309020205020404" pitchFamily="49" charset="0"/>
               </a:rPr>
-              <a:t>"abc" * 3</a:t>
+              <a:t>[1, 2, 3] * 3</a:t>
             </a:r>
             <a:r>
               <a:rPr lang="nl-NL" sz="2000" dirty="0"/>
@@ -11595,14 +11668,21 @@
             </a:pPr>
             <a:r>
               <a:rPr lang="nl-NL" sz="2000" dirty="0"/>
-              <a:t>Wat is het resultaat van </a:t>
+              <a:t>En wat is de waarde van </a:t>
+            </a:r>
+            <a:r>
+              <a:rPr lang="nl-NL" sz="2000" dirty="0" err="1">
+                <a:latin typeface="Courier New" panose="02070309020205020404" pitchFamily="49" charset="0"/>
+                <a:cs typeface="Courier New" panose="02070309020205020404" pitchFamily="49" charset="0"/>
+              </a:rPr>
+              <a:t>zeroes</a:t>
             </a:r>
             <a:r>
               <a:rPr lang="nl-NL" sz="2000" dirty="0">
                 <a:latin typeface="Courier New" panose="02070309020205020404" pitchFamily="49" charset="0"/>
                 <a:cs typeface="Courier New" panose="02070309020205020404" pitchFamily="49" charset="0"/>
               </a:rPr>
-              <a:t>[1, 2, 3] * 3</a:t>
+              <a:t> = [[0] * 3] * 3</a:t>
             </a:r>
             <a:r>
               <a:rPr lang="nl-NL" sz="2000" dirty="0"/>
@@ -11610,6 +11690,33 @@
             </a:r>
           </a:p>
           <a:p>
+            <a:pPr marL="457200" lvl="1" indent="0">
+              <a:buNone/>
+            </a:pPr>
+            <a:r>
+              <a:rPr lang="nl-NL" sz="2000" dirty="0"/>
+              <a:t>En wat is het resultaat van </a:t>
+            </a:r>
+            <a:r>
+              <a:rPr lang="nl-NL" sz="2000" dirty="0" err="1">
+                <a:latin typeface="Courier New" panose="02070309020205020404" pitchFamily="49" charset="0"/>
+                <a:cs typeface="Courier New" panose="02070309020205020404" pitchFamily="49" charset="0"/>
+              </a:rPr>
+              <a:t>zeroes</a:t>
+            </a:r>
+            <a:r>
+              <a:rPr lang="nl-NL" sz="2000" dirty="0">
+                <a:latin typeface="Courier New" panose="02070309020205020404" pitchFamily="49" charset="0"/>
+                <a:cs typeface="Courier New" panose="02070309020205020404" pitchFamily="49" charset="0"/>
+              </a:rPr>
+              <a:t>[0][0] = 1</a:t>
+            </a:r>
+            <a:r>
+              <a:rPr lang="nl-NL" sz="2000" dirty="0"/>
+              <a:t>?</a:t>
+            </a:r>
+          </a:p>
+          <a:p>
             <a:pPr marL="457200" indent="-457200">
               <a:buAutoNum type="arabicPeriod"/>
             </a:pPr>
@@ -11617,18 +11724,19 @@
           </a:p>
           <a:p>
             <a:pPr marL="457200" indent="-457200">
+              <a:buFont typeface="Arial" panose="020B0604020202020204" pitchFamily="34" charset="0"/>
               <a:buAutoNum type="arabicPeriod"/>
             </a:pPr>
             <a:r>
               <a:rPr lang="nl-NL" sz="2000" dirty="0"/>
-              <a:t>En wat is de waarde van </a:t>
+              <a:t>Wat is het resultaat van </a:t>
             </a:r>
             <a:r>
               <a:rPr lang="nl-NL" sz="2000" dirty="0">
                 <a:latin typeface="Courier New" panose="02070309020205020404" pitchFamily="49" charset="0"/>
                 <a:cs typeface="Courier New" panose="02070309020205020404" pitchFamily="49" charset="0"/>
               </a:rPr>
-              <a:t>m = [[0] * 3] * 3</a:t>
+              <a:t>"abc" * 3</a:t>
             </a:r>
             <a:r>
               <a:rPr lang="nl-NL" sz="2000" dirty="0"/>
@@ -11636,26 +11744,6 @@
             </a:r>
           </a:p>
           <a:p>
-            <a:pPr marL="457200" lvl="1" indent="0">
-              <a:buNone/>
-            </a:pPr>
-            <a:r>
-              <a:rPr lang="nl-NL" sz="2000" dirty="0"/>
-              <a:t>En wat is het resultaat van </a:t>
-            </a:r>
-            <a:r>
-              <a:rPr lang="nl-NL" sz="2000" dirty="0">
-                <a:latin typeface="Courier New" panose="02070309020205020404" pitchFamily="49" charset="0"/>
-                <a:cs typeface="Courier New" panose="02070309020205020404" pitchFamily="49" charset="0"/>
-              </a:rPr>
-              <a:t>m[0][0] = 1</a:t>
-            </a:r>
-            <a:r>
-              <a:rPr lang="nl-NL" sz="2000" dirty="0"/>
-              <a:t>?</a:t>
-            </a:r>
-          </a:p>
-          <a:p>
             <a:pPr marL="457200" indent="-457200">
               <a:buAutoNum type="arabicPeriod"/>
             </a:pPr>
@@ -11667,15 +11755,7 @@
             </a:pPr>
             <a:r>
               <a:rPr lang="nl-NL" sz="2000" noProof="0" dirty="0"/>
-              <a:t>Maak een template dat onderstaand </a:t>
-            </a:r>
-            <a:r>
-              <a:rPr lang="nl-NL" sz="2000" noProof="0" dirty="0" err="1"/>
-              <a:t>dict</a:t>
-            </a:r>
-            <a:r>
-              <a:rPr lang="nl-NL" sz="2000" noProof="0" dirty="0"/>
-              <a:t> naar CSV omzet:</a:t>
+              <a:t>Maak een template dat deze data weergeeft als tabel:</a:t>
             </a:r>
           </a:p>
           <a:p>
@@ -11705,21 +11785,7 @@
                 <a:latin typeface="Courier New" panose="02070309020205020404" pitchFamily="49" charset="0"/>
                 <a:cs typeface="Courier New" panose="02070309020205020404" pitchFamily="49" charset="0"/>
               </a:rPr>
-              <a:t>": "Jansen", "</a:t>
-            </a:r>
-            <a:r>
-              <a:rPr lang="nl-NL" sz="2000" noProof="0" dirty="0" err="1">
-                <a:latin typeface="Courier New" panose="02070309020205020404" pitchFamily="49" charset="0"/>
-                <a:cs typeface="Courier New" panose="02070309020205020404" pitchFamily="49" charset="0"/>
-              </a:rPr>
-              <a:t>age</a:t>
-            </a:r>
-            <a:r>
-              <a:rPr lang="nl-NL" sz="2000" noProof="0" dirty="0">
-                <a:latin typeface="Courier New" panose="02070309020205020404" pitchFamily="49" charset="0"/>
-                <a:cs typeface="Courier New" panose="02070309020205020404" pitchFamily="49" charset="0"/>
-              </a:rPr>
-              <a:t>": 45}</a:t>
+              <a:t>": "Jansen", "score": 7.6245}</a:t>
             </a:r>
           </a:p>
           <a:p>
@@ -17295,7 +17361,7 @@
           <a:p>
             <a:r>
               <a:rPr lang="nl-NL" sz="3600" noProof="0" dirty="0"/>
-              <a:t>Oefening</a:t>
+              <a:t>Oefeningen II</a:t>
             </a:r>
           </a:p>
         </p:txBody>
@@ -19890,7 +19956,7 @@
           <a:p>
             <a:r>
               <a:rPr lang="nl-NL" sz="3600" noProof="0" dirty="0"/>
-              <a:t>Oefeningen</a:t>
+              <a:t>Oefeningen III</a:t>
             </a:r>
           </a:p>
         </p:txBody>
@@ -21377,7 +21443,7 @@
             </a:r>
             <a:r>
               <a:rPr lang="nl-NL" sz="2000" noProof="0" dirty="0"/>
-              <a:t> methodes hebben een speciale functie.</a:t>
+              <a:t> methodes hebben een speciale betekenis.</a:t>
             </a:r>
           </a:p>
           <a:p>
@@ -21409,19 +21475,25 @@
                 <a:latin typeface="Courier New" panose="02070309020205020404" pitchFamily="49" charset="0"/>
                 <a:cs typeface="Courier New" panose="02070309020205020404" pitchFamily="49" charset="0"/>
               </a:rPr>
-              <a:t>__()</a:t>
+              <a:t>__</a:t>
+            </a:r>
+            <a:endParaRPr lang="nl-NL" sz="2000" noProof="0" dirty="0"/>
+          </a:p>
+          <a:p>
+            <a:pPr marL="0" indent="0">
+              <a:buNone/>
+            </a:pPr>
+            <a:r>
+              <a:rPr lang="nl-NL" sz="2000" dirty="0" err="1"/>
+              <a:t>Constructor</a:t>
+            </a:r>
+            <a:r>
+              <a:rPr lang="nl-NL" sz="2000" dirty="0"/>
+              <a:t>:</a:t>
             </a:r>
             <a:r>
               <a:rPr lang="nl-NL" sz="2000" noProof="0" dirty="0"/>
-              <a:t> wordt bijvoorbeeld gebruikt om een object te initialiseren (de </a:t>
-            </a:r>
-            <a:r>
-              <a:rPr lang="nl-NL" sz="2000" noProof="0" dirty="0" err="1"/>
-              <a:t>constructor</a:t>
-            </a:r>
-            <a:r>
-              <a:rPr lang="nl-NL" sz="2000" noProof="0" dirty="0"/>
-              <a:t>).</a:t>
+              <a:t> Gebruikt om een object te initialiseren.</a:t>
             </a:r>
           </a:p>
           <a:p>
@@ -21429,41 +21501,6 @@
               <a:buNone/>
             </a:pPr>
             <a:endParaRPr lang="nl-NL" sz="2000" dirty="0"/>
-          </a:p>
-          <a:p>
-            <a:pPr marL="0" indent="0">
-              <a:buNone/>
-            </a:pPr>
-            <a:r>
-              <a:rPr lang="nl-NL" sz="2000" noProof="0" dirty="0"/>
-              <a:t>Er zijn veel </a:t>
-            </a:r>
-            <a:r>
-              <a:rPr lang="nl-NL" sz="2000" noProof="0" dirty="0" err="1"/>
-              <a:t>dunder</a:t>
-            </a:r>
-            <a:r>
-              <a:rPr lang="nl-NL" sz="2000" noProof="0" dirty="0"/>
-              <a:t> methodes, zie het data model voor meer info:</a:t>
-            </a:r>
-          </a:p>
-          <a:p>
-            <a:pPr marL="0" indent="0">
-              <a:buNone/>
-            </a:pPr>
-            <a:endParaRPr lang="nl-NL" sz="2000" dirty="0"/>
-          </a:p>
-          <a:p>
-            <a:pPr marL="0" indent="0">
-              <a:buNone/>
-            </a:pPr>
-            <a:r>
-              <a:rPr lang="nl-NL" sz="2000" dirty="0">
-                <a:hlinkClick r:id="rId2"/>
-              </a:rPr>
-              <a:t>https://docs.python.org/3/reference/datamodel.html#special-method-names</a:t>
-            </a:r>
-            <a:endParaRPr lang="nl-NL" sz="2000" noProof="0" dirty="0"/>
           </a:p>
         </p:txBody>
       </p:sp>
@@ -21753,7 +21790,7 @@
                 <a:latin typeface="Courier New" panose="02070309020205020404" pitchFamily="49" charset="0"/>
                 <a:cs typeface="Courier New" panose="02070309020205020404" pitchFamily="49" charset="0"/>
               </a:rPr>
-              <a:t>self.voornaam</a:t>
+              <a:t>self.voor</a:t>
             </a:r>
             <a:r>
               <a:rPr lang="nl-NL" sz="1600" dirty="0">
@@ -21780,7 +21817,7 @@
                 <a:latin typeface="Courier New" panose="02070309020205020404" pitchFamily="49" charset="0"/>
                 <a:cs typeface="Courier New" panose="02070309020205020404" pitchFamily="49" charset="0"/>
               </a:rPr>
-              <a:t>self.achternaam</a:t>
+              <a:t>self.achter</a:t>
             </a:r>
             <a:r>
               <a:rPr lang="nl-NL" sz="1600" dirty="0">
@@ -21989,6 +22026,1204 @@
           <a:lstStyle/>
           <a:p>
             <a:r>
+              <a:rPr lang="nl-NL" sz="3600" dirty="0"/>
+              <a:t>Weergave object</a:t>
+            </a:r>
+            <a:endParaRPr lang="nl-NL" sz="3600" noProof="0" dirty="0"/>
+          </a:p>
+        </p:txBody>
+      </p:sp>
+      <p:sp>
+        <p:nvSpPr>
+          <p:cNvPr id="3" name="Content Placeholder 2">
+            <a:extLst>
+              <a:ext uri="{FF2B5EF4-FFF2-40B4-BE49-F238E27FC236}">
+                <a16:creationId xmlns:a16="http://schemas.microsoft.com/office/drawing/2014/main" id="{F4C2D286-E049-0AAB-1360-B7157E11AD7E}"/>
+              </a:ext>
+            </a:extLst>
+          </p:cNvPr>
+          <p:cNvSpPr>
+            <a:spLocks noGrp="1"/>
+          </p:cNvSpPr>
+          <p:nvPr>
+            <p:ph idx="1"/>
+          </p:nvPr>
+        </p:nvSpPr>
+        <p:spPr>
+          <a:xfrm>
+            <a:off x="838200" y="1456267"/>
+            <a:ext cx="4571999" cy="4720696"/>
+          </a:xfrm>
+        </p:spPr>
+        <p:txBody>
+          <a:bodyPr>
+            <a:normAutofit/>
+          </a:bodyPr>
+          <a:lstStyle/>
+          <a:p>
+            <a:pPr marL="0" indent="0">
+              <a:buNone/>
+            </a:pPr>
+            <a:r>
+              <a:rPr lang="nl-NL" sz="2000" noProof="0" dirty="0">
+                <a:latin typeface="Courier New" panose="02070309020205020404" pitchFamily="49" charset="0"/>
+                <a:cs typeface="Courier New" panose="02070309020205020404" pitchFamily="49" charset="0"/>
+              </a:rPr>
+              <a:t>__</a:t>
+            </a:r>
+            <a:r>
+              <a:rPr lang="nl-NL" sz="2000" noProof="0" dirty="0" err="1">
+                <a:latin typeface="Courier New" panose="02070309020205020404" pitchFamily="49" charset="0"/>
+                <a:cs typeface="Courier New" panose="02070309020205020404" pitchFamily="49" charset="0"/>
+              </a:rPr>
+              <a:t>str</a:t>
+            </a:r>
+            <a:r>
+              <a:rPr lang="nl-NL" sz="2000" noProof="0" dirty="0">
+                <a:latin typeface="Courier New" panose="02070309020205020404" pitchFamily="49" charset="0"/>
+                <a:cs typeface="Courier New" panose="02070309020205020404" pitchFamily="49" charset="0"/>
+              </a:rPr>
+              <a:t>__</a:t>
+            </a:r>
+            <a:endParaRPr lang="nl-NL" sz="2000" noProof="0" dirty="0"/>
+          </a:p>
+          <a:p>
+            <a:pPr marL="0" indent="0">
+              <a:buNone/>
+            </a:pPr>
+            <a:r>
+              <a:rPr lang="nl-NL" sz="2000" dirty="0"/>
+              <a:t>Weergave van het object als tekst, bijvoorbeeld in </a:t>
+            </a:r>
+            <a:r>
+              <a:rPr lang="nl-NL" sz="2000" dirty="0">
+                <a:latin typeface="Courier New" panose="02070309020205020404" pitchFamily="49" charset="0"/>
+                <a:cs typeface="Courier New" panose="02070309020205020404" pitchFamily="49" charset="0"/>
+              </a:rPr>
+              <a:t>print()</a:t>
+            </a:r>
+            <a:r>
+              <a:rPr lang="nl-NL" sz="2000" dirty="0"/>
+              <a:t>.</a:t>
+            </a:r>
+          </a:p>
+          <a:p>
+            <a:pPr marL="0" indent="0">
+              <a:buNone/>
+            </a:pPr>
+            <a:endParaRPr lang="nl-NL" sz="2000" dirty="0"/>
+          </a:p>
+          <a:p>
+            <a:pPr marL="0" indent="0">
+              <a:buNone/>
+            </a:pPr>
+            <a:r>
+              <a:rPr lang="nl-NL" sz="2000" dirty="0">
+                <a:latin typeface="Courier New" panose="02070309020205020404" pitchFamily="49" charset="0"/>
+                <a:cs typeface="Courier New" panose="02070309020205020404" pitchFamily="49" charset="0"/>
+              </a:rPr>
+              <a:t>__</a:t>
+            </a:r>
+            <a:r>
+              <a:rPr lang="nl-NL" sz="2000" dirty="0" err="1">
+                <a:latin typeface="Courier New" panose="02070309020205020404" pitchFamily="49" charset="0"/>
+                <a:cs typeface="Courier New" panose="02070309020205020404" pitchFamily="49" charset="0"/>
+              </a:rPr>
+              <a:t>repr</a:t>
+            </a:r>
+            <a:r>
+              <a:rPr lang="nl-NL" sz="2000" dirty="0">
+                <a:latin typeface="Courier New" panose="02070309020205020404" pitchFamily="49" charset="0"/>
+                <a:cs typeface="Courier New" panose="02070309020205020404" pitchFamily="49" charset="0"/>
+              </a:rPr>
+              <a:t>__</a:t>
+            </a:r>
+          </a:p>
+          <a:p>
+            <a:pPr marL="0" indent="0">
+              <a:buNone/>
+            </a:pPr>
+            <a:r>
+              <a:rPr lang="nl-NL" sz="2000" dirty="0"/>
+              <a:t>Representatie van het object zoals je het zou aanmaken.</a:t>
+            </a:r>
+          </a:p>
+          <a:p>
+            <a:pPr marL="0" indent="0">
+              <a:buNone/>
+            </a:pPr>
+            <a:endParaRPr lang="nl-NL" sz="2000" dirty="0"/>
+          </a:p>
+          <a:p>
+            <a:pPr marL="0" indent="0">
+              <a:buNone/>
+            </a:pPr>
+            <a:endParaRPr lang="nl-NL" sz="2000" dirty="0"/>
+          </a:p>
+          <a:p>
+            <a:pPr marL="0" indent="0">
+              <a:buNone/>
+            </a:pPr>
+            <a:r>
+              <a:rPr lang="nl-NL" sz="2000" noProof="0" dirty="0"/>
+              <a:t>Voor meer, zie </a:t>
+            </a:r>
+            <a:r>
+              <a:rPr lang="nl-NL" sz="2000" noProof="0" dirty="0" err="1"/>
+              <a:t>Python's</a:t>
+            </a:r>
+            <a:r>
+              <a:rPr lang="nl-NL" sz="2000" noProof="0" dirty="0"/>
+              <a:t>  data model:</a:t>
+            </a:r>
+          </a:p>
+          <a:p>
+            <a:pPr marL="0" indent="0">
+              <a:buNone/>
+            </a:pPr>
+            <a:r>
+              <a:rPr lang="nl-NL" sz="2000" dirty="0">
+                <a:hlinkClick r:id="rId2"/>
+              </a:rPr>
+              <a:t>https://docs.python.org/3/reference/datamodel.html#special-method-names</a:t>
+            </a:r>
+            <a:endParaRPr lang="nl-NL" sz="2000" noProof="0" dirty="0"/>
+          </a:p>
+          <a:p>
+            <a:pPr marL="0" indent="0">
+              <a:buNone/>
+            </a:pPr>
+            <a:endParaRPr lang="nl-NL" sz="2000" dirty="0"/>
+          </a:p>
+        </p:txBody>
+      </p:sp>
+      <p:sp>
+        <p:nvSpPr>
+          <p:cNvPr id="4" name="Content Placeholder 2">
+            <a:extLst>
+              <a:ext uri="{FF2B5EF4-FFF2-40B4-BE49-F238E27FC236}">
+                <a16:creationId xmlns:a16="http://schemas.microsoft.com/office/drawing/2014/main" id="{98EFE1E9-4D56-5081-678F-F94DE9C3DCC6}"/>
+              </a:ext>
+            </a:extLst>
+          </p:cNvPr>
+          <p:cNvSpPr txBox="1">
+            <a:spLocks/>
+          </p:cNvSpPr>
+          <p:nvPr/>
+        </p:nvSpPr>
+        <p:spPr>
+          <a:xfrm>
+            <a:off x="6095999" y="1456267"/>
+            <a:ext cx="5327651" cy="4720696"/>
+          </a:xfrm>
+          <a:prstGeom prst="rect">
+            <a:avLst/>
+          </a:prstGeom>
+        </p:spPr>
+        <p:txBody>
+          <a:bodyPr vert="horz" lIns="91440" tIns="45720" rIns="91440" bIns="45720" rtlCol="0">
+            <a:normAutofit/>
+          </a:bodyPr>
+          <a:lstStyle>
+            <a:lvl1pPr marL="228600" indent="-228600" algn="l" defTabSz="914400" rtl="0" eaLnBrk="1" latinLnBrk="0" hangingPunct="1">
+              <a:lnSpc>
+                <a:spcPct val="90000"/>
+              </a:lnSpc>
+              <a:spcBef>
+                <a:spcPts val="1000"/>
+              </a:spcBef>
+              <a:buFont typeface="Arial" panose="020B0604020202020204" pitchFamily="34" charset="0"/>
+              <a:buChar char="•"/>
+              <a:defRPr sz="2800" kern="1200">
+                <a:solidFill>
+                  <a:schemeClr val="tx1"/>
+                </a:solidFill>
+                <a:latin typeface="+mn-lt"/>
+                <a:ea typeface="+mn-ea"/>
+                <a:cs typeface="+mn-cs"/>
+              </a:defRPr>
+            </a:lvl1pPr>
+            <a:lvl2pPr marL="685800" indent="-228600" algn="l" defTabSz="914400" rtl="0" eaLnBrk="1" latinLnBrk="0" hangingPunct="1">
+              <a:lnSpc>
+                <a:spcPct val="90000"/>
+              </a:lnSpc>
+              <a:spcBef>
+                <a:spcPts val="500"/>
+              </a:spcBef>
+              <a:buFont typeface="Arial" panose="020B0604020202020204" pitchFamily="34" charset="0"/>
+              <a:buChar char="•"/>
+              <a:defRPr sz="2400" kern="1200">
+                <a:solidFill>
+                  <a:schemeClr val="tx1"/>
+                </a:solidFill>
+                <a:latin typeface="+mn-lt"/>
+                <a:ea typeface="+mn-ea"/>
+                <a:cs typeface="+mn-cs"/>
+              </a:defRPr>
+            </a:lvl2pPr>
+            <a:lvl3pPr marL="1143000" indent="-228600" algn="l" defTabSz="914400" rtl="0" eaLnBrk="1" latinLnBrk="0" hangingPunct="1">
+              <a:lnSpc>
+                <a:spcPct val="90000"/>
+              </a:lnSpc>
+              <a:spcBef>
+                <a:spcPts val="500"/>
+              </a:spcBef>
+              <a:buFont typeface="Arial" panose="020B0604020202020204" pitchFamily="34" charset="0"/>
+              <a:buChar char="•"/>
+              <a:defRPr sz="2000" kern="1200">
+                <a:solidFill>
+                  <a:schemeClr val="tx1"/>
+                </a:solidFill>
+                <a:latin typeface="+mn-lt"/>
+                <a:ea typeface="+mn-ea"/>
+                <a:cs typeface="+mn-cs"/>
+              </a:defRPr>
+            </a:lvl3pPr>
+            <a:lvl4pPr marL="1600200" indent="-228600" algn="l" defTabSz="914400" rtl="0" eaLnBrk="1" latinLnBrk="0" hangingPunct="1">
+              <a:lnSpc>
+                <a:spcPct val="90000"/>
+              </a:lnSpc>
+              <a:spcBef>
+                <a:spcPts val="500"/>
+              </a:spcBef>
+              <a:buFont typeface="Arial" panose="020B0604020202020204" pitchFamily="34" charset="0"/>
+              <a:buChar char="•"/>
+              <a:defRPr sz="1800" kern="1200">
+                <a:solidFill>
+                  <a:schemeClr val="tx1"/>
+                </a:solidFill>
+                <a:latin typeface="+mn-lt"/>
+                <a:ea typeface="+mn-ea"/>
+                <a:cs typeface="+mn-cs"/>
+              </a:defRPr>
+            </a:lvl4pPr>
+            <a:lvl5pPr marL="2057400" indent="-228600" algn="l" defTabSz="914400" rtl="0" eaLnBrk="1" latinLnBrk="0" hangingPunct="1">
+              <a:lnSpc>
+                <a:spcPct val="90000"/>
+              </a:lnSpc>
+              <a:spcBef>
+                <a:spcPts val="500"/>
+              </a:spcBef>
+              <a:buFont typeface="Arial" panose="020B0604020202020204" pitchFamily="34" charset="0"/>
+              <a:buChar char="•"/>
+              <a:defRPr sz="1800" kern="1200">
+                <a:solidFill>
+                  <a:schemeClr val="tx1"/>
+                </a:solidFill>
+                <a:latin typeface="+mn-lt"/>
+                <a:ea typeface="+mn-ea"/>
+                <a:cs typeface="+mn-cs"/>
+              </a:defRPr>
+            </a:lvl5pPr>
+            <a:lvl6pPr marL="2514600" indent="-228600" algn="l" defTabSz="914400" rtl="0" eaLnBrk="1" latinLnBrk="0" hangingPunct="1">
+              <a:lnSpc>
+                <a:spcPct val="90000"/>
+              </a:lnSpc>
+              <a:spcBef>
+                <a:spcPts val="500"/>
+              </a:spcBef>
+              <a:buFont typeface="Arial" panose="020B0604020202020204" pitchFamily="34" charset="0"/>
+              <a:buChar char="•"/>
+              <a:defRPr sz="1800" kern="1200">
+                <a:solidFill>
+                  <a:schemeClr val="tx1"/>
+                </a:solidFill>
+                <a:latin typeface="+mn-lt"/>
+                <a:ea typeface="+mn-ea"/>
+                <a:cs typeface="+mn-cs"/>
+              </a:defRPr>
+            </a:lvl6pPr>
+            <a:lvl7pPr marL="2971800" indent="-228600" algn="l" defTabSz="914400" rtl="0" eaLnBrk="1" latinLnBrk="0" hangingPunct="1">
+              <a:lnSpc>
+                <a:spcPct val="90000"/>
+              </a:lnSpc>
+              <a:spcBef>
+                <a:spcPts val="500"/>
+              </a:spcBef>
+              <a:buFont typeface="Arial" panose="020B0604020202020204" pitchFamily="34" charset="0"/>
+              <a:buChar char="•"/>
+              <a:defRPr sz="1800" kern="1200">
+                <a:solidFill>
+                  <a:schemeClr val="tx1"/>
+                </a:solidFill>
+                <a:latin typeface="+mn-lt"/>
+                <a:ea typeface="+mn-ea"/>
+                <a:cs typeface="+mn-cs"/>
+              </a:defRPr>
+            </a:lvl7pPr>
+            <a:lvl8pPr marL="3429000" indent="-228600" algn="l" defTabSz="914400" rtl="0" eaLnBrk="1" latinLnBrk="0" hangingPunct="1">
+              <a:lnSpc>
+                <a:spcPct val="90000"/>
+              </a:lnSpc>
+              <a:spcBef>
+                <a:spcPts val="500"/>
+              </a:spcBef>
+              <a:buFont typeface="Arial" panose="020B0604020202020204" pitchFamily="34" charset="0"/>
+              <a:buChar char="•"/>
+              <a:defRPr sz="1800" kern="1200">
+                <a:solidFill>
+                  <a:schemeClr val="tx1"/>
+                </a:solidFill>
+                <a:latin typeface="+mn-lt"/>
+                <a:ea typeface="+mn-ea"/>
+                <a:cs typeface="+mn-cs"/>
+              </a:defRPr>
+            </a:lvl8pPr>
+            <a:lvl9pPr marL="3886200" indent="-228600" algn="l" defTabSz="914400" rtl="0" eaLnBrk="1" latinLnBrk="0" hangingPunct="1">
+              <a:lnSpc>
+                <a:spcPct val="90000"/>
+              </a:lnSpc>
+              <a:spcBef>
+                <a:spcPts val="500"/>
+              </a:spcBef>
+              <a:buFont typeface="Arial" panose="020B0604020202020204" pitchFamily="34" charset="0"/>
+              <a:buChar char="•"/>
+              <a:defRPr sz="1800" kern="1200">
+                <a:solidFill>
+                  <a:schemeClr val="tx1"/>
+                </a:solidFill>
+                <a:latin typeface="+mn-lt"/>
+                <a:ea typeface="+mn-ea"/>
+                <a:cs typeface="+mn-cs"/>
+              </a:defRPr>
+            </a:lvl9pPr>
+          </a:lstStyle>
+          <a:p>
+            <a:pPr marL="0" indent="0">
+              <a:buFont typeface="Arial" panose="020B0604020202020204" pitchFamily="34" charset="0"/>
+              <a:buNone/>
+            </a:pPr>
+            <a:r>
+              <a:rPr lang="nl-NL" sz="1400" b="1" dirty="0">
+                <a:latin typeface="Courier New" panose="02070309020205020404" pitchFamily="49" charset="0"/>
+                <a:cs typeface="Courier New" panose="02070309020205020404" pitchFamily="49" charset="0"/>
+              </a:rPr>
+              <a:t>class Persoon:</a:t>
+            </a:r>
+          </a:p>
+          <a:p>
+            <a:pPr marL="0" indent="0">
+              <a:buFont typeface="Arial" panose="020B0604020202020204" pitchFamily="34" charset="0"/>
+              <a:buNone/>
+            </a:pPr>
+            <a:endParaRPr lang="nl-NL" sz="1400" dirty="0">
+              <a:latin typeface="Courier New" panose="02070309020205020404" pitchFamily="49" charset="0"/>
+              <a:cs typeface="Courier New" panose="02070309020205020404" pitchFamily="49" charset="0"/>
+            </a:endParaRPr>
+          </a:p>
+          <a:p>
+            <a:pPr marL="0" indent="0">
+              <a:buFont typeface="Arial" panose="020B0604020202020204" pitchFamily="34" charset="0"/>
+              <a:buNone/>
+            </a:pPr>
+            <a:r>
+              <a:rPr lang="nl-NL" sz="1400" dirty="0">
+                <a:latin typeface="Courier New" panose="02070309020205020404" pitchFamily="49" charset="0"/>
+                <a:cs typeface="Courier New" panose="02070309020205020404" pitchFamily="49" charset="0"/>
+              </a:rPr>
+              <a:t>  </a:t>
+            </a:r>
+            <a:r>
+              <a:rPr lang="nl-NL" sz="1400" b="1" dirty="0" err="1">
+                <a:latin typeface="Courier New" panose="02070309020205020404" pitchFamily="49" charset="0"/>
+                <a:cs typeface="Courier New" panose="02070309020205020404" pitchFamily="49" charset="0"/>
+              </a:rPr>
+              <a:t>def</a:t>
+            </a:r>
+            <a:r>
+              <a:rPr lang="nl-NL" sz="1400" b="1" dirty="0">
+                <a:latin typeface="Courier New" panose="02070309020205020404" pitchFamily="49" charset="0"/>
+                <a:cs typeface="Courier New" panose="02070309020205020404" pitchFamily="49" charset="0"/>
+              </a:rPr>
+              <a:t> __</a:t>
+            </a:r>
+            <a:r>
+              <a:rPr lang="nl-NL" sz="1400" b="1" dirty="0" err="1">
+                <a:latin typeface="Courier New" panose="02070309020205020404" pitchFamily="49" charset="0"/>
+                <a:cs typeface="Courier New" panose="02070309020205020404" pitchFamily="49" charset="0"/>
+              </a:rPr>
+              <a:t>str</a:t>
+            </a:r>
+            <a:r>
+              <a:rPr lang="nl-NL" sz="1400" b="1" dirty="0">
+                <a:latin typeface="Courier New" panose="02070309020205020404" pitchFamily="49" charset="0"/>
+                <a:cs typeface="Courier New" panose="02070309020205020404" pitchFamily="49" charset="0"/>
+              </a:rPr>
+              <a:t>__(): </a:t>
+            </a:r>
+          </a:p>
+          <a:p>
+            <a:pPr marL="0" indent="0">
+              <a:buFont typeface="Arial" panose="020B0604020202020204" pitchFamily="34" charset="0"/>
+              <a:buNone/>
+            </a:pPr>
+            <a:r>
+              <a:rPr lang="nl-NL" sz="1400" dirty="0">
+                <a:latin typeface="Courier New" panose="02070309020205020404" pitchFamily="49" charset="0"/>
+                <a:cs typeface="Courier New" panose="02070309020205020404" pitchFamily="49" charset="0"/>
+              </a:rPr>
+              <a:t>    return f"{</a:t>
+            </a:r>
+            <a:r>
+              <a:rPr lang="nl-NL" sz="1400" dirty="0" err="1">
+                <a:latin typeface="Courier New" panose="02070309020205020404" pitchFamily="49" charset="0"/>
+                <a:cs typeface="Courier New" panose="02070309020205020404" pitchFamily="49" charset="0"/>
+              </a:rPr>
+              <a:t>self.voor</a:t>
+            </a:r>
+            <a:r>
+              <a:rPr lang="nl-NL" sz="1400" dirty="0">
+                <a:latin typeface="Courier New" panose="02070309020205020404" pitchFamily="49" charset="0"/>
+                <a:cs typeface="Courier New" panose="02070309020205020404" pitchFamily="49" charset="0"/>
+              </a:rPr>
+              <a:t>} {</a:t>
+            </a:r>
+            <a:r>
+              <a:rPr lang="nl-NL" sz="1400" dirty="0" err="1">
+                <a:latin typeface="Courier New" panose="02070309020205020404" pitchFamily="49" charset="0"/>
+                <a:cs typeface="Courier New" panose="02070309020205020404" pitchFamily="49" charset="0"/>
+              </a:rPr>
+              <a:t>self.achter</a:t>
+            </a:r>
+            <a:r>
+              <a:rPr lang="nl-NL" sz="1400" dirty="0">
+                <a:latin typeface="Courier New" panose="02070309020205020404" pitchFamily="49" charset="0"/>
+                <a:cs typeface="Courier New" panose="02070309020205020404" pitchFamily="49" charset="0"/>
+              </a:rPr>
+              <a:t>}"</a:t>
+            </a:r>
+          </a:p>
+          <a:p>
+            <a:pPr marL="0" indent="0">
+              <a:buFont typeface="Arial" panose="020B0604020202020204" pitchFamily="34" charset="0"/>
+              <a:buNone/>
+            </a:pPr>
+            <a:endParaRPr lang="nl-NL" sz="1400" dirty="0">
+              <a:latin typeface="Courier New" panose="02070309020205020404" pitchFamily="49" charset="0"/>
+              <a:cs typeface="Courier New" panose="02070309020205020404" pitchFamily="49" charset="0"/>
+            </a:endParaRPr>
+          </a:p>
+          <a:p>
+            <a:pPr marL="0" indent="0">
+              <a:buFont typeface="Arial" panose="020B0604020202020204" pitchFamily="34" charset="0"/>
+              <a:buNone/>
+            </a:pPr>
+            <a:r>
+              <a:rPr lang="nl-NL" sz="1400" dirty="0">
+                <a:latin typeface="Courier New" panose="02070309020205020404" pitchFamily="49" charset="0"/>
+                <a:cs typeface="Courier New" panose="02070309020205020404" pitchFamily="49" charset="0"/>
+              </a:rPr>
+              <a:t>   </a:t>
+            </a:r>
+            <a:r>
+              <a:rPr lang="nl-NL" sz="1400" b="1" dirty="0" err="1">
+                <a:latin typeface="Courier New" panose="02070309020205020404" pitchFamily="49" charset="0"/>
+                <a:cs typeface="Courier New" panose="02070309020205020404" pitchFamily="49" charset="0"/>
+              </a:rPr>
+              <a:t>def</a:t>
+            </a:r>
+            <a:r>
+              <a:rPr lang="nl-NL" sz="1400" b="1" dirty="0">
+                <a:latin typeface="Courier New" panose="02070309020205020404" pitchFamily="49" charset="0"/>
+                <a:cs typeface="Courier New" panose="02070309020205020404" pitchFamily="49" charset="0"/>
+              </a:rPr>
+              <a:t> __</a:t>
+            </a:r>
+            <a:r>
+              <a:rPr lang="nl-NL" sz="1400" b="1" dirty="0" err="1">
+                <a:latin typeface="Courier New" panose="02070309020205020404" pitchFamily="49" charset="0"/>
+                <a:cs typeface="Courier New" panose="02070309020205020404" pitchFamily="49" charset="0"/>
+              </a:rPr>
+              <a:t>repr</a:t>
+            </a:r>
+            <a:r>
+              <a:rPr lang="nl-NL" sz="1400" b="1" dirty="0">
+                <a:latin typeface="Courier New" panose="02070309020205020404" pitchFamily="49" charset="0"/>
+                <a:cs typeface="Courier New" panose="02070309020205020404" pitchFamily="49" charset="0"/>
+              </a:rPr>
+              <a:t>__(): </a:t>
+            </a:r>
+          </a:p>
+          <a:p>
+            <a:pPr marL="0" indent="0">
+              <a:buFont typeface="Arial" panose="020B0604020202020204" pitchFamily="34" charset="0"/>
+              <a:buNone/>
+            </a:pPr>
+            <a:r>
+              <a:rPr lang="nl-NL" sz="1400" dirty="0">
+                <a:latin typeface="Courier New" panose="02070309020205020404" pitchFamily="49" charset="0"/>
+                <a:cs typeface="Courier New" panose="02070309020205020404" pitchFamily="49" charset="0"/>
+              </a:rPr>
+              <a:t>    return (</a:t>
+            </a:r>
+          </a:p>
+          <a:p>
+            <a:pPr marL="0" indent="0">
+              <a:buFont typeface="Arial" panose="020B0604020202020204" pitchFamily="34" charset="0"/>
+              <a:buNone/>
+            </a:pPr>
+            <a:r>
+              <a:rPr lang="nl-NL" sz="1400" dirty="0">
+                <a:latin typeface="Courier New" panose="02070309020205020404" pitchFamily="49" charset="0"/>
+                <a:cs typeface="Courier New" panose="02070309020205020404" pitchFamily="49" charset="0"/>
+              </a:rPr>
+              <a:t>      </a:t>
+            </a:r>
+            <a:r>
+              <a:rPr lang="nl-NL" sz="1400" dirty="0" err="1">
+                <a:latin typeface="Courier New" panose="02070309020205020404" pitchFamily="49" charset="0"/>
+                <a:cs typeface="Courier New" panose="02070309020205020404" pitchFamily="49" charset="0"/>
+              </a:rPr>
+              <a:t>f"Persoon</a:t>
+            </a:r>
+            <a:r>
+              <a:rPr lang="nl-NL" sz="1400" dirty="0">
+                <a:latin typeface="Courier New" panose="02070309020205020404" pitchFamily="49" charset="0"/>
+                <a:cs typeface="Courier New" panose="02070309020205020404" pitchFamily="49" charset="0"/>
+              </a:rPr>
+              <a:t>('{</a:t>
+            </a:r>
+            <a:r>
+              <a:rPr lang="nl-NL" sz="1400" dirty="0" err="1">
+                <a:latin typeface="Courier New" panose="02070309020205020404" pitchFamily="49" charset="0"/>
+                <a:cs typeface="Courier New" panose="02070309020205020404" pitchFamily="49" charset="0"/>
+              </a:rPr>
+              <a:t>self.voor</a:t>
+            </a:r>
+            <a:r>
+              <a:rPr lang="nl-NL" sz="1400" dirty="0">
+                <a:latin typeface="Courier New" panose="02070309020205020404" pitchFamily="49" charset="0"/>
+                <a:cs typeface="Courier New" panose="02070309020205020404" pitchFamily="49" charset="0"/>
+              </a:rPr>
+              <a:t>}', '{</a:t>
+            </a:r>
+            <a:r>
+              <a:rPr lang="nl-NL" sz="1400" dirty="0" err="1">
+                <a:latin typeface="Courier New" panose="02070309020205020404" pitchFamily="49" charset="0"/>
+                <a:cs typeface="Courier New" panose="02070309020205020404" pitchFamily="49" charset="0"/>
+              </a:rPr>
+              <a:t>self.achter</a:t>
+            </a:r>
+            <a:r>
+              <a:rPr lang="nl-NL" sz="1400" dirty="0">
+                <a:latin typeface="Courier New" panose="02070309020205020404" pitchFamily="49" charset="0"/>
+                <a:cs typeface="Courier New" panose="02070309020205020404" pitchFamily="49" charset="0"/>
+              </a:rPr>
+              <a:t>}')"</a:t>
+            </a:r>
+          </a:p>
+          <a:p>
+            <a:pPr marL="0" indent="0">
+              <a:buFont typeface="Arial" panose="020B0604020202020204" pitchFamily="34" charset="0"/>
+              <a:buNone/>
+            </a:pPr>
+            <a:r>
+              <a:rPr lang="nl-NL" sz="1400" dirty="0">
+                <a:latin typeface="Courier New" panose="02070309020205020404" pitchFamily="49" charset="0"/>
+                <a:cs typeface="Courier New" panose="02070309020205020404" pitchFamily="49" charset="0"/>
+              </a:rPr>
+              <a:t>    )</a:t>
+            </a:r>
+          </a:p>
+          <a:p>
+            <a:pPr marL="0" indent="0">
+              <a:buFont typeface="Arial" panose="020B0604020202020204" pitchFamily="34" charset="0"/>
+              <a:buNone/>
+            </a:pPr>
+            <a:endParaRPr lang="nl-NL" sz="1400" dirty="0">
+              <a:latin typeface="Courier New" panose="02070309020205020404" pitchFamily="49" charset="0"/>
+              <a:cs typeface="Courier New" panose="02070309020205020404" pitchFamily="49" charset="0"/>
+            </a:endParaRPr>
+          </a:p>
+          <a:p>
+            <a:pPr marL="0" indent="0">
+              <a:buFont typeface="Arial" panose="020B0604020202020204" pitchFamily="34" charset="0"/>
+              <a:buNone/>
+            </a:pPr>
+            <a:endParaRPr lang="nl-NL" sz="1400" dirty="0">
+              <a:latin typeface="Courier New" panose="02070309020205020404" pitchFamily="49" charset="0"/>
+              <a:cs typeface="Courier New" panose="02070309020205020404" pitchFamily="49" charset="0"/>
+            </a:endParaRPr>
+          </a:p>
+          <a:p>
+            <a:pPr marL="0" indent="0">
+              <a:buNone/>
+            </a:pPr>
+            <a:r>
+              <a:rPr lang="nl-NL" sz="1400" dirty="0" err="1">
+                <a:latin typeface="Courier New" panose="02070309020205020404" pitchFamily="49" charset="0"/>
+                <a:cs typeface="Courier New" panose="02070309020205020404" pitchFamily="49" charset="0"/>
+              </a:rPr>
+              <a:t>henk</a:t>
+            </a:r>
+            <a:r>
+              <a:rPr lang="nl-NL" sz="1400" dirty="0">
+                <a:latin typeface="Courier New" panose="02070309020205020404" pitchFamily="49" charset="0"/>
+                <a:cs typeface="Courier New" panose="02070309020205020404" pitchFamily="49" charset="0"/>
+              </a:rPr>
+              <a:t> = Persoon("Henk", "Jansen")</a:t>
+            </a:r>
+          </a:p>
+          <a:p>
+            <a:pPr marL="0" indent="0">
+              <a:buFont typeface="Arial" panose="020B0604020202020204" pitchFamily="34" charset="0"/>
+              <a:buNone/>
+            </a:pPr>
+            <a:r>
+              <a:rPr lang="nl-NL" sz="1400" dirty="0">
+                <a:latin typeface="Courier New" panose="02070309020205020404" pitchFamily="49" charset="0"/>
+                <a:cs typeface="Courier New" panose="02070309020205020404" pitchFamily="49" charset="0"/>
+              </a:rPr>
+              <a:t>print(</a:t>
+            </a:r>
+            <a:r>
+              <a:rPr lang="nl-NL" sz="1400" dirty="0" err="1">
+                <a:latin typeface="Courier New" panose="02070309020205020404" pitchFamily="49" charset="0"/>
+                <a:cs typeface="Courier New" panose="02070309020205020404" pitchFamily="49" charset="0"/>
+              </a:rPr>
+              <a:t>henk</a:t>
+            </a:r>
+            <a:r>
+              <a:rPr lang="nl-NL" sz="1400" dirty="0">
+                <a:latin typeface="Courier New" panose="02070309020205020404" pitchFamily="49" charset="0"/>
+                <a:cs typeface="Courier New" panose="02070309020205020404" pitchFamily="49" charset="0"/>
+              </a:rPr>
+              <a:t>)   # "Henk Jansen"</a:t>
+            </a:r>
+          </a:p>
+          <a:p>
+            <a:pPr marL="0" indent="0">
+              <a:buNone/>
+            </a:pPr>
+            <a:r>
+              <a:rPr lang="nl-NL" sz="1400" dirty="0" err="1">
+                <a:latin typeface="Courier New" panose="02070309020205020404" pitchFamily="49" charset="0"/>
+                <a:cs typeface="Courier New" panose="02070309020205020404" pitchFamily="49" charset="0"/>
+              </a:rPr>
+              <a:t>repr</a:t>
+            </a:r>
+            <a:r>
+              <a:rPr lang="nl-NL" sz="1400" dirty="0">
+                <a:latin typeface="Courier New" panose="02070309020205020404" pitchFamily="49" charset="0"/>
+                <a:cs typeface="Courier New" panose="02070309020205020404" pitchFamily="49" charset="0"/>
+              </a:rPr>
+              <a:t>(</a:t>
+            </a:r>
+            <a:r>
+              <a:rPr lang="nl-NL" sz="1400" dirty="0" err="1">
+                <a:latin typeface="Courier New" panose="02070309020205020404" pitchFamily="49" charset="0"/>
+                <a:cs typeface="Courier New" panose="02070309020205020404" pitchFamily="49" charset="0"/>
+              </a:rPr>
+              <a:t>henk</a:t>
+            </a:r>
+            <a:r>
+              <a:rPr lang="nl-NL" sz="1400" dirty="0">
+                <a:latin typeface="Courier New" panose="02070309020205020404" pitchFamily="49" charset="0"/>
+                <a:cs typeface="Courier New" panose="02070309020205020404" pitchFamily="49" charset="0"/>
+              </a:rPr>
+              <a:t>)    # "Persoon('Henk', 'Jansen')"</a:t>
+            </a:r>
+          </a:p>
+        </p:txBody>
+      </p:sp>
+      <p:cxnSp>
+        <p:nvCxnSpPr>
+          <p:cNvPr id="6" name="Straight Connector 5">
+            <a:extLst>
+              <a:ext uri="{FF2B5EF4-FFF2-40B4-BE49-F238E27FC236}">
+                <a16:creationId xmlns:a16="http://schemas.microsoft.com/office/drawing/2014/main" id="{7F162173-AD9E-1ED9-F92B-186066229DD6}"/>
+              </a:ext>
+            </a:extLst>
+          </p:cNvPr>
+          <p:cNvCxnSpPr>
+            <a:cxnSpLocks/>
+          </p:cNvCxnSpPr>
+          <p:nvPr/>
+        </p:nvCxnSpPr>
+        <p:spPr>
+          <a:xfrm>
+            <a:off x="5655733" y="1456267"/>
+            <a:ext cx="0" cy="4809066"/>
+          </a:xfrm>
+          <a:prstGeom prst="line">
+            <a:avLst/>
+          </a:prstGeom>
+        </p:spPr>
+        <p:style>
+          <a:lnRef idx="3">
+            <a:schemeClr val="dk1"/>
+          </a:lnRef>
+          <a:fillRef idx="0">
+            <a:schemeClr val="dk1"/>
+          </a:fillRef>
+          <a:effectRef idx="2">
+            <a:schemeClr val="dk1"/>
+          </a:effectRef>
+          <a:fontRef idx="minor">
+            <a:schemeClr val="tx1"/>
+          </a:fontRef>
+        </p:style>
+      </p:cxnSp>
+    </p:spTree>
+    <p:extLst>
+      <p:ext uri="{BB962C8B-B14F-4D97-AF65-F5344CB8AC3E}">
+        <p14:creationId xmlns:p14="http://schemas.microsoft.com/office/powerpoint/2010/main" val="1057875604"/>
+      </p:ext>
+    </p:extLst>
+  </p:cSld>
+  <p:clrMapOvr>
+    <a:masterClrMapping/>
+  </p:clrMapOvr>
+</p:sld>
+</file>
+
+<file path=ppt/slides/slide47.xml><?xml version="1.0" encoding="utf-8"?>
+<p:sld xmlns:a="http://schemas.openxmlformats.org/drawingml/2006/main" xmlns:r="http://schemas.openxmlformats.org/officeDocument/2006/relationships" xmlns:p="http://schemas.openxmlformats.org/presentationml/2006/main">
+  <p:cSld>
+    <p:spTree>
+      <p:nvGrpSpPr>
+        <p:cNvPr id="1" name=""/>
+        <p:cNvGrpSpPr/>
+        <p:nvPr/>
+      </p:nvGrpSpPr>
+      <p:grpSpPr>
+        <a:xfrm>
+          <a:off x="0" y="0"/>
+          <a:ext cx="0" cy="0"/>
+          <a:chOff x="0" y="0"/>
+          <a:chExt cx="0" cy="0"/>
+        </a:xfrm>
+      </p:grpSpPr>
+      <p:sp>
+        <p:nvSpPr>
+          <p:cNvPr id="2" name="Title 1">
+            <a:extLst>
+              <a:ext uri="{FF2B5EF4-FFF2-40B4-BE49-F238E27FC236}">
+                <a16:creationId xmlns:a16="http://schemas.microsoft.com/office/drawing/2014/main" id="{39A1D606-8DD1-369C-5C09-471CDD551AD5}"/>
+              </a:ext>
+            </a:extLst>
+          </p:cNvPr>
+          <p:cNvSpPr>
+            <a:spLocks noGrp="1"/>
+          </p:cNvSpPr>
+          <p:nvPr>
+            <p:ph type="title"/>
+          </p:nvPr>
+        </p:nvSpPr>
+        <p:spPr>
+          <a:xfrm>
+            <a:off x="838200" y="365126"/>
+            <a:ext cx="10515600" cy="718608"/>
+          </a:xfrm>
+        </p:spPr>
+        <p:txBody>
+          <a:bodyPr>
+            <a:normAutofit/>
+          </a:bodyPr>
+          <a:lstStyle/>
+          <a:p>
+            <a:r>
+              <a:rPr lang="nl-NL" sz="3600" noProof="0" dirty="0"/>
+              <a:t>Oefeningen IV</a:t>
+            </a:r>
+          </a:p>
+        </p:txBody>
+      </p:sp>
+      <p:sp>
+        <p:nvSpPr>
+          <p:cNvPr id="3" name="Content Placeholder 2">
+            <a:extLst>
+              <a:ext uri="{FF2B5EF4-FFF2-40B4-BE49-F238E27FC236}">
+                <a16:creationId xmlns:a16="http://schemas.microsoft.com/office/drawing/2014/main" id="{F4C2D286-E049-0AAB-1360-B7157E11AD7E}"/>
+              </a:ext>
+            </a:extLst>
+          </p:cNvPr>
+          <p:cNvSpPr>
+            <a:spLocks noGrp="1"/>
+          </p:cNvSpPr>
+          <p:nvPr>
+            <p:ph idx="1"/>
+          </p:nvPr>
+        </p:nvSpPr>
+        <p:spPr>
+          <a:xfrm>
+            <a:off x="838200" y="1456267"/>
+            <a:ext cx="10375900" cy="4720696"/>
+          </a:xfrm>
+        </p:spPr>
+        <p:txBody>
+          <a:bodyPr>
+            <a:normAutofit/>
+          </a:bodyPr>
+          <a:lstStyle/>
+          <a:p>
+            <a:pPr marL="457200" indent="-457200">
+              <a:buFont typeface="Arial" panose="020B0604020202020204" pitchFamily="34" charset="0"/>
+              <a:buAutoNum type="arabicPeriod"/>
+            </a:pPr>
+            <a:r>
+              <a:rPr lang="nl-NL" sz="2000" dirty="0"/>
+              <a:t>Open Notebook </a:t>
+            </a:r>
+            <a:r>
+              <a:rPr lang="nl-NL" sz="2000" dirty="0" err="1">
+                <a:latin typeface="Courier New" panose="02070309020205020404" pitchFamily="49" charset="0"/>
+                <a:cs typeface="Courier New" panose="02070309020205020404" pitchFamily="49" charset="0"/>
+              </a:rPr>
+              <a:t>exercises</a:t>
+            </a:r>
+            <a:r>
+              <a:rPr lang="nl-NL" sz="2000" dirty="0">
+                <a:latin typeface="Courier New" panose="02070309020205020404" pitchFamily="49" charset="0"/>
+                <a:cs typeface="Courier New" panose="02070309020205020404" pitchFamily="49" charset="0"/>
+              </a:rPr>
+              <a:t>/4_fuzzy_dict.ipynb</a:t>
+            </a:r>
+          </a:p>
+          <a:p>
+            <a:pPr marL="457200" indent="-457200">
+              <a:buFont typeface="Arial" panose="020B0604020202020204" pitchFamily="34" charset="0"/>
+              <a:buAutoNum type="arabicPeriod"/>
+            </a:pPr>
+            <a:endParaRPr lang="nl-NL" sz="2000" dirty="0"/>
+          </a:p>
+          <a:p>
+            <a:pPr marL="457200" indent="-457200">
+              <a:buFont typeface="Arial" panose="020B0604020202020204" pitchFamily="34" charset="0"/>
+              <a:buAutoNum type="arabicPeriod"/>
+            </a:pPr>
+            <a:r>
+              <a:rPr lang="nl-NL" sz="2000" dirty="0"/>
+              <a:t>Werk de </a:t>
+            </a:r>
+            <a:r>
+              <a:rPr lang="nl-NL" sz="2000" dirty="0" err="1">
+                <a:latin typeface="Courier New" panose="02070309020205020404" pitchFamily="49" charset="0"/>
+                <a:cs typeface="Courier New" panose="02070309020205020404" pitchFamily="49" charset="0"/>
+              </a:rPr>
+              <a:t>FuzzyDict</a:t>
+            </a:r>
+            <a:r>
+              <a:rPr lang="nl-NL" sz="2000" dirty="0"/>
+              <a:t> class die niet hoofdlettergevoelig is:</a:t>
+            </a:r>
+          </a:p>
+          <a:p>
+            <a:pPr marL="457200" indent="-457200">
+              <a:buFont typeface="Arial" panose="020B0604020202020204" pitchFamily="34" charset="0"/>
+              <a:buAutoNum type="arabicPeriod"/>
+            </a:pPr>
+            <a:endParaRPr lang="nl-NL" sz="2000" dirty="0"/>
+          </a:p>
+          <a:p>
+            <a:pPr lvl="1"/>
+            <a:r>
+              <a:rPr lang="nl-NL" sz="1600" dirty="0" err="1">
+                <a:latin typeface="Courier New" panose="02070309020205020404" pitchFamily="49" charset="0"/>
+                <a:cs typeface="Courier New" panose="02070309020205020404" pitchFamily="49" charset="0"/>
+              </a:rPr>
+              <a:t>fuzzydict</a:t>
+            </a:r>
+            <a:r>
+              <a:rPr lang="nl-NL" sz="1600" dirty="0">
+                <a:latin typeface="Courier New" panose="02070309020205020404" pitchFamily="49" charset="0"/>
+                <a:cs typeface="Courier New" panose="02070309020205020404" pitchFamily="49" charset="0"/>
+              </a:rPr>
+              <a:t>["NAAM"]</a:t>
+            </a:r>
+            <a:r>
+              <a:rPr lang="nl-NL" sz="1600" dirty="0"/>
+              <a:t> is gelijk aan </a:t>
+            </a:r>
+            <a:r>
+              <a:rPr lang="nl-NL" sz="1600" dirty="0" err="1">
+                <a:latin typeface="Courier New" panose="02070309020205020404" pitchFamily="49" charset="0"/>
+                <a:cs typeface="Courier New" panose="02070309020205020404" pitchFamily="49" charset="0"/>
+              </a:rPr>
+              <a:t>fuzzydict</a:t>
+            </a:r>
+            <a:r>
+              <a:rPr lang="nl-NL" sz="1600" dirty="0">
+                <a:latin typeface="Courier New" panose="02070309020205020404" pitchFamily="49" charset="0"/>
+                <a:cs typeface="Courier New" panose="02070309020205020404" pitchFamily="49" charset="0"/>
+              </a:rPr>
+              <a:t>["naam"]</a:t>
+            </a:r>
+            <a:endParaRPr lang="nl-NL" sz="1600" dirty="0"/>
+          </a:p>
+          <a:p>
+            <a:pPr lvl="1"/>
+            <a:r>
+              <a:rPr lang="nl-NL" sz="1600" dirty="0" err="1">
+                <a:latin typeface="Courier New" panose="02070309020205020404" pitchFamily="49" charset="0"/>
+                <a:cs typeface="Courier New" panose="02070309020205020404" pitchFamily="49" charset="0"/>
+              </a:rPr>
+              <a:t>fuzzydict</a:t>
+            </a:r>
+            <a:r>
+              <a:rPr lang="nl-NL" sz="1600" dirty="0">
+                <a:latin typeface="Courier New" panose="02070309020205020404" pitchFamily="49" charset="0"/>
+                <a:cs typeface="Courier New" panose="02070309020205020404" pitchFamily="49" charset="0"/>
+              </a:rPr>
+              <a:t>["NAAM"] = "Henk"</a:t>
+            </a:r>
+            <a:r>
+              <a:rPr lang="nl-NL" sz="1600" dirty="0"/>
+              <a:t> is gelijk aan </a:t>
+            </a:r>
+            <a:r>
+              <a:rPr lang="nl-NL" sz="1600" dirty="0" err="1">
+                <a:latin typeface="Courier New" panose="02070309020205020404" pitchFamily="49" charset="0"/>
+                <a:cs typeface="Courier New" panose="02070309020205020404" pitchFamily="49" charset="0"/>
+              </a:rPr>
+              <a:t>fuzzydict</a:t>
+            </a:r>
+            <a:r>
+              <a:rPr lang="nl-NL" sz="1600" dirty="0">
+                <a:latin typeface="Courier New" panose="02070309020205020404" pitchFamily="49" charset="0"/>
+                <a:cs typeface="Courier New" panose="02070309020205020404" pitchFamily="49" charset="0"/>
+              </a:rPr>
+              <a:t>["naam"] = "Henk"</a:t>
+            </a:r>
+            <a:endParaRPr lang="nl-NL" sz="1200" dirty="0"/>
+          </a:p>
+          <a:p>
+            <a:pPr marL="457200" indent="-457200">
+              <a:buFont typeface="Arial" panose="020B0604020202020204" pitchFamily="34" charset="0"/>
+              <a:buAutoNum type="arabicPeriod"/>
+            </a:pPr>
+            <a:endParaRPr lang="nl-NL" sz="2000" dirty="0"/>
+          </a:p>
+          <a:p>
+            <a:pPr marL="457200" indent="-457200">
+              <a:buFont typeface="Arial" panose="020B0604020202020204" pitchFamily="34" charset="0"/>
+              <a:buAutoNum type="arabicPeriod"/>
+            </a:pPr>
+            <a:r>
+              <a:rPr lang="nl-NL" sz="2000" dirty="0"/>
+              <a:t>Gebruik </a:t>
+            </a:r>
+            <a:r>
+              <a:rPr lang="nl-NL" sz="2000" dirty="0">
+                <a:latin typeface="Courier New" panose="02070309020205020404" pitchFamily="49" charset="0"/>
+                <a:cs typeface="Courier New" panose="02070309020205020404" pitchFamily="49" charset="0"/>
+              </a:rPr>
+              <a:t>__</a:t>
+            </a:r>
+            <a:r>
+              <a:rPr lang="nl-NL" sz="2000" dirty="0" err="1">
+                <a:latin typeface="Courier New" panose="02070309020205020404" pitchFamily="49" charset="0"/>
+                <a:cs typeface="Courier New" panose="02070309020205020404" pitchFamily="49" charset="0"/>
+              </a:rPr>
+              <a:t>getitem</a:t>
+            </a:r>
+            <a:r>
+              <a:rPr lang="nl-NL" sz="2000" dirty="0">
+                <a:latin typeface="Courier New" panose="02070309020205020404" pitchFamily="49" charset="0"/>
+                <a:cs typeface="Courier New" panose="02070309020205020404" pitchFamily="49" charset="0"/>
+              </a:rPr>
+              <a:t>__</a:t>
+            </a:r>
+            <a:r>
+              <a:rPr lang="nl-NL" sz="2000" dirty="0"/>
+              <a:t> om sleutels op te halen.</a:t>
+            </a:r>
+          </a:p>
+          <a:p>
+            <a:pPr marL="457200" indent="-457200">
+              <a:buFont typeface="Arial" panose="020B0604020202020204" pitchFamily="34" charset="0"/>
+              <a:buAutoNum type="arabicPeriod"/>
+            </a:pPr>
+            <a:endParaRPr lang="nl-NL" sz="2000" dirty="0"/>
+          </a:p>
+          <a:p>
+            <a:pPr marL="457200" indent="-457200">
+              <a:buFont typeface="Arial" panose="020B0604020202020204" pitchFamily="34" charset="0"/>
+              <a:buAutoNum type="arabicPeriod"/>
+            </a:pPr>
+            <a:r>
+              <a:rPr lang="nl-NL" sz="2000" dirty="0"/>
+              <a:t>Gebruik </a:t>
+            </a:r>
+            <a:r>
+              <a:rPr lang="nl-NL" sz="2000" dirty="0">
+                <a:latin typeface="Courier New" panose="02070309020205020404" pitchFamily="49" charset="0"/>
+                <a:cs typeface="Courier New" panose="02070309020205020404" pitchFamily="49" charset="0"/>
+              </a:rPr>
+              <a:t>__</a:t>
+            </a:r>
+            <a:r>
+              <a:rPr lang="nl-NL" sz="2000" dirty="0" err="1">
+                <a:latin typeface="Courier New" panose="02070309020205020404" pitchFamily="49" charset="0"/>
+                <a:cs typeface="Courier New" panose="02070309020205020404" pitchFamily="49" charset="0"/>
+              </a:rPr>
+              <a:t>setitem</a:t>
+            </a:r>
+            <a:r>
+              <a:rPr lang="nl-NL" sz="2000" dirty="0">
+                <a:latin typeface="Courier New" panose="02070309020205020404" pitchFamily="49" charset="0"/>
+                <a:cs typeface="Courier New" panose="02070309020205020404" pitchFamily="49" charset="0"/>
+              </a:rPr>
+              <a:t>__</a:t>
+            </a:r>
+            <a:r>
+              <a:rPr lang="nl-NL" sz="2000" dirty="0"/>
+              <a:t> om waardes op te slaan.</a:t>
+            </a:r>
+          </a:p>
+          <a:p>
+            <a:pPr marL="457200" indent="-457200">
+              <a:buFont typeface="Arial" panose="020B0604020202020204" pitchFamily="34" charset="0"/>
+              <a:buAutoNum type="arabicPeriod"/>
+            </a:pPr>
+            <a:endParaRPr lang="nl-NL" sz="2000" dirty="0"/>
+          </a:p>
+          <a:p>
+            <a:pPr marL="457200" indent="-457200">
+              <a:buFont typeface="Arial" panose="020B0604020202020204" pitchFamily="34" charset="0"/>
+              <a:buAutoNum type="arabicPeriod"/>
+            </a:pPr>
+            <a:r>
+              <a:rPr lang="nl-NL" sz="2000" dirty="0"/>
+              <a:t>Optioneel: Implementeer </a:t>
+            </a:r>
+            <a:r>
+              <a:rPr lang="nl-NL" sz="2000" dirty="0">
+                <a:latin typeface="Courier New" panose="02070309020205020404" pitchFamily="49" charset="0"/>
+                <a:cs typeface="Courier New" panose="02070309020205020404" pitchFamily="49" charset="0"/>
+              </a:rPr>
+              <a:t>__</a:t>
+            </a:r>
+            <a:r>
+              <a:rPr lang="nl-NL" sz="2000" dirty="0" err="1">
+                <a:latin typeface="Courier New" panose="02070309020205020404" pitchFamily="49" charset="0"/>
+                <a:cs typeface="Courier New" panose="02070309020205020404" pitchFamily="49" charset="0"/>
+              </a:rPr>
+              <a:t>len</a:t>
+            </a:r>
+            <a:r>
+              <a:rPr lang="nl-NL" sz="2000" dirty="0">
+                <a:latin typeface="Courier New" panose="02070309020205020404" pitchFamily="49" charset="0"/>
+                <a:cs typeface="Courier New" panose="02070309020205020404" pitchFamily="49" charset="0"/>
+              </a:rPr>
+              <a:t>__</a:t>
+            </a:r>
+            <a:r>
+              <a:rPr lang="nl-NL" sz="2000" dirty="0"/>
+              <a:t>, </a:t>
+            </a:r>
+            <a:r>
+              <a:rPr lang="nl-NL" sz="2000" dirty="0">
+                <a:latin typeface="Courier New" panose="02070309020205020404" pitchFamily="49" charset="0"/>
+                <a:cs typeface="Courier New" panose="02070309020205020404" pitchFamily="49" charset="0"/>
+              </a:rPr>
+              <a:t>__</a:t>
+            </a:r>
+            <a:r>
+              <a:rPr lang="nl-NL" sz="2000" dirty="0" err="1">
+                <a:latin typeface="Courier New" panose="02070309020205020404" pitchFamily="49" charset="0"/>
+                <a:cs typeface="Courier New" panose="02070309020205020404" pitchFamily="49" charset="0"/>
+              </a:rPr>
+              <a:t>str</a:t>
+            </a:r>
+            <a:r>
+              <a:rPr lang="nl-NL" sz="2000" dirty="0">
+                <a:latin typeface="Courier New" panose="02070309020205020404" pitchFamily="49" charset="0"/>
+                <a:cs typeface="Courier New" panose="02070309020205020404" pitchFamily="49" charset="0"/>
+              </a:rPr>
+              <a:t>__</a:t>
+            </a:r>
+            <a:r>
+              <a:rPr lang="nl-NL" sz="2000" dirty="0"/>
+              <a:t> en </a:t>
+            </a:r>
+            <a:r>
+              <a:rPr lang="nl-NL" sz="2000" dirty="0">
+                <a:latin typeface="Courier New" panose="02070309020205020404" pitchFamily="49" charset="0"/>
+                <a:cs typeface="Courier New" panose="02070309020205020404" pitchFamily="49" charset="0"/>
+              </a:rPr>
+              <a:t>__</a:t>
+            </a:r>
+            <a:r>
+              <a:rPr lang="nl-NL" sz="2000" dirty="0" err="1">
+                <a:latin typeface="Courier New" panose="02070309020205020404" pitchFamily="49" charset="0"/>
+                <a:cs typeface="Courier New" panose="02070309020205020404" pitchFamily="49" charset="0"/>
+              </a:rPr>
+              <a:t>repr</a:t>
+            </a:r>
+            <a:r>
+              <a:rPr lang="nl-NL" sz="2000" dirty="0">
+                <a:latin typeface="Courier New" panose="02070309020205020404" pitchFamily="49" charset="0"/>
+                <a:cs typeface="Courier New" panose="02070309020205020404" pitchFamily="49" charset="0"/>
+              </a:rPr>
+              <a:t>__</a:t>
+            </a:r>
+            <a:r>
+              <a:rPr lang="nl-NL" sz="2000" dirty="0"/>
+              <a:t> methodes.</a:t>
+            </a:r>
+          </a:p>
+        </p:txBody>
+      </p:sp>
+    </p:spTree>
+    <p:extLst>
+      <p:ext uri="{BB962C8B-B14F-4D97-AF65-F5344CB8AC3E}">
+        <p14:creationId xmlns:p14="http://schemas.microsoft.com/office/powerpoint/2010/main" val="4287688984"/>
+      </p:ext>
+    </p:extLst>
+  </p:cSld>
+  <p:clrMapOvr>
+    <a:masterClrMapping/>
+  </p:clrMapOvr>
+</p:sld>
+</file>
+
+<file path=ppt/slides/slide48.xml><?xml version="1.0" encoding="utf-8"?>
+<p:sld xmlns:a="http://schemas.openxmlformats.org/drawingml/2006/main" xmlns:r="http://schemas.openxmlformats.org/officeDocument/2006/relationships" xmlns:p="http://schemas.openxmlformats.org/presentationml/2006/main">
+  <p:cSld>
+    <p:spTree>
+      <p:nvGrpSpPr>
+        <p:cNvPr id="1" name=""/>
+        <p:cNvGrpSpPr/>
+        <p:nvPr/>
+      </p:nvGrpSpPr>
+      <p:grpSpPr>
+        <a:xfrm>
+          <a:off x="0" y="0"/>
+          <a:ext cx="0" cy="0"/>
+          <a:chOff x="0" y="0"/>
+          <a:chExt cx="0" cy="0"/>
+        </a:xfrm>
+      </p:grpSpPr>
+      <p:sp>
+        <p:nvSpPr>
+          <p:cNvPr id="2" name="Title 1">
+            <a:extLst>
+              <a:ext uri="{FF2B5EF4-FFF2-40B4-BE49-F238E27FC236}">
+                <a16:creationId xmlns:a16="http://schemas.microsoft.com/office/drawing/2014/main" id="{39A1D606-8DD1-369C-5C09-471CDD551AD5}"/>
+              </a:ext>
+            </a:extLst>
+          </p:cNvPr>
+          <p:cNvSpPr>
+            <a:spLocks noGrp="1"/>
+          </p:cNvSpPr>
+          <p:nvPr>
+            <p:ph type="title"/>
+          </p:nvPr>
+        </p:nvSpPr>
+        <p:spPr>
+          <a:xfrm>
+            <a:off x="838200" y="365126"/>
+            <a:ext cx="10515600" cy="718608"/>
+          </a:xfrm>
+        </p:spPr>
+        <p:txBody>
+          <a:bodyPr>
+            <a:normAutofit/>
+          </a:bodyPr>
+          <a:lstStyle/>
+          <a:p>
+            <a:r>
               <a:rPr lang="nl-NL" sz="3600" noProof="0" dirty="0"/>
               <a:t>Statische en private methodes</a:t>
             </a:r>
@@ -22591,7 +23826,7 @@
 </p:sld>
 </file>
 
-<file path=ppt/slides/slide47.xml><?xml version="1.0" encoding="utf-8"?>
+<file path=ppt/slides/slide49.xml><?xml version="1.0" encoding="utf-8"?>
 <p:sld xmlns:a="http://schemas.openxmlformats.org/drawingml/2006/main" xmlns:r="http://schemas.openxmlformats.org/officeDocument/2006/relationships" xmlns:p="http://schemas.openxmlformats.org/presentationml/2006/main">
   <p:cSld>
     <p:spTree>
@@ -23341,7 +24576,427 @@
 </p:sld>
 </file>
 
-<file path=ppt/slides/slide48.xml><?xml version="1.0" encoding="utf-8"?>
+<file path=ppt/slides/slide5.xml><?xml version="1.0" encoding="utf-8"?>
+<p:sld xmlns:a="http://schemas.openxmlformats.org/drawingml/2006/main" xmlns:r="http://schemas.openxmlformats.org/officeDocument/2006/relationships" xmlns:p="http://schemas.openxmlformats.org/presentationml/2006/main">
+  <p:cSld>
+    <p:spTree>
+      <p:nvGrpSpPr>
+        <p:cNvPr id="1" name=""/>
+        <p:cNvGrpSpPr/>
+        <p:nvPr/>
+      </p:nvGrpSpPr>
+      <p:grpSpPr>
+        <a:xfrm>
+          <a:off x="0" y="0"/>
+          <a:ext cx="0" cy="0"/>
+          <a:chOff x="0" y="0"/>
+          <a:chExt cx="0" cy="0"/>
+        </a:xfrm>
+      </p:grpSpPr>
+      <p:sp>
+        <p:nvSpPr>
+          <p:cNvPr id="2" name="Title 1">
+            <a:extLst>
+              <a:ext uri="{FF2B5EF4-FFF2-40B4-BE49-F238E27FC236}">
+                <a16:creationId xmlns:a16="http://schemas.microsoft.com/office/drawing/2014/main" id="{39A1D606-8DD1-369C-5C09-471CDD551AD5}"/>
+              </a:ext>
+            </a:extLst>
+          </p:cNvPr>
+          <p:cNvSpPr>
+            <a:spLocks noGrp="1"/>
+          </p:cNvSpPr>
+          <p:nvPr>
+            <p:ph type="title"/>
+          </p:nvPr>
+        </p:nvSpPr>
+        <p:spPr>
+          <a:xfrm>
+            <a:off x="838200" y="365126"/>
+            <a:ext cx="10515600" cy="718608"/>
+          </a:xfrm>
+        </p:spPr>
+        <p:txBody>
+          <a:bodyPr>
+            <a:normAutofit/>
+          </a:bodyPr>
+          <a:lstStyle/>
+          <a:p>
+            <a:r>
+              <a:rPr lang="nl-NL" sz="3600" noProof="0" dirty="0"/>
+              <a:t>Hoe werkt Python?</a:t>
+            </a:r>
+          </a:p>
+        </p:txBody>
+      </p:sp>
+      <p:sp>
+        <p:nvSpPr>
+          <p:cNvPr id="8" name="Rectangle 7">
+            <a:extLst>
+              <a:ext uri="{FF2B5EF4-FFF2-40B4-BE49-F238E27FC236}">
+                <a16:creationId xmlns:a16="http://schemas.microsoft.com/office/drawing/2014/main" id="{8F8A90BB-468A-6D0A-002C-262602B18B4B}"/>
+              </a:ext>
+            </a:extLst>
+          </p:cNvPr>
+          <p:cNvSpPr/>
+          <p:nvPr/>
+        </p:nvSpPr>
+        <p:spPr>
+          <a:xfrm>
+            <a:off x="838200" y="1667934"/>
+            <a:ext cx="1667933" cy="982134"/>
+          </a:xfrm>
+          <a:prstGeom prst="rect">
+            <a:avLst/>
+          </a:prstGeom>
+        </p:spPr>
+        <p:style>
+          <a:lnRef idx="1">
+            <a:schemeClr val="accent4"/>
+          </a:lnRef>
+          <a:fillRef idx="2">
+            <a:schemeClr val="accent4"/>
+          </a:fillRef>
+          <a:effectRef idx="1">
+            <a:schemeClr val="accent4"/>
+          </a:effectRef>
+          <a:fontRef idx="minor">
+            <a:schemeClr val="dk1"/>
+          </a:fontRef>
+        </p:style>
+        <p:txBody>
+          <a:bodyPr rtlCol="0" anchor="ctr"/>
+          <a:lstStyle/>
+          <a:p>
+            <a:pPr algn="ctr"/>
+            <a:r>
+              <a:rPr lang="nl-NL" dirty="0"/>
+              <a:t>Python code</a:t>
+            </a:r>
+          </a:p>
+        </p:txBody>
+      </p:sp>
+      <p:sp>
+        <p:nvSpPr>
+          <p:cNvPr id="9" name="Rectangle 8">
+            <a:extLst>
+              <a:ext uri="{FF2B5EF4-FFF2-40B4-BE49-F238E27FC236}">
+                <a16:creationId xmlns:a16="http://schemas.microsoft.com/office/drawing/2014/main" id="{4F0F36A3-E63F-438C-664E-6CCFFF26537D}"/>
+              </a:ext>
+            </a:extLst>
+          </p:cNvPr>
+          <p:cNvSpPr/>
+          <p:nvPr/>
+        </p:nvSpPr>
+        <p:spPr>
+          <a:xfrm>
+            <a:off x="3787422" y="1667934"/>
+            <a:ext cx="1667933" cy="982134"/>
+          </a:xfrm>
+          <a:prstGeom prst="rect">
+            <a:avLst/>
+          </a:prstGeom>
+        </p:spPr>
+        <p:style>
+          <a:lnRef idx="1">
+            <a:schemeClr val="accent5"/>
+          </a:lnRef>
+          <a:fillRef idx="2">
+            <a:schemeClr val="accent5"/>
+          </a:fillRef>
+          <a:effectRef idx="1">
+            <a:schemeClr val="accent5"/>
+          </a:effectRef>
+          <a:fontRef idx="minor">
+            <a:schemeClr val="dk1"/>
+          </a:fontRef>
+        </p:style>
+        <p:txBody>
+          <a:bodyPr rtlCol="0" anchor="ctr"/>
+          <a:lstStyle/>
+          <a:p>
+            <a:pPr algn="ctr"/>
+            <a:r>
+              <a:rPr lang="nl-NL" dirty="0"/>
+              <a:t>Python interpreter</a:t>
+            </a:r>
+          </a:p>
+        </p:txBody>
+      </p:sp>
+      <p:sp>
+        <p:nvSpPr>
+          <p:cNvPr id="10" name="Rectangle 9">
+            <a:extLst>
+              <a:ext uri="{FF2B5EF4-FFF2-40B4-BE49-F238E27FC236}">
+                <a16:creationId xmlns:a16="http://schemas.microsoft.com/office/drawing/2014/main" id="{4176E6D8-DC0A-C2D6-09E4-B96454281B96}"/>
+              </a:ext>
+            </a:extLst>
+          </p:cNvPr>
+          <p:cNvSpPr/>
+          <p:nvPr/>
+        </p:nvSpPr>
+        <p:spPr>
+          <a:xfrm>
+            <a:off x="6736644" y="1667934"/>
+            <a:ext cx="1667933" cy="982134"/>
+          </a:xfrm>
+          <a:prstGeom prst="rect">
+            <a:avLst/>
+          </a:prstGeom>
+        </p:spPr>
+        <p:style>
+          <a:lnRef idx="1">
+            <a:schemeClr val="accent6"/>
+          </a:lnRef>
+          <a:fillRef idx="2">
+            <a:schemeClr val="accent6"/>
+          </a:fillRef>
+          <a:effectRef idx="1">
+            <a:schemeClr val="accent6"/>
+          </a:effectRef>
+          <a:fontRef idx="minor">
+            <a:schemeClr val="dk1"/>
+          </a:fontRef>
+        </p:style>
+        <p:txBody>
+          <a:bodyPr rtlCol="0" anchor="ctr"/>
+          <a:lstStyle/>
+          <a:p>
+            <a:pPr algn="ctr"/>
+            <a:r>
+              <a:rPr lang="nl-NL" dirty="0"/>
+              <a:t>C instructies / byte code</a:t>
+            </a:r>
+          </a:p>
+        </p:txBody>
+      </p:sp>
+      <p:sp>
+        <p:nvSpPr>
+          <p:cNvPr id="11" name="Rectangle 10">
+            <a:extLst>
+              <a:ext uri="{FF2B5EF4-FFF2-40B4-BE49-F238E27FC236}">
+                <a16:creationId xmlns:a16="http://schemas.microsoft.com/office/drawing/2014/main" id="{B0FD3C67-D8CC-C794-10C4-88ED519F20DB}"/>
+              </a:ext>
+            </a:extLst>
+          </p:cNvPr>
+          <p:cNvSpPr/>
+          <p:nvPr/>
+        </p:nvSpPr>
+        <p:spPr>
+          <a:xfrm>
+            <a:off x="9685867" y="1667934"/>
+            <a:ext cx="1667933" cy="982134"/>
+          </a:xfrm>
+          <a:prstGeom prst="rect">
+            <a:avLst/>
+          </a:prstGeom>
+        </p:spPr>
+        <p:style>
+          <a:lnRef idx="1">
+            <a:schemeClr val="accent5"/>
+          </a:lnRef>
+          <a:fillRef idx="2">
+            <a:schemeClr val="accent5"/>
+          </a:fillRef>
+          <a:effectRef idx="1">
+            <a:schemeClr val="accent5"/>
+          </a:effectRef>
+          <a:fontRef idx="minor">
+            <a:schemeClr val="dk1"/>
+          </a:fontRef>
+        </p:style>
+        <p:txBody>
+          <a:bodyPr rtlCol="0" anchor="ctr"/>
+          <a:lstStyle/>
+          <a:p>
+            <a:pPr algn="ctr"/>
+            <a:r>
+              <a:rPr lang="nl-NL" dirty="0"/>
+              <a:t>Operating System</a:t>
+            </a:r>
+          </a:p>
+        </p:txBody>
+      </p:sp>
+      <p:cxnSp>
+        <p:nvCxnSpPr>
+          <p:cNvPr id="13" name="Straight Arrow Connector 12">
+            <a:extLst>
+              <a:ext uri="{FF2B5EF4-FFF2-40B4-BE49-F238E27FC236}">
+                <a16:creationId xmlns:a16="http://schemas.microsoft.com/office/drawing/2014/main" id="{8265E0D1-D7B2-8FC7-CB34-5F6DF972F3AF}"/>
+              </a:ext>
+            </a:extLst>
+          </p:cNvPr>
+          <p:cNvCxnSpPr>
+            <a:stCxn id="8" idx="3"/>
+            <a:endCxn id="9" idx="1"/>
+          </p:cNvCxnSpPr>
+          <p:nvPr/>
+        </p:nvCxnSpPr>
+        <p:spPr>
+          <a:xfrm>
+            <a:off x="2506133" y="2159001"/>
+            <a:ext cx="1281289" cy="0"/>
+          </a:xfrm>
+          <a:prstGeom prst="straightConnector1">
+            <a:avLst/>
+          </a:prstGeom>
+          <a:ln>
+            <a:tailEnd type="triangle"/>
+          </a:ln>
+        </p:spPr>
+        <p:style>
+          <a:lnRef idx="3">
+            <a:schemeClr val="dk1"/>
+          </a:lnRef>
+          <a:fillRef idx="0">
+            <a:schemeClr val="dk1"/>
+          </a:fillRef>
+          <a:effectRef idx="2">
+            <a:schemeClr val="dk1"/>
+          </a:effectRef>
+          <a:fontRef idx="minor">
+            <a:schemeClr val="tx1"/>
+          </a:fontRef>
+        </p:style>
+      </p:cxnSp>
+      <p:cxnSp>
+        <p:nvCxnSpPr>
+          <p:cNvPr id="15" name="Straight Arrow Connector 14">
+            <a:extLst>
+              <a:ext uri="{FF2B5EF4-FFF2-40B4-BE49-F238E27FC236}">
+                <a16:creationId xmlns:a16="http://schemas.microsoft.com/office/drawing/2014/main" id="{8C3C5DD2-A631-1618-C932-ECFF2819726D}"/>
+              </a:ext>
+            </a:extLst>
+          </p:cNvPr>
+          <p:cNvCxnSpPr>
+            <a:stCxn id="9" idx="3"/>
+            <a:endCxn id="10" idx="1"/>
+          </p:cNvCxnSpPr>
+          <p:nvPr/>
+        </p:nvCxnSpPr>
+        <p:spPr>
+          <a:xfrm>
+            <a:off x="5455355" y="2159001"/>
+            <a:ext cx="1281289" cy="0"/>
+          </a:xfrm>
+          <a:prstGeom prst="straightConnector1">
+            <a:avLst/>
+          </a:prstGeom>
+          <a:ln>
+            <a:tailEnd type="triangle"/>
+          </a:ln>
+        </p:spPr>
+        <p:style>
+          <a:lnRef idx="3">
+            <a:schemeClr val="dk1"/>
+          </a:lnRef>
+          <a:fillRef idx="0">
+            <a:schemeClr val="dk1"/>
+          </a:fillRef>
+          <a:effectRef idx="2">
+            <a:schemeClr val="dk1"/>
+          </a:effectRef>
+          <a:fontRef idx="minor">
+            <a:schemeClr val="tx1"/>
+          </a:fontRef>
+        </p:style>
+      </p:cxnSp>
+      <p:cxnSp>
+        <p:nvCxnSpPr>
+          <p:cNvPr id="17" name="Straight Arrow Connector 16">
+            <a:extLst>
+              <a:ext uri="{FF2B5EF4-FFF2-40B4-BE49-F238E27FC236}">
+                <a16:creationId xmlns:a16="http://schemas.microsoft.com/office/drawing/2014/main" id="{D389E14B-226F-6202-8A59-1853118CADB2}"/>
+              </a:ext>
+            </a:extLst>
+          </p:cNvPr>
+          <p:cNvCxnSpPr>
+            <a:stCxn id="10" idx="3"/>
+            <a:endCxn id="11" idx="1"/>
+          </p:cNvCxnSpPr>
+          <p:nvPr/>
+        </p:nvCxnSpPr>
+        <p:spPr>
+          <a:xfrm>
+            <a:off x="8404577" y="2159001"/>
+            <a:ext cx="1281290" cy="0"/>
+          </a:xfrm>
+          <a:prstGeom prst="straightConnector1">
+            <a:avLst/>
+          </a:prstGeom>
+          <a:ln>
+            <a:tailEnd type="triangle"/>
+          </a:ln>
+        </p:spPr>
+        <p:style>
+          <a:lnRef idx="3">
+            <a:schemeClr val="dk1"/>
+          </a:lnRef>
+          <a:fillRef idx="0">
+            <a:schemeClr val="dk1"/>
+          </a:fillRef>
+          <a:effectRef idx="2">
+            <a:schemeClr val="dk1"/>
+          </a:effectRef>
+          <a:fontRef idx="minor">
+            <a:schemeClr val="tx1"/>
+          </a:fontRef>
+        </p:style>
+      </p:cxnSp>
+      <p:sp>
+        <p:nvSpPr>
+          <p:cNvPr id="20" name="Content Placeholder 2">
+            <a:extLst>
+              <a:ext uri="{FF2B5EF4-FFF2-40B4-BE49-F238E27FC236}">
+                <a16:creationId xmlns:a16="http://schemas.microsoft.com/office/drawing/2014/main" id="{A79043AF-CAAF-445D-CBBE-67C45DBAB764}"/>
+              </a:ext>
+            </a:extLst>
+          </p:cNvPr>
+          <p:cNvSpPr>
+            <a:spLocks noGrp="1"/>
+          </p:cNvSpPr>
+          <p:nvPr>
+            <p:ph idx="1"/>
+          </p:nvPr>
+        </p:nvSpPr>
+        <p:spPr>
+          <a:xfrm>
+            <a:off x="2650065" y="3974574"/>
+            <a:ext cx="6891867" cy="1215492"/>
+          </a:xfrm>
+        </p:spPr>
+        <p:txBody>
+          <a:bodyPr>
+            <a:normAutofit/>
+          </a:bodyPr>
+          <a:lstStyle/>
+          <a:p>
+            <a:r>
+              <a:rPr lang="nl-NL" sz="2000" noProof="0" dirty="0"/>
+              <a:t>Python code wordt geïnterpreteerd (i.t.t. gecompileerd).</a:t>
+            </a:r>
+          </a:p>
+          <a:p>
+            <a:r>
+              <a:rPr lang="nl-NL" sz="2000" noProof="0" dirty="0"/>
+              <a:t>Python interpreter is vereist om de code uit te kunnen voeren.</a:t>
+            </a:r>
+          </a:p>
+        </p:txBody>
+      </p:sp>
+    </p:spTree>
+    <p:extLst>
+      <p:ext uri="{BB962C8B-B14F-4D97-AF65-F5344CB8AC3E}">
+        <p14:creationId xmlns:p14="http://schemas.microsoft.com/office/powerpoint/2010/main" val="440605360"/>
+      </p:ext>
+    </p:extLst>
+  </p:cSld>
+  <p:clrMapOvr>
+    <a:masterClrMapping/>
+  </p:clrMapOvr>
+</p:sld>
+</file>
+
+<file path=ppt/slides/slide50.xml><?xml version="1.0" encoding="utf-8"?>
 <p:sld xmlns:a="http://schemas.openxmlformats.org/drawingml/2006/main" xmlns:r="http://schemas.openxmlformats.org/officeDocument/2006/relationships" xmlns:p="http://schemas.openxmlformats.org/presentationml/2006/main">
   <p:cSld>
     <p:spTree>
@@ -23943,7 +25598,7 @@
 </p:sld>
 </file>
 
-<file path=ppt/slides/slide49.xml><?xml version="1.0" encoding="utf-8"?>
+<file path=ppt/slides/slide51.xml><?xml version="1.0" encoding="utf-8"?>
 <p:sld xmlns:a="http://schemas.openxmlformats.org/drawingml/2006/main" xmlns:r="http://schemas.openxmlformats.org/officeDocument/2006/relationships" xmlns:p="http://schemas.openxmlformats.org/presentationml/2006/main">
   <p:cSld>
     <p:spTree>
@@ -24414,426 +26069,6 @@
     <p:extLst>
       <p:ext uri="{BB962C8B-B14F-4D97-AF65-F5344CB8AC3E}">
         <p14:creationId xmlns:p14="http://schemas.microsoft.com/office/powerpoint/2010/main" val="2784587510"/>
-      </p:ext>
-    </p:extLst>
-  </p:cSld>
-  <p:clrMapOvr>
-    <a:masterClrMapping/>
-  </p:clrMapOvr>
-</p:sld>
-</file>
-
-<file path=ppt/slides/slide5.xml><?xml version="1.0" encoding="utf-8"?>
-<p:sld xmlns:a="http://schemas.openxmlformats.org/drawingml/2006/main" xmlns:r="http://schemas.openxmlformats.org/officeDocument/2006/relationships" xmlns:p="http://schemas.openxmlformats.org/presentationml/2006/main">
-  <p:cSld>
-    <p:spTree>
-      <p:nvGrpSpPr>
-        <p:cNvPr id="1" name=""/>
-        <p:cNvGrpSpPr/>
-        <p:nvPr/>
-      </p:nvGrpSpPr>
-      <p:grpSpPr>
-        <a:xfrm>
-          <a:off x="0" y="0"/>
-          <a:ext cx="0" cy="0"/>
-          <a:chOff x="0" y="0"/>
-          <a:chExt cx="0" cy="0"/>
-        </a:xfrm>
-      </p:grpSpPr>
-      <p:sp>
-        <p:nvSpPr>
-          <p:cNvPr id="2" name="Title 1">
-            <a:extLst>
-              <a:ext uri="{FF2B5EF4-FFF2-40B4-BE49-F238E27FC236}">
-                <a16:creationId xmlns:a16="http://schemas.microsoft.com/office/drawing/2014/main" id="{39A1D606-8DD1-369C-5C09-471CDD551AD5}"/>
-              </a:ext>
-            </a:extLst>
-          </p:cNvPr>
-          <p:cNvSpPr>
-            <a:spLocks noGrp="1"/>
-          </p:cNvSpPr>
-          <p:nvPr>
-            <p:ph type="title"/>
-          </p:nvPr>
-        </p:nvSpPr>
-        <p:spPr>
-          <a:xfrm>
-            <a:off x="838200" y="365126"/>
-            <a:ext cx="10515600" cy="718608"/>
-          </a:xfrm>
-        </p:spPr>
-        <p:txBody>
-          <a:bodyPr>
-            <a:normAutofit/>
-          </a:bodyPr>
-          <a:lstStyle/>
-          <a:p>
-            <a:r>
-              <a:rPr lang="nl-NL" sz="3600" noProof="0" dirty="0"/>
-              <a:t>Hoe werkt Python?</a:t>
-            </a:r>
-          </a:p>
-        </p:txBody>
-      </p:sp>
-      <p:sp>
-        <p:nvSpPr>
-          <p:cNvPr id="8" name="Rectangle 7">
-            <a:extLst>
-              <a:ext uri="{FF2B5EF4-FFF2-40B4-BE49-F238E27FC236}">
-                <a16:creationId xmlns:a16="http://schemas.microsoft.com/office/drawing/2014/main" id="{8F8A90BB-468A-6D0A-002C-262602B18B4B}"/>
-              </a:ext>
-            </a:extLst>
-          </p:cNvPr>
-          <p:cNvSpPr/>
-          <p:nvPr/>
-        </p:nvSpPr>
-        <p:spPr>
-          <a:xfrm>
-            <a:off x="838200" y="1667934"/>
-            <a:ext cx="1667933" cy="982134"/>
-          </a:xfrm>
-          <a:prstGeom prst="rect">
-            <a:avLst/>
-          </a:prstGeom>
-        </p:spPr>
-        <p:style>
-          <a:lnRef idx="1">
-            <a:schemeClr val="accent4"/>
-          </a:lnRef>
-          <a:fillRef idx="2">
-            <a:schemeClr val="accent4"/>
-          </a:fillRef>
-          <a:effectRef idx="1">
-            <a:schemeClr val="accent4"/>
-          </a:effectRef>
-          <a:fontRef idx="minor">
-            <a:schemeClr val="dk1"/>
-          </a:fontRef>
-        </p:style>
-        <p:txBody>
-          <a:bodyPr rtlCol="0" anchor="ctr"/>
-          <a:lstStyle/>
-          <a:p>
-            <a:pPr algn="ctr"/>
-            <a:r>
-              <a:rPr lang="nl-NL" dirty="0"/>
-              <a:t>Python code</a:t>
-            </a:r>
-          </a:p>
-        </p:txBody>
-      </p:sp>
-      <p:sp>
-        <p:nvSpPr>
-          <p:cNvPr id="9" name="Rectangle 8">
-            <a:extLst>
-              <a:ext uri="{FF2B5EF4-FFF2-40B4-BE49-F238E27FC236}">
-                <a16:creationId xmlns:a16="http://schemas.microsoft.com/office/drawing/2014/main" id="{4F0F36A3-E63F-438C-664E-6CCFFF26537D}"/>
-              </a:ext>
-            </a:extLst>
-          </p:cNvPr>
-          <p:cNvSpPr/>
-          <p:nvPr/>
-        </p:nvSpPr>
-        <p:spPr>
-          <a:xfrm>
-            <a:off x="3787422" y="1667934"/>
-            <a:ext cx="1667933" cy="982134"/>
-          </a:xfrm>
-          <a:prstGeom prst="rect">
-            <a:avLst/>
-          </a:prstGeom>
-        </p:spPr>
-        <p:style>
-          <a:lnRef idx="1">
-            <a:schemeClr val="accent5"/>
-          </a:lnRef>
-          <a:fillRef idx="2">
-            <a:schemeClr val="accent5"/>
-          </a:fillRef>
-          <a:effectRef idx="1">
-            <a:schemeClr val="accent5"/>
-          </a:effectRef>
-          <a:fontRef idx="minor">
-            <a:schemeClr val="dk1"/>
-          </a:fontRef>
-        </p:style>
-        <p:txBody>
-          <a:bodyPr rtlCol="0" anchor="ctr"/>
-          <a:lstStyle/>
-          <a:p>
-            <a:pPr algn="ctr"/>
-            <a:r>
-              <a:rPr lang="nl-NL" dirty="0"/>
-              <a:t>Python interpreter</a:t>
-            </a:r>
-          </a:p>
-        </p:txBody>
-      </p:sp>
-      <p:sp>
-        <p:nvSpPr>
-          <p:cNvPr id="10" name="Rectangle 9">
-            <a:extLst>
-              <a:ext uri="{FF2B5EF4-FFF2-40B4-BE49-F238E27FC236}">
-                <a16:creationId xmlns:a16="http://schemas.microsoft.com/office/drawing/2014/main" id="{4176E6D8-DC0A-C2D6-09E4-B96454281B96}"/>
-              </a:ext>
-            </a:extLst>
-          </p:cNvPr>
-          <p:cNvSpPr/>
-          <p:nvPr/>
-        </p:nvSpPr>
-        <p:spPr>
-          <a:xfrm>
-            <a:off x="6736644" y="1667934"/>
-            <a:ext cx="1667933" cy="982134"/>
-          </a:xfrm>
-          <a:prstGeom prst="rect">
-            <a:avLst/>
-          </a:prstGeom>
-        </p:spPr>
-        <p:style>
-          <a:lnRef idx="1">
-            <a:schemeClr val="accent6"/>
-          </a:lnRef>
-          <a:fillRef idx="2">
-            <a:schemeClr val="accent6"/>
-          </a:fillRef>
-          <a:effectRef idx="1">
-            <a:schemeClr val="accent6"/>
-          </a:effectRef>
-          <a:fontRef idx="minor">
-            <a:schemeClr val="dk1"/>
-          </a:fontRef>
-        </p:style>
-        <p:txBody>
-          <a:bodyPr rtlCol="0" anchor="ctr"/>
-          <a:lstStyle/>
-          <a:p>
-            <a:pPr algn="ctr"/>
-            <a:r>
-              <a:rPr lang="nl-NL" dirty="0"/>
-              <a:t>C instructies / byte code</a:t>
-            </a:r>
-          </a:p>
-        </p:txBody>
-      </p:sp>
-      <p:sp>
-        <p:nvSpPr>
-          <p:cNvPr id="11" name="Rectangle 10">
-            <a:extLst>
-              <a:ext uri="{FF2B5EF4-FFF2-40B4-BE49-F238E27FC236}">
-                <a16:creationId xmlns:a16="http://schemas.microsoft.com/office/drawing/2014/main" id="{B0FD3C67-D8CC-C794-10C4-88ED519F20DB}"/>
-              </a:ext>
-            </a:extLst>
-          </p:cNvPr>
-          <p:cNvSpPr/>
-          <p:nvPr/>
-        </p:nvSpPr>
-        <p:spPr>
-          <a:xfrm>
-            <a:off x="9685867" y="1667934"/>
-            <a:ext cx="1667933" cy="982134"/>
-          </a:xfrm>
-          <a:prstGeom prst="rect">
-            <a:avLst/>
-          </a:prstGeom>
-        </p:spPr>
-        <p:style>
-          <a:lnRef idx="1">
-            <a:schemeClr val="accent5"/>
-          </a:lnRef>
-          <a:fillRef idx="2">
-            <a:schemeClr val="accent5"/>
-          </a:fillRef>
-          <a:effectRef idx="1">
-            <a:schemeClr val="accent5"/>
-          </a:effectRef>
-          <a:fontRef idx="minor">
-            <a:schemeClr val="dk1"/>
-          </a:fontRef>
-        </p:style>
-        <p:txBody>
-          <a:bodyPr rtlCol="0" anchor="ctr"/>
-          <a:lstStyle/>
-          <a:p>
-            <a:pPr algn="ctr"/>
-            <a:r>
-              <a:rPr lang="nl-NL" dirty="0"/>
-              <a:t>Operating System</a:t>
-            </a:r>
-          </a:p>
-        </p:txBody>
-      </p:sp>
-      <p:cxnSp>
-        <p:nvCxnSpPr>
-          <p:cNvPr id="13" name="Straight Arrow Connector 12">
-            <a:extLst>
-              <a:ext uri="{FF2B5EF4-FFF2-40B4-BE49-F238E27FC236}">
-                <a16:creationId xmlns:a16="http://schemas.microsoft.com/office/drawing/2014/main" id="{8265E0D1-D7B2-8FC7-CB34-5F6DF972F3AF}"/>
-              </a:ext>
-            </a:extLst>
-          </p:cNvPr>
-          <p:cNvCxnSpPr>
-            <a:stCxn id="8" idx="3"/>
-            <a:endCxn id="9" idx="1"/>
-          </p:cNvCxnSpPr>
-          <p:nvPr/>
-        </p:nvCxnSpPr>
-        <p:spPr>
-          <a:xfrm>
-            <a:off x="2506133" y="2159001"/>
-            <a:ext cx="1281289" cy="0"/>
-          </a:xfrm>
-          <a:prstGeom prst="straightConnector1">
-            <a:avLst/>
-          </a:prstGeom>
-          <a:ln>
-            <a:tailEnd type="triangle"/>
-          </a:ln>
-        </p:spPr>
-        <p:style>
-          <a:lnRef idx="3">
-            <a:schemeClr val="dk1"/>
-          </a:lnRef>
-          <a:fillRef idx="0">
-            <a:schemeClr val="dk1"/>
-          </a:fillRef>
-          <a:effectRef idx="2">
-            <a:schemeClr val="dk1"/>
-          </a:effectRef>
-          <a:fontRef idx="minor">
-            <a:schemeClr val="tx1"/>
-          </a:fontRef>
-        </p:style>
-      </p:cxnSp>
-      <p:cxnSp>
-        <p:nvCxnSpPr>
-          <p:cNvPr id="15" name="Straight Arrow Connector 14">
-            <a:extLst>
-              <a:ext uri="{FF2B5EF4-FFF2-40B4-BE49-F238E27FC236}">
-                <a16:creationId xmlns:a16="http://schemas.microsoft.com/office/drawing/2014/main" id="{8C3C5DD2-A631-1618-C932-ECFF2819726D}"/>
-              </a:ext>
-            </a:extLst>
-          </p:cNvPr>
-          <p:cNvCxnSpPr>
-            <a:stCxn id="9" idx="3"/>
-            <a:endCxn id="10" idx="1"/>
-          </p:cNvCxnSpPr>
-          <p:nvPr/>
-        </p:nvCxnSpPr>
-        <p:spPr>
-          <a:xfrm>
-            <a:off x="5455355" y="2159001"/>
-            <a:ext cx="1281289" cy="0"/>
-          </a:xfrm>
-          <a:prstGeom prst="straightConnector1">
-            <a:avLst/>
-          </a:prstGeom>
-          <a:ln>
-            <a:tailEnd type="triangle"/>
-          </a:ln>
-        </p:spPr>
-        <p:style>
-          <a:lnRef idx="3">
-            <a:schemeClr val="dk1"/>
-          </a:lnRef>
-          <a:fillRef idx="0">
-            <a:schemeClr val="dk1"/>
-          </a:fillRef>
-          <a:effectRef idx="2">
-            <a:schemeClr val="dk1"/>
-          </a:effectRef>
-          <a:fontRef idx="minor">
-            <a:schemeClr val="tx1"/>
-          </a:fontRef>
-        </p:style>
-      </p:cxnSp>
-      <p:cxnSp>
-        <p:nvCxnSpPr>
-          <p:cNvPr id="17" name="Straight Arrow Connector 16">
-            <a:extLst>
-              <a:ext uri="{FF2B5EF4-FFF2-40B4-BE49-F238E27FC236}">
-                <a16:creationId xmlns:a16="http://schemas.microsoft.com/office/drawing/2014/main" id="{D389E14B-226F-6202-8A59-1853118CADB2}"/>
-              </a:ext>
-            </a:extLst>
-          </p:cNvPr>
-          <p:cNvCxnSpPr>
-            <a:stCxn id="10" idx="3"/>
-            <a:endCxn id="11" idx="1"/>
-          </p:cNvCxnSpPr>
-          <p:nvPr/>
-        </p:nvCxnSpPr>
-        <p:spPr>
-          <a:xfrm>
-            <a:off x="8404577" y="2159001"/>
-            <a:ext cx="1281290" cy="0"/>
-          </a:xfrm>
-          <a:prstGeom prst="straightConnector1">
-            <a:avLst/>
-          </a:prstGeom>
-          <a:ln>
-            <a:tailEnd type="triangle"/>
-          </a:ln>
-        </p:spPr>
-        <p:style>
-          <a:lnRef idx="3">
-            <a:schemeClr val="dk1"/>
-          </a:lnRef>
-          <a:fillRef idx="0">
-            <a:schemeClr val="dk1"/>
-          </a:fillRef>
-          <a:effectRef idx="2">
-            <a:schemeClr val="dk1"/>
-          </a:effectRef>
-          <a:fontRef idx="minor">
-            <a:schemeClr val="tx1"/>
-          </a:fontRef>
-        </p:style>
-      </p:cxnSp>
-      <p:sp>
-        <p:nvSpPr>
-          <p:cNvPr id="20" name="Content Placeholder 2">
-            <a:extLst>
-              <a:ext uri="{FF2B5EF4-FFF2-40B4-BE49-F238E27FC236}">
-                <a16:creationId xmlns:a16="http://schemas.microsoft.com/office/drawing/2014/main" id="{A79043AF-CAAF-445D-CBBE-67C45DBAB764}"/>
-              </a:ext>
-            </a:extLst>
-          </p:cNvPr>
-          <p:cNvSpPr>
-            <a:spLocks noGrp="1"/>
-          </p:cNvSpPr>
-          <p:nvPr>
-            <p:ph idx="1"/>
-          </p:nvPr>
-        </p:nvSpPr>
-        <p:spPr>
-          <a:xfrm>
-            <a:off x="2650065" y="3974574"/>
-            <a:ext cx="6891867" cy="1215492"/>
-          </a:xfrm>
-        </p:spPr>
-        <p:txBody>
-          <a:bodyPr>
-            <a:normAutofit/>
-          </a:bodyPr>
-          <a:lstStyle/>
-          <a:p>
-            <a:r>
-              <a:rPr lang="nl-NL" sz="2000" noProof="0" dirty="0"/>
-              <a:t>Python code wordt geïnterpreteerd (i.t.t. gecompileerd).</a:t>
-            </a:r>
-          </a:p>
-          <a:p>
-            <a:r>
-              <a:rPr lang="nl-NL" sz="2000" noProof="0" dirty="0"/>
-              <a:t>Python interpreter is vereist om de code uit te kunnen voeren.</a:t>
-            </a:r>
-          </a:p>
-        </p:txBody>
-      </p:sp>
-    </p:spTree>
-    <p:extLst>
-      <p:ext uri="{BB962C8B-B14F-4D97-AF65-F5344CB8AC3E}">
-        <p14:creationId xmlns:p14="http://schemas.microsoft.com/office/powerpoint/2010/main" val="440605360"/>
       </p:ext>
     </p:extLst>
   </p:cSld>

</xml_diff>

<commit_message>
Updated Python trainees part 1
</commit_message>
<xml_diff>
--- a/python_trainees/1_basics_classes/python_traineeship_1.pptx
+++ b/python_trainees/1_basics_classes/python_traineeship_1.pptx
@@ -11296,7 +11296,21 @@
                 <a:latin typeface="Courier New" panose="02070309020205020404" pitchFamily="49" charset="0"/>
                 <a:cs typeface="Courier New" panose="02070309020205020404" pitchFamily="49" charset="0"/>
               </a:rPr>
-              <a:t>"Henk,44".split(",")</a:t>
+              <a:t>"</a:t>
+            </a:r>
+            <a:r>
+              <a:rPr lang="nl-NL" sz="2000" noProof="0" dirty="0" err="1">
+                <a:latin typeface="Courier New" panose="02070309020205020404" pitchFamily="49" charset="0"/>
+                <a:cs typeface="Courier New" panose="02070309020205020404" pitchFamily="49" charset="0"/>
+              </a:rPr>
+              <a:t>John,Jane".split</a:t>
+            </a:r>
+            <a:r>
+              <a:rPr lang="nl-NL" sz="2000" noProof="0" dirty="0">
+                <a:latin typeface="Courier New" panose="02070309020205020404" pitchFamily="49" charset="0"/>
+                <a:cs typeface="Courier New" panose="02070309020205020404" pitchFamily="49" charset="0"/>
+              </a:rPr>
+              <a:t>(",")</a:t>
             </a:r>
           </a:p>
           <a:p>
@@ -11337,7 +11351,7 @@
                 <a:latin typeface="Courier New" panose="02070309020205020404" pitchFamily="49" charset="0"/>
                 <a:cs typeface="Courier New" panose="02070309020205020404" pitchFamily="49" charset="0"/>
               </a:rPr>
-              <a:t>(["Henk", "44"])</a:t>
+              <a:t>(["John", "Jane"])</a:t>
             </a:r>
           </a:p>
           <a:p>
@@ -11771,21 +11785,21 @@
                 <a:latin typeface="Courier New" panose="02070309020205020404" pitchFamily="49" charset="0"/>
                 <a:cs typeface="Courier New" panose="02070309020205020404" pitchFamily="49" charset="0"/>
               </a:rPr>
-              <a:t>{"name": "Jan", "</a:t>
+              <a:t>{"name": "John", "</a:t>
             </a:r>
             <a:r>
               <a:rPr lang="nl-NL" sz="2000" noProof="0" dirty="0" err="1">
                 <a:latin typeface="Courier New" panose="02070309020205020404" pitchFamily="49" charset="0"/>
                 <a:cs typeface="Courier New" panose="02070309020205020404" pitchFamily="49" charset="0"/>
               </a:rPr>
-              <a:t>last_name</a:t>
+              <a:t>lastname</a:t>
             </a:r>
             <a:r>
               <a:rPr lang="nl-NL" sz="2000" noProof="0" dirty="0">
                 <a:latin typeface="Courier New" panose="02070309020205020404" pitchFamily="49" charset="0"/>
                 <a:cs typeface="Courier New" panose="02070309020205020404" pitchFamily="49" charset="0"/>
               </a:rPr>
-              <a:t>": "Jansen", "score": 7.6245}</a:t>
+              <a:t>": "Doe", "score": 7.6245}</a:t>
             </a:r>
           </a:p>
           <a:p>
@@ -21044,7 +21058,7 @@
               <a:buNone/>
             </a:pPr>
             <a:r>
-              <a:rPr lang="nl-NL" sz="1600" b="1" dirty="0">
+              <a:rPr lang="nl-NL" sz="1400" b="1" dirty="0">
                 <a:latin typeface="Courier New" panose="02070309020205020404" pitchFamily="49" charset="0"/>
                 <a:cs typeface="Courier New" panose="02070309020205020404" pitchFamily="49" charset="0"/>
               </a:rPr>
@@ -21056,7 +21070,7 @@
               <a:buFont typeface="Arial" panose="020B0604020202020204" pitchFamily="34" charset="0"/>
               <a:buNone/>
             </a:pPr>
-            <a:endParaRPr lang="nl-NL" sz="1600" dirty="0">
+            <a:endParaRPr lang="nl-NL" sz="1400" dirty="0">
               <a:latin typeface="Courier New" panose="02070309020205020404" pitchFamily="49" charset="0"/>
               <a:cs typeface="Courier New" panose="02070309020205020404" pitchFamily="49" charset="0"/>
             </a:endParaRPr>
@@ -21067,32 +21081,46 @@
               <a:buNone/>
             </a:pPr>
             <a:r>
-              <a:rPr lang="nl-NL" sz="1600" dirty="0">
-                <a:latin typeface="Courier New" panose="02070309020205020404" pitchFamily="49" charset="0"/>
-                <a:cs typeface="Courier New" panose="02070309020205020404" pitchFamily="49" charset="0"/>
-              </a:rPr>
-              <a:t>  voor = "Jan"</a:t>
-            </a:r>
-          </a:p>
-          <a:p>
-            <a:pPr marL="0" indent="0">
-              <a:buFont typeface="Arial" panose="020B0604020202020204" pitchFamily="34" charset="0"/>
-              <a:buNone/>
-            </a:pPr>
-            <a:r>
-              <a:rPr lang="nl-NL" sz="1600" dirty="0">
-                <a:latin typeface="Courier New" panose="02070309020205020404" pitchFamily="49" charset="0"/>
-                <a:cs typeface="Courier New" panose="02070309020205020404" pitchFamily="49" charset="0"/>
-              </a:rPr>
-              <a:t>  achter = "Jansen"</a:t>
-            </a:r>
-          </a:p>
-          <a:p>
-            <a:pPr marL="0" indent="0">
-              <a:buFont typeface="Arial" panose="020B0604020202020204" pitchFamily="34" charset="0"/>
-              <a:buNone/>
-            </a:pPr>
-            <a:endParaRPr lang="nl-NL" sz="1600" b="1" dirty="0">
+              <a:rPr lang="nl-NL" sz="1400" dirty="0">
+                <a:latin typeface="Courier New" panose="02070309020205020404" pitchFamily="49" charset="0"/>
+                <a:cs typeface="Courier New" panose="02070309020205020404" pitchFamily="49" charset="0"/>
+              </a:rPr>
+              <a:t>  name = "John"</a:t>
+            </a:r>
+          </a:p>
+          <a:p>
+            <a:pPr marL="0" indent="0">
+              <a:buFont typeface="Arial" panose="020B0604020202020204" pitchFamily="34" charset="0"/>
+              <a:buNone/>
+            </a:pPr>
+            <a:r>
+              <a:rPr lang="nl-NL" sz="1400" dirty="0">
+                <a:latin typeface="Courier New" panose="02070309020205020404" pitchFamily="49" charset="0"/>
+                <a:cs typeface="Courier New" panose="02070309020205020404" pitchFamily="49" charset="0"/>
+              </a:rPr>
+              <a:t>  </a:t>
+            </a:r>
+            <a:r>
+              <a:rPr lang="nl-NL" sz="1400" dirty="0" err="1">
+                <a:latin typeface="Courier New" panose="02070309020205020404" pitchFamily="49" charset="0"/>
+                <a:cs typeface="Courier New" panose="02070309020205020404" pitchFamily="49" charset="0"/>
+              </a:rPr>
+              <a:t>lastname</a:t>
+            </a:r>
+            <a:r>
+              <a:rPr lang="nl-NL" sz="1400" dirty="0">
+                <a:latin typeface="Courier New" panose="02070309020205020404" pitchFamily="49" charset="0"/>
+                <a:cs typeface="Courier New" panose="02070309020205020404" pitchFamily="49" charset="0"/>
+              </a:rPr>
+              <a:t> = "Doe"</a:t>
+            </a:r>
+          </a:p>
+          <a:p>
+            <a:pPr marL="0" indent="0">
+              <a:buFont typeface="Arial" panose="020B0604020202020204" pitchFamily="34" charset="0"/>
+              <a:buNone/>
+            </a:pPr>
+            <a:endParaRPr lang="nl-NL" sz="1400" b="1" dirty="0">
               <a:latin typeface="Courier New" panose="02070309020205020404" pitchFamily="49" charset="0"/>
               <a:cs typeface="Courier New" panose="02070309020205020404" pitchFamily="49" charset="0"/>
             </a:endParaRPr>
@@ -21103,49 +21131,49 @@
               <a:buNone/>
             </a:pPr>
             <a:r>
-              <a:rPr lang="nl-NL" sz="1600" b="1" dirty="0">
+              <a:rPr lang="nl-NL" sz="1400" b="1" dirty="0">
                 <a:latin typeface="Courier New" panose="02070309020205020404" pitchFamily="49" charset="0"/>
                 <a:cs typeface="Courier New" panose="02070309020205020404" pitchFamily="49" charset="0"/>
               </a:rPr>
               <a:t>  </a:t>
             </a:r>
             <a:r>
-              <a:rPr lang="nl-NL" sz="1600" b="1" dirty="0" err="1">
+              <a:rPr lang="nl-NL" sz="1400" b="1" dirty="0" err="1">
                 <a:latin typeface="Courier New" panose="02070309020205020404" pitchFamily="49" charset="0"/>
                 <a:cs typeface="Courier New" panose="02070309020205020404" pitchFamily="49" charset="0"/>
               </a:rPr>
               <a:t>def</a:t>
             </a:r>
             <a:r>
-              <a:rPr lang="nl-NL" sz="1600" b="1" dirty="0">
+              <a:rPr lang="nl-NL" sz="1400" b="1" dirty="0">
                 <a:latin typeface="Courier New" panose="02070309020205020404" pitchFamily="49" charset="0"/>
                 <a:cs typeface="Courier New" panose="02070309020205020404" pitchFamily="49" charset="0"/>
               </a:rPr>
               <a:t> </a:t>
             </a:r>
             <a:r>
-              <a:rPr lang="nl-NL" sz="1600" b="1" dirty="0" err="1">
-                <a:latin typeface="Courier New" panose="02070309020205020404" pitchFamily="49" charset="0"/>
-                <a:cs typeface="Courier New" panose="02070309020205020404" pitchFamily="49" charset="0"/>
-              </a:rPr>
-              <a:t>volledige_naam</a:t>
-            </a:r>
-            <a:r>
-              <a:rPr lang="nl-NL" sz="1600" b="1" dirty="0">
+              <a:rPr lang="nl-NL" sz="1400" b="1" dirty="0" err="1">
+                <a:latin typeface="Courier New" panose="02070309020205020404" pitchFamily="49" charset="0"/>
+                <a:cs typeface="Courier New" panose="02070309020205020404" pitchFamily="49" charset="0"/>
+              </a:rPr>
+              <a:t>full_naam</a:t>
+            </a:r>
+            <a:r>
+              <a:rPr lang="nl-NL" sz="1400" b="1" dirty="0">
                 <a:latin typeface="Courier New" panose="02070309020205020404" pitchFamily="49" charset="0"/>
                 <a:cs typeface="Courier New" panose="02070309020205020404" pitchFamily="49" charset="0"/>
               </a:rPr>
               <a:t>(</a:t>
             </a:r>
             <a:r>
-              <a:rPr lang="nl-NL" sz="1600" b="1" dirty="0" err="1">
+              <a:rPr lang="nl-NL" sz="1400" b="1" dirty="0" err="1">
                 <a:latin typeface="Courier New" panose="02070309020205020404" pitchFamily="49" charset="0"/>
                 <a:cs typeface="Courier New" panose="02070309020205020404" pitchFamily="49" charset="0"/>
               </a:rPr>
               <a:t>self</a:t>
             </a:r>
             <a:r>
-              <a:rPr lang="nl-NL" sz="1600" b="1" dirty="0">
+              <a:rPr lang="nl-NL" sz="1400" b="1" dirty="0">
                 <a:latin typeface="Courier New" panose="02070309020205020404" pitchFamily="49" charset="0"/>
                 <a:cs typeface="Courier New" panose="02070309020205020404" pitchFamily="49" charset="0"/>
               </a:rPr>
@@ -21158,35 +21186,35 @@
               <a:buNone/>
             </a:pPr>
             <a:r>
-              <a:rPr lang="nl-NL" sz="1600" dirty="0">
+              <a:rPr lang="nl-NL" sz="1400" dirty="0">
                 <a:latin typeface="Courier New" panose="02070309020205020404" pitchFamily="49" charset="0"/>
                 <a:cs typeface="Courier New" panose="02070309020205020404" pitchFamily="49" charset="0"/>
               </a:rPr>
               <a:t>    return f"{</a:t>
             </a:r>
             <a:r>
-              <a:rPr lang="nl-NL" sz="1600" b="1" dirty="0" err="1">
-                <a:latin typeface="Courier New" panose="02070309020205020404" pitchFamily="49" charset="0"/>
-                <a:cs typeface="Courier New" panose="02070309020205020404" pitchFamily="49" charset="0"/>
-              </a:rPr>
-              <a:t>self.voor</a:t>
-            </a:r>
-            <a:r>
-              <a:rPr lang="nl-NL" sz="1600" dirty="0">
+              <a:rPr lang="nl-NL" sz="1400" b="1" dirty="0">
+                <a:latin typeface="Courier New" panose="02070309020205020404" pitchFamily="49" charset="0"/>
+                <a:cs typeface="Courier New" panose="02070309020205020404" pitchFamily="49" charset="0"/>
+              </a:rPr>
+              <a:t>self.name</a:t>
+            </a:r>
+            <a:r>
+              <a:rPr lang="nl-NL" sz="1400" dirty="0">
                 <a:latin typeface="Courier New" panose="02070309020205020404" pitchFamily="49" charset="0"/>
                 <a:cs typeface="Courier New" panose="02070309020205020404" pitchFamily="49" charset="0"/>
               </a:rPr>
               <a:t>} {</a:t>
             </a:r>
             <a:r>
-              <a:rPr lang="nl-NL" sz="1600" b="1" dirty="0" err="1">
-                <a:latin typeface="Courier New" panose="02070309020205020404" pitchFamily="49" charset="0"/>
-                <a:cs typeface="Courier New" panose="02070309020205020404" pitchFamily="49" charset="0"/>
-              </a:rPr>
-              <a:t>self.achter</a:t>
-            </a:r>
-            <a:r>
-              <a:rPr lang="nl-NL" sz="1600" dirty="0">
+              <a:rPr lang="nl-NL" sz="1400" b="1" dirty="0" err="1">
+                <a:latin typeface="Courier New" panose="02070309020205020404" pitchFamily="49" charset="0"/>
+                <a:cs typeface="Courier New" panose="02070309020205020404" pitchFamily="49" charset="0"/>
+              </a:rPr>
+              <a:t>self.lastname</a:t>
+            </a:r>
+            <a:r>
+              <a:rPr lang="nl-NL" sz="1400" dirty="0">
                 <a:latin typeface="Courier New" panose="02070309020205020404" pitchFamily="49" charset="0"/>
                 <a:cs typeface="Courier New" panose="02070309020205020404" pitchFamily="49" charset="0"/>
               </a:rPr>
@@ -21198,7 +21226,7 @@
               <a:buFont typeface="Arial" panose="020B0604020202020204" pitchFamily="34" charset="0"/>
               <a:buNone/>
             </a:pPr>
-            <a:endParaRPr lang="nl-NL" sz="1600" b="1" dirty="0">
+            <a:endParaRPr lang="nl-NL" sz="1400" b="1" dirty="0">
               <a:latin typeface="Courier New" panose="02070309020205020404" pitchFamily="49" charset="0"/>
               <a:cs typeface="Courier New" panose="02070309020205020404" pitchFamily="49" charset="0"/>
             </a:endParaRPr>
@@ -21209,35 +21237,49 @@
               <a:buNone/>
             </a:pPr>
             <a:r>
-              <a:rPr lang="nl-NL" sz="1600" b="1" dirty="0">
+              <a:rPr lang="nl-NL" sz="1400" b="1" dirty="0">
                 <a:latin typeface="Courier New" panose="02070309020205020404" pitchFamily="49" charset="0"/>
                 <a:cs typeface="Courier New" panose="02070309020205020404" pitchFamily="49" charset="0"/>
               </a:rPr>
               <a:t>  </a:t>
             </a:r>
             <a:r>
-              <a:rPr lang="nl-NL" sz="1600" b="1" dirty="0" err="1">
+              <a:rPr lang="nl-NL" sz="1400" b="1" dirty="0" err="1">
                 <a:latin typeface="Courier New" panose="02070309020205020404" pitchFamily="49" charset="0"/>
                 <a:cs typeface="Courier New" panose="02070309020205020404" pitchFamily="49" charset="0"/>
               </a:rPr>
               <a:t>def</a:t>
             </a:r>
             <a:r>
-              <a:rPr lang="nl-NL" sz="1600" b="1" dirty="0">
-                <a:latin typeface="Courier New" panose="02070309020205020404" pitchFamily="49" charset="0"/>
-                <a:cs typeface="Courier New" panose="02070309020205020404" pitchFamily="49" charset="0"/>
-              </a:rPr>
-              <a:t> groet(</a:t>
-            </a:r>
-            <a:r>
-              <a:rPr lang="nl-NL" sz="1600" b="1" dirty="0" err="1">
+              <a:rPr lang="nl-NL" sz="1400" b="1" dirty="0">
+                <a:latin typeface="Courier New" panose="02070309020205020404" pitchFamily="49" charset="0"/>
+                <a:cs typeface="Courier New" panose="02070309020205020404" pitchFamily="49" charset="0"/>
+              </a:rPr>
+              <a:t> </a:t>
+            </a:r>
+            <a:r>
+              <a:rPr lang="nl-NL" sz="1400" b="1" dirty="0" err="1">
+                <a:latin typeface="Courier New" panose="02070309020205020404" pitchFamily="49" charset="0"/>
+                <a:cs typeface="Courier New" panose="02070309020205020404" pitchFamily="49" charset="0"/>
+              </a:rPr>
+              <a:t>greeting</a:t>
+            </a:r>
+            <a:r>
+              <a:rPr lang="nl-NL" sz="1400" b="1" dirty="0">
+                <a:latin typeface="Courier New" panose="02070309020205020404" pitchFamily="49" charset="0"/>
+                <a:cs typeface="Courier New" panose="02070309020205020404" pitchFamily="49" charset="0"/>
+              </a:rPr>
+              <a:t>(</a:t>
+            </a:r>
+            <a:r>
+              <a:rPr lang="nl-NL" sz="1400" b="1" dirty="0" err="1">
                 <a:latin typeface="Courier New" panose="02070309020205020404" pitchFamily="49" charset="0"/>
                 <a:cs typeface="Courier New" panose="02070309020205020404" pitchFamily="49" charset="0"/>
               </a:rPr>
               <a:t>self</a:t>
             </a:r>
             <a:r>
-              <a:rPr lang="nl-NL" sz="1600" b="1" dirty="0">
+              <a:rPr lang="nl-NL" sz="1400" b="1" dirty="0">
                 <a:latin typeface="Courier New" panose="02070309020205020404" pitchFamily="49" charset="0"/>
                 <a:cs typeface="Courier New" panose="02070309020205020404" pitchFamily="49" charset="0"/>
               </a:rPr>
@@ -21250,35 +21292,35 @@
               <a:buNone/>
             </a:pPr>
             <a:r>
-              <a:rPr lang="nl-NL" sz="1600" dirty="0">
+              <a:rPr lang="nl-NL" sz="1400" dirty="0">
                 <a:latin typeface="Courier New" panose="02070309020205020404" pitchFamily="49" charset="0"/>
                 <a:cs typeface="Courier New" panose="02070309020205020404" pitchFamily="49" charset="0"/>
               </a:rPr>
               <a:t>    return </a:t>
             </a:r>
             <a:r>
-              <a:rPr lang="nl-NL" sz="1600" dirty="0" err="1">
-                <a:latin typeface="Courier New" panose="02070309020205020404" pitchFamily="49" charset="0"/>
-                <a:cs typeface="Courier New" panose="02070309020205020404" pitchFamily="49" charset="0"/>
-              </a:rPr>
-              <a:t>f"Hallo</a:t>
-            </a:r>
-            <a:r>
-              <a:rPr lang="nl-NL" sz="1600" dirty="0">
+              <a:rPr lang="nl-NL" sz="1400" dirty="0" err="1">
+                <a:latin typeface="Courier New" panose="02070309020205020404" pitchFamily="49" charset="0"/>
+                <a:cs typeface="Courier New" panose="02070309020205020404" pitchFamily="49" charset="0"/>
+              </a:rPr>
+              <a:t>f"Hello</a:t>
+            </a:r>
+            <a:r>
+              <a:rPr lang="nl-NL" sz="1400" dirty="0">
                 <a:latin typeface="Courier New" panose="02070309020205020404" pitchFamily="49" charset="0"/>
                 <a:cs typeface="Courier New" panose="02070309020205020404" pitchFamily="49" charset="0"/>
               </a:rPr>
               <a:t> {</a:t>
             </a:r>
             <a:r>
-              <a:rPr lang="nl-NL" sz="1600" b="1" dirty="0" err="1">
-                <a:latin typeface="Courier New" panose="02070309020205020404" pitchFamily="49" charset="0"/>
-                <a:cs typeface="Courier New" panose="02070309020205020404" pitchFamily="49" charset="0"/>
-              </a:rPr>
-              <a:t>self.voor</a:t>
-            </a:r>
-            <a:r>
-              <a:rPr lang="nl-NL" sz="1600" dirty="0">
+              <a:rPr lang="nl-NL" sz="1400" b="1" dirty="0">
+                <a:latin typeface="Courier New" panose="02070309020205020404" pitchFamily="49" charset="0"/>
+                <a:cs typeface="Courier New" panose="02070309020205020404" pitchFamily="49" charset="0"/>
+              </a:rPr>
+              <a:t>self.name</a:t>
+            </a:r>
+            <a:r>
+              <a:rPr lang="nl-NL" sz="1400" dirty="0">
                 <a:latin typeface="Courier New" panose="02070309020205020404" pitchFamily="49" charset="0"/>
                 <a:cs typeface="Courier New" panose="02070309020205020404" pitchFamily="49" charset="0"/>
               </a:rPr>
@@ -21701,19 +21743,19 @@
               <a:buNone/>
             </a:pPr>
             <a:r>
-              <a:rPr lang="nl-NL" sz="1600" b="1" dirty="0">
-                <a:latin typeface="Courier New" panose="02070309020205020404" pitchFamily="49" charset="0"/>
-                <a:cs typeface="Courier New" panose="02070309020205020404" pitchFamily="49" charset="0"/>
-              </a:rPr>
-              <a:t>class Persoon:</a:t>
-            </a:r>
-          </a:p>
-          <a:p>
-            <a:pPr marL="0" indent="0">
-              <a:buFont typeface="Arial" panose="020B0604020202020204" pitchFamily="34" charset="0"/>
-              <a:buNone/>
-            </a:pPr>
-            <a:endParaRPr lang="nl-NL" sz="1600" dirty="0">
+              <a:rPr lang="nl-NL" sz="1400" b="1" dirty="0">
+                <a:latin typeface="Courier New" panose="02070309020205020404" pitchFamily="49" charset="0"/>
+                <a:cs typeface="Courier New" panose="02070309020205020404" pitchFamily="49" charset="0"/>
+              </a:rPr>
+              <a:t>class Person:</a:t>
+            </a:r>
+          </a:p>
+          <a:p>
+            <a:pPr marL="0" indent="0">
+              <a:buFont typeface="Arial" panose="020B0604020202020204" pitchFamily="34" charset="0"/>
+              <a:buNone/>
+            </a:pPr>
+            <a:endParaRPr lang="nl-NL" sz="1400" dirty="0">
               <a:latin typeface="Courier New" panose="02070309020205020404" pitchFamily="49" charset="0"/>
               <a:cs typeface="Courier New" panose="02070309020205020404" pitchFamily="49" charset="0"/>
             </a:endParaRPr>
@@ -21724,115 +21766,115 @@
               <a:buNone/>
             </a:pPr>
             <a:r>
-              <a:rPr lang="nl-NL" sz="1600" dirty="0">
+              <a:rPr lang="nl-NL" sz="1400" dirty="0">
                 <a:latin typeface="Courier New" panose="02070309020205020404" pitchFamily="49" charset="0"/>
                 <a:cs typeface="Courier New" panose="02070309020205020404" pitchFamily="49" charset="0"/>
               </a:rPr>
               <a:t>  </a:t>
             </a:r>
             <a:r>
-              <a:rPr lang="nl-NL" sz="1600" b="1" dirty="0" err="1">
+              <a:rPr lang="nl-NL" sz="1400" b="1" dirty="0" err="1">
                 <a:latin typeface="Courier New" panose="02070309020205020404" pitchFamily="49" charset="0"/>
                 <a:cs typeface="Courier New" panose="02070309020205020404" pitchFamily="49" charset="0"/>
               </a:rPr>
               <a:t>def</a:t>
             </a:r>
             <a:r>
-              <a:rPr lang="nl-NL" sz="1600" b="1" dirty="0">
+              <a:rPr lang="nl-NL" sz="1400" b="1" dirty="0">
                 <a:latin typeface="Courier New" panose="02070309020205020404" pitchFamily="49" charset="0"/>
                 <a:cs typeface="Courier New" panose="02070309020205020404" pitchFamily="49" charset="0"/>
               </a:rPr>
               <a:t> __</a:t>
             </a:r>
             <a:r>
-              <a:rPr lang="nl-NL" sz="1600" b="1" dirty="0" err="1">
+              <a:rPr lang="nl-NL" sz="1400" b="1" dirty="0" err="1">
                 <a:latin typeface="Courier New" panose="02070309020205020404" pitchFamily="49" charset="0"/>
                 <a:cs typeface="Courier New" panose="02070309020205020404" pitchFamily="49" charset="0"/>
               </a:rPr>
               <a:t>init</a:t>
             </a:r>
             <a:r>
-              <a:rPr lang="nl-NL" sz="1600" b="1" dirty="0">
+              <a:rPr lang="nl-NL" sz="1400" b="1" dirty="0">
                 <a:latin typeface="Courier New" panose="02070309020205020404" pitchFamily="49" charset="0"/>
                 <a:cs typeface="Courier New" panose="02070309020205020404" pitchFamily="49" charset="0"/>
               </a:rPr>
               <a:t>__(</a:t>
             </a:r>
             <a:r>
-              <a:rPr lang="nl-NL" sz="1600" b="1" dirty="0" err="1">
+              <a:rPr lang="nl-NL" sz="1400" b="1" dirty="0" err="1">
                 <a:latin typeface="Courier New" panose="02070309020205020404" pitchFamily="49" charset="0"/>
                 <a:cs typeface="Courier New" panose="02070309020205020404" pitchFamily="49" charset="0"/>
               </a:rPr>
               <a:t>self</a:t>
             </a:r>
             <a:r>
-              <a:rPr lang="nl-NL" sz="1600" b="1" dirty="0">
-                <a:latin typeface="Courier New" panose="02070309020205020404" pitchFamily="49" charset="0"/>
-                <a:cs typeface="Courier New" panose="02070309020205020404" pitchFamily="49" charset="0"/>
-              </a:rPr>
-              <a:t>, naam, achternaam): </a:t>
-            </a:r>
-          </a:p>
-          <a:p>
-            <a:pPr marL="0" indent="0">
-              <a:buFont typeface="Arial" panose="020B0604020202020204" pitchFamily="34" charset="0"/>
-              <a:buNone/>
-            </a:pPr>
-            <a:r>
-              <a:rPr lang="nl-NL" sz="1600" dirty="0">
+              <a:rPr lang="nl-NL" sz="1400" b="1" dirty="0">
+                <a:latin typeface="Courier New" panose="02070309020205020404" pitchFamily="49" charset="0"/>
+                <a:cs typeface="Courier New" panose="02070309020205020404" pitchFamily="49" charset="0"/>
+              </a:rPr>
+              <a:t>, name, </a:t>
+            </a:r>
+            <a:r>
+              <a:rPr lang="nl-NL" sz="1400" b="1" dirty="0" err="1">
+                <a:latin typeface="Courier New" panose="02070309020205020404" pitchFamily="49" charset="0"/>
+                <a:cs typeface="Courier New" panose="02070309020205020404" pitchFamily="49" charset="0"/>
+              </a:rPr>
+              <a:t>lastname</a:t>
+            </a:r>
+            <a:r>
+              <a:rPr lang="nl-NL" sz="1400" b="1" dirty="0">
+                <a:latin typeface="Courier New" panose="02070309020205020404" pitchFamily="49" charset="0"/>
+                <a:cs typeface="Courier New" panose="02070309020205020404" pitchFamily="49" charset="0"/>
+              </a:rPr>
+              <a:t>): </a:t>
+            </a:r>
+          </a:p>
+          <a:p>
+            <a:pPr marL="0" indent="0">
+              <a:buFont typeface="Arial" panose="020B0604020202020204" pitchFamily="34" charset="0"/>
+              <a:buNone/>
+            </a:pPr>
+            <a:r>
+              <a:rPr lang="nl-NL" sz="1400" dirty="0">
+                <a:latin typeface="Courier New" panose="02070309020205020404" pitchFamily="49" charset="0"/>
+                <a:cs typeface="Courier New" panose="02070309020205020404" pitchFamily="49" charset="0"/>
+              </a:rPr>
+              <a:t>    self.name = name</a:t>
+            </a:r>
+          </a:p>
+          <a:p>
+            <a:pPr marL="0" indent="0">
+              <a:buFont typeface="Arial" panose="020B0604020202020204" pitchFamily="34" charset="0"/>
+              <a:buNone/>
+            </a:pPr>
+            <a:r>
+              <a:rPr lang="nl-NL" sz="1400" dirty="0">
                 <a:latin typeface="Courier New" panose="02070309020205020404" pitchFamily="49" charset="0"/>
                 <a:cs typeface="Courier New" panose="02070309020205020404" pitchFamily="49" charset="0"/>
               </a:rPr>
               <a:t>    </a:t>
             </a:r>
             <a:r>
-              <a:rPr lang="nl-NL" sz="1600" dirty="0" err="1">
-                <a:latin typeface="Courier New" panose="02070309020205020404" pitchFamily="49" charset="0"/>
-                <a:cs typeface="Courier New" panose="02070309020205020404" pitchFamily="49" charset="0"/>
-              </a:rPr>
-              <a:t>self.voor</a:t>
-            </a:r>
-            <a:r>
-              <a:rPr lang="nl-NL" sz="1600" dirty="0">
-                <a:latin typeface="Courier New" panose="02070309020205020404" pitchFamily="49" charset="0"/>
-                <a:cs typeface="Courier New" panose="02070309020205020404" pitchFamily="49" charset="0"/>
-              </a:rPr>
-              <a:t> = naam</a:t>
-            </a:r>
-          </a:p>
-          <a:p>
-            <a:pPr marL="0" indent="0">
-              <a:buFont typeface="Arial" panose="020B0604020202020204" pitchFamily="34" charset="0"/>
-              <a:buNone/>
-            </a:pPr>
-            <a:r>
-              <a:rPr lang="nl-NL" sz="1600" dirty="0">
-                <a:latin typeface="Courier New" panose="02070309020205020404" pitchFamily="49" charset="0"/>
-                <a:cs typeface="Courier New" panose="02070309020205020404" pitchFamily="49" charset="0"/>
-              </a:rPr>
-              <a:t>    </a:t>
-            </a:r>
-            <a:r>
-              <a:rPr lang="nl-NL" sz="1600" dirty="0" err="1">
-                <a:latin typeface="Courier New" panose="02070309020205020404" pitchFamily="49" charset="0"/>
-                <a:cs typeface="Courier New" panose="02070309020205020404" pitchFamily="49" charset="0"/>
-              </a:rPr>
-              <a:t>self.achter</a:t>
-            </a:r>
-            <a:r>
-              <a:rPr lang="nl-NL" sz="1600" dirty="0">
-                <a:latin typeface="Courier New" panose="02070309020205020404" pitchFamily="49" charset="0"/>
-                <a:cs typeface="Courier New" panose="02070309020205020404" pitchFamily="49" charset="0"/>
-              </a:rPr>
-              <a:t> = achternaam</a:t>
-            </a:r>
-          </a:p>
-          <a:p>
-            <a:pPr marL="0" indent="0">
-              <a:buFont typeface="Arial" panose="020B0604020202020204" pitchFamily="34" charset="0"/>
-              <a:buNone/>
-            </a:pPr>
-            <a:endParaRPr lang="nl-NL" sz="1600" b="1" dirty="0">
+              <a:rPr lang="nl-NL" sz="1400" dirty="0" err="1">
+                <a:latin typeface="Courier New" panose="02070309020205020404" pitchFamily="49" charset="0"/>
+                <a:cs typeface="Courier New" panose="02070309020205020404" pitchFamily="49" charset="0"/>
+              </a:rPr>
+              <a:t>self.lastname</a:t>
+            </a:r>
+            <a:r>
+              <a:rPr lang="nl-NL" sz="1400" dirty="0">
+                <a:latin typeface="Courier New" panose="02070309020205020404" pitchFamily="49" charset="0"/>
+                <a:cs typeface="Courier New" panose="02070309020205020404" pitchFamily="49" charset="0"/>
+              </a:rPr>
+              <a:t> = lastnaam</a:t>
+            </a:r>
+          </a:p>
+          <a:p>
+            <a:pPr marL="0" indent="0">
+              <a:buFont typeface="Arial" panose="020B0604020202020204" pitchFamily="34" charset="0"/>
+              <a:buNone/>
+            </a:pPr>
+            <a:endParaRPr lang="nl-NL" sz="1400" b="1" dirty="0">
               <a:latin typeface="Courier New" panose="02070309020205020404" pitchFamily="49" charset="0"/>
               <a:cs typeface="Courier New" panose="02070309020205020404" pitchFamily="49" charset="0"/>
             </a:endParaRPr>
@@ -21842,7 +21884,7 @@
               <a:buFont typeface="Arial" panose="020B0604020202020204" pitchFamily="34" charset="0"/>
               <a:buNone/>
             </a:pPr>
-            <a:endParaRPr lang="nl-NL" sz="1600" dirty="0">
+            <a:endParaRPr lang="nl-NL" sz="1400" dirty="0">
               <a:latin typeface="Courier New" panose="02070309020205020404" pitchFamily="49" charset="0"/>
               <a:cs typeface="Courier New" panose="02070309020205020404" pitchFamily="49" charset="0"/>
             </a:endParaRPr>
@@ -21853,78 +21895,106 @@
               <a:buNone/>
             </a:pPr>
             <a:r>
-              <a:rPr lang="nl-NL" sz="1600" dirty="0">
+              <a:rPr lang="nl-NL" sz="1400" dirty="0">
                 <a:latin typeface="Courier New" panose="02070309020205020404" pitchFamily="49" charset="0"/>
                 <a:cs typeface="Courier New" panose="02070309020205020404" pitchFamily="49" charset="0"/>
               </a:rPr>
               <a:t># </a:t>
             </a:r>
             <a:r>
-              <a:rPr lang="nl-NL" sz="1600" dirty="0" err="1">
-                <a:latin typeface="Courier New" panose="02070309020205020404" pitchFamily="49" charset="0"/>
-                <a:cs typeface="Courier New" panose="02070309020205020404" pitchFamily="49" charset="0"/>
-              </a:rPr>
-              <a:t>Initialiseer</a:t>
-            </a:r>
-            <a:r>
-              <a:rPr lang="nl-NL" sz="1600" dirty="0">
-                <a:latin typeface="Courier New" panose="02070309020205020404" pitchFamily="49" charset="0"/>
-                <a:cs typeface="Courier New" panose="02070309020205020404" pitchFamily="49" charset="0"/>
-              </a:rPr>
-              <a:t> personen</a:t>
-            </a:r>
-          </a:p>
-          <a:p>
-            <a:pPr marL="0" indent="0">
-              <a:buFont typeface="Arial" panose="020B0604020202020204" pitchFamily="34" charset="0"/>
-              <a:buNone/>
-            </a:pPr>
-            <a:r>
-              <a:rPr lang="nl-NL" sz="1600" dirty="0" err="1">
-                <a:latin typeface="Courier New" panose="02070309020205020404" pitchFamily="49" charset="0"/>
-                <a:cs typeface="Courier New" panose="02070309020205020404" pitchFamily="49" charset="0"/>
-              </a:rPr>
-              <a:t>henk</a:t>
-            </a:r>
-            <a:r>
-              <a:rPr lang="nl-NL" sz="1600" dirty="0">
+              <a:rPr lang="nl-NL" sz="1400" dirty="0" err="1">
+                <a:latin typeface="Courier New" panose="02070309020205020404" pitchFamily="49" charset="0"/>
+                <a:cs typeface="Courier New" panose="02070309020205020404" pitchFamily="49" charset="0"/>
+              </a:rPr>
+              <a:t>Initialize</a:t>
+            </a:r>
+            <a:r>
+              <a:rPr lang="nl-NL" sz="1400" dirty="0">
+                <a:latin typeface="Courier New" panose="02070309020205020404" pitchFamily="49" charset="0"/>
+                <a:cs typeface="Courier New" panose="02070309020205020404" pitchFamily="49" charset="0"/>
+              </a:rPr>
+              <a:t> persons</a:t>
+            </a:r>
+          </a:p>
+          <a:p>
+            <a:pPr marL="0" indent="0">
+              <a:buFont typeface="Arial" panose="020B0604020202020204" pitchFamily="34" charset="0"/>
+              <a:buNone/>
+            </a:pPr>
+            <a:r>
+              <a:rPr lang="nl-NL" sz="1400" dirty="0" err="1">
+                <a:latin typeface="Courier New" panose="02070309020205020404" pitchFamily="49" charset="0"/>
+                <a:cs typeface="Courier New" panose="02070309020205020404" pitchFamily="49" charset="0"/>
+              </a:rPr>
+              <a:t>john_doe</a:t>
+            </a:r>
+            <a:r>
+              <a:rPr lang="nl-NL" sz="1400" dirty="0">
                 <a:latin typeface="Courier New" panose="02070309020205020404" pitchFamily="49" charset="0"/>
                 <a:cs typeface="Courier New" panose="02070309020205020404" pitchFamily="49" charset="0"/>
               </a:rPr>
               <a:t> = </a:t>
             </a:r>
             <a:r>
-              <a:rPr lang="nl-NL" sz="1600" b="1" dirty="0">
-                <a:latin typeface="Courier New" panose="02070309020205020404" pitchFamily="49" charset="0"/>
-                <a:cs typeface="Courier New" panose="02070309020205020404" pitchFamily="49" charset="0"/>
-              </a:rPr>
-              <a:t>Persoon("Henk", "Jansen")</a:t>
-            </a:r>
-          </a:p>
-          <a:p>
-            <a:pPr marL="0" indent="0">
-              <a:buNone/>
-            </a:pPr>
-            <a:r>
-              <a:rPr lang="nl-NL" sz="1600" dirty="0" err="1">
-                <a:latin typeface="Courier New" panose="02070309020205020404" pitchFamily="49" charset="0"/>
-                <a:cs typeface="Courier New" panose="02070309020205020404" pitchFamily="49" charset="0"/>
-              </a:rPr>
-              <a:t>ingrid</a:t>
-            </a:r>
-            <a:r>
-              <a:rPr lang="nl-NL" sz="1600" dirty="0">
+              <a:rPr lang="nl-NL" sz="1400" b="1" dirty="0">
+                <a:latin typeface="Courier New" panose="02070309020205020404" pitchFamily="49" charset="0"/>
+                <a:cs typeface="Courier New" panose="02070309020205020404" pitchFamily="49" charset="0"/>
+              </a:rPr>
+              <a:t>Person(</a:t>
+            </a:r>
+            <a:r>
+              <a:rPr lang="nl-NL" sz="1400" dirty="0">
+                <a:latin typeface="Courier New" panose="02070309020205020404" pitchFamily="49" charset="0"/>
+                <a:cs typeface="Courier New" panose="02070309020205020404" pitchFamily="49" charset="0"/>
+              </a:rPr>
+              <a:t>"John", "Doe"</a:t>
+            </a:r>
+            <a:r>
+              <a:rPr lang="nl-NL" sz="1400" b="1" dirty="0">
+                <a:latin typeface="Courier New" panose="02070309020205020404" pitchFamily="49" charset="0"/>
+                <a:cs typeface="Courier New" panose="02070309020205020404" pitchFamily="49" charset="0"/>
+              </a:rPr>
+              <a:t>)</a:t>
+            </a:r>
+          </a:p>
+          <a:p>
+            <a:pPr marL="0" indent="0">
+              <a:buNone/>
+            </a:pPr>
+            <a:r>
+              <a:rPr lang="nl-NL" sz="1400" dirty="0" err="1">
+                <a:latin typeface="Courier New" panose="02070309020205020404" pitchFamily="49" charset="0"/>
+                <a:cs typeface="Courier New" panose="02070309020205020404" pitchFamily="49" charset="0"/>
+              </a:rPr>
+              <a:t>jane_doe</a:t>
+            </a:r>
+            <a:r>
+              <a:rPr lang="nl-NL" sz="1400" dirty="0">
                 <a:latin typeface="Courier New" panose="02070309020205020404" pitchFamily="49" charset="0"/>
                 <a:cs typeface="Courier New" panose="02070309020205020404" pitchFamily="49" charset="0"/>
               </a:rPr>
               <a:t> = </a:t>
             </a:r>
             <a:r>
-              <a:rPr lang="nl-NL" sz="1600" b="1" dirty="0">
-                <a:latin typeface="Courier New" panose="02070309020205020404" pitchFamily="49" charset="0"/>
-                <a:cs typeface="Courier New" panose="02070309020205020404" pitchFamily="49" charset="0"/>
-              </a:rPr>
-              <a:t>Persoon("Ingrid", "Maassen")</a:t>
+              <a:rPr lang="nl-NL" sz="1400" b="1" dirty="0">
+                <a:latin typeface="Courier New" panose="02070309020205020404" pitchFamily="49" charset="0"/>
+                <a:cs typeface="Courier New" panose="02070309020205020404" pitchFamily="49" charset="0"/>
+              </a:rPr>
+              <a:t>Person(</a:t>
+            </a:r>
+            <a:r>
+              <a:rPr lang="nl-NL" sz="1400" dirty="0">
+                <a:latin typeface="Courier New" panose="02070309020205020404" pitchFamily="49" charset="0"/>
+                <a:cs typeface="Courier New" panose="02070309020205020404" pitchFamily="49" charset="0"/>
+              </a:rPr>
+              <a:t>"Jane", "Doe"</a:t>
+            </a:r>
+            <a:r>
+              <a:rPr lang="nl-NL" sz="1400" b="1" dirty="0">
+                <a:latin typeface="Courier New" panose="02070309020205020404" pitchFamily="49" charset="0"/>
+                <a:cs typeface="Courier New" panose="02070309020205020404" pitchFamily="49" charset="0"/>
+              </a:rPr>
+              <a:t>)</a:t>
             </a:r>
           </a:p>
         </p:txBody>
@@ -22398,7 +22468,7 @@
                 <a:latin typeface="Courier New" panose="02070309020205020404" pitchFamily="49" charset="0"/>
                 <a:cs typeface="Courier New" panose="02070309020205020404" pitchFamily="49" charset="0"/>
               </a:rPr>
-              <a:t>class Persoon:</a:t>
+              <a:t>class Person:</a:t>
             </a:r>
           </a:p>
           <a:p>
@@ -22462,28 +22532,14 @@
                 <a:latin typeface="Courier New" panose="02070309020205020404" pitchFamily="49" charset="0"/>
                 <a:cs typeface="Courier New" panose="02070309020205020404" pitchFamily="49" charset="0"/>
               </a:rPr>
-              <a:t>    return f"{</a:t>
+              <a:t>    return f"{self.name} {</a:t>
             </a:r>
             <a:r>
               <a:rPr lang="nl-NL" sz="1400" dirty="0" err="1">
                 <a:latin typeface="Courier New" panose="02070309020205020404" pitchFamily="49" charset="0"/>
                 <a:cs typeface="Courier New" panose="02070309020205020404" pitchFamily="49" charset="0"/>
               </a:rPr>
-              <a:t>self.voor</a:t>
-            </a:r>
-            <a:r>
-              <a:rPr lang="nl-NL" sz="1400" dirty="0">
-                <a:latin typeface="Courier New" panose="02070309020205020404" pitchFamily="49" charset="0"/>
-                <a:cs typeface="Courier New" panose="02070309020205020404" pitchFamily="49" charset="0"/>
-              </a:rPr>
-              <a:t>} {</a:t>
-            </a:r>
-            <a:r>
-              <a:rPr lang="nl-NL" sz="1400" dirty="0" err="1">
-                <a:latin typeface="Courier New" panose="02070309020205020404" pitchFamily="49" charset="0"/>
-                <a:cs typeface="Courier New" panose="02070309020205020404" pitchFamily="49" charset="0"/>
-              </a:rPr>
-              <a:t>self.achter</a:t>
+              <a:t>self.last</a:t>
             </a:r>
             <a:r>
               <a:rPr lang="nl-NL" sz="1400" dirty="0">
@@ -22574,35 +22630,21 @@
                 <a:latin typeface="Courier New" panose="02070309020205020404" pitchFamily="49" charset="0"/>
                 <a:cs typeface="Courier New" panose="02070309020205020404" pitchFamily="49" charset="0"/>
               </a:rPr>
-              <a:t>f"Persoon</a:t>
+              <a:t>f"Person</a:t>
             </a:r>
             <a:r>
               <a:rPr lang="nl-NL" sz="1400" dirty="0">
                 <a:latin typeface="Courier New" panose="02070309020205020404" pitchFamily="49" charset="0"/>
                 <a:cs typeface="Courier New" panose="02070309020205020404" pitchFamily="49" charset="0"/>
               </a:rPr>
-              <a:t>('{</a:t>
+              <a:t>('{self.name}', '{</a:t>
             </a:r>
             <a:r>
               <a:rPr lang="nl-NL" sz="1400" dirty="0" err="1">
                 <a:latin typeface="Courier New" panose="02070309020205020404" pitchFamily="49" charset="0"/>
                 <a:cs typeface="Courier New" panose="02070309020205020404" pitchFamily="49" charset="0"/>
               </a:rPr>
-              <a:t>self.voor</a:t>
-            </a:r>
-            <a:r>
-              <a:rPr lang="nl-NL" sz="1400" dirty="0">
-                <a:latin typeface="Courier New" panose="02070309020205020404" pitchFamily="49" charset="0"/>
-                <a:cs typeface="Courier New" panose="02070309020205020404" pitchFamily="49" charset="0"/>
-              </a:rPr>
-              <a:t>}', '{</a:t>
-            </a:r>
-            <a:r>
-              <a:rPr lang="nl-NL" sz="1400" dirty="0" err="1">
-                <a:latin typeface="Courier New" panose="02070309020205020404" pitchFamily="49" charset="0"/>
-                <a:cs typeface="Courier New" panose="02070309020205020404" pitchFamily="49" charset="0"/>
-              </a:rPr>
-              <a:t>self.achter</a:t>
+              <a:t>self.last</a:t>
             </a:r>
             <a:r>
               <a:rPr lang="nl-NL" sz="1400" dirty="0">
@@ -22654,14 +22696,14 @@
                 <a:latin typeface="Courier New" panose="02070309020205020404" pitchFamily="49" charset="0"/>
                 <a:cs typeface="Courier New" panose="02070309020205020404" pitchFamily="49" charset="0"/>
               </a:rPr>
-              <a:t>henk</a:t>
+              <a:t>john_doe</a:t>
             </a:r>
             <a:r>
               <a:rPr lang="nl-NL" sz="1400" dirty="0">
                 <a:latin typeface="Courier New" panose="02070309020205020404" pitchFamily="49" charset="0"/>
                 <a:cs typeface="Courier New" panose="02070309020205020404" pitchFamily="49" charset="0"/>
               </a:rPr>
-              <a:t> = Persoon("Henk", "Jansen")</a:t>
+              <a:t> = Persoon("John", "Doe")</a:t>
             </a:r>
           </a:p>
           <a:p>
@@ -22681,14 +22723,14 @@
                 <a:latin typeface="Courier New" panose="02070309020205020404" pitchFamily="49" charset="0"/>
                 <a:cs typeface="Courier New" panose="02070309020205020404" pitchFamily="49" charset="0"/>
               </a:rPr>
-              <a:t>henk</a:t>
+              <a:t>john_doe</a:t>
             </a:r>
             <a:r>
               <a:rPr lang="nl-NL" sz="1400" dirty="0">
                 <a:latin typeface="Courier New" panose="02070309020205020404" pitchFamily="49" charset="0"/>
                 <a:cs typeface="Courier New" panose="02070309020205020404" pitchFamily="49" charset="0"/>
               </a:rPr>
-              <a:t>)   # "Henk Jansen"</a:t>
+              <a:t>)     # "John Doe"</a:t>
             </a:r>
           </a:p>
           <a:p>
@@ -22714,14 +22756,14 @@
                 <a:latin typeface="Courier New" panose="02070309020205020404" pitchFamily="49" charset="0"/>
                 <a:cs typeface="Courier New" panose="02070309020205020404" pitchFamily="49" charset="0"/>
               </a:rPr>
-              <a:t>henk</a:t>
+              <a:t>john_doe</a:t>
             </a:r>
             <a:r>
               <a:rPr lang="nl-NL" sz="1400" dirty="0">
                 <a:latin typeface="Courier New" panose="02070309020205020404" pitchFamily="49" charset="0"/>
                 <a:cs typeface="Courier New" panose="02070309020205020404" pitchFamily="49" charset="0"/>
               </a:rPr>
-              <a:t>)    # "Persoon('Henk', 'Jansen')"</a:t>
+              <a:t>)      # "Person('John', 'Doe')"</a:t>
             </a:r>
           </a:p>
         </p:txBody>
@@ -22905,7 +22947,15 @@
             </a:r>
             <a:r>
               <a:rPr lang="nl-NL" sz="2000" dirty="0"/>
-              <a:t> class die niet hoofdlettergevoelig is:</a:t>
+              <a:t> class uit als </a:t>
+            </a:r>
+            <a:r>
+              <a:rPr lang="nl-NL" sz="2000" dirty="0" err="1"/>
+              <a:t>dict</a:t>
+            </a:r>
+            <a:r>
+              <a:rPr lang="nl-NL" sz="2000" dirty="0"/>
+              <a:t> dat niet hoofdlettergevoelig is:</a:t>
             </a:r>
           </a:p>
           <a:p>
@@ -23225,7 +23275,7 @@
           <a:p>
             <a:r>
               <a:rPr lang="nl-NL" sz="3600" noProof="0" dirty="0"/>
-              <a:t>Statische en private methodes</a:t>
+              <a:t>Private attributen</a:t>
             </a:r>
           </a:p>
         </p:txBody>
@@ -23267,6 +23317,15 @@
             <a:pPr marL="0" indent="0">
               <a:buNone/>
             </a:pPr>
+            <a:r>
+              <a:rPr lang="nl-NL" sz="2000" dirty="0"/>
+              <a:t>Een privaat attribuut wordt alleen intern gebruikt in de class.</a:t>
+            </a:r>
+          </a:p>
+          <a:p>
+            <a:pPr marL="0" indent="0">
+              <a:buNone/>
+            </a:pPr>
             <a:endParaRPr lang="nl-NL" sz="2000" dirty="0"/>
           </a:p>
           <a:p>
@@ -23275,71 +23334,7 @@
             </a:pPr>
             <a:r>
               <a:rPr lang="nl-NL" sz="2000" noProof="0" dirty="0"/>
-              <a:t>Gebruik </a:t>
-            </a:r>
-            <a:r>
-              <a:rPr lang="nl-NL" sz="2000" noProof="0" dirty="0">
-                <a:latin typeface="Courier New" panose="02070309020205020404" pitchFamily="49" charset="0"/>
-                <a:cs typeface="Courier New" panose="02070309020205020404" pitchFamily="49" charset="0"/>
-              </a:rPr>
-              <a:t>@staticmethod</a:t>
-            </a:r>
-            <a:r>
-              <a:rPr lang="nl-NL" sz="2000" noProof="0" dirty="0"/>
-              <a:t> wanneer een methode </a:t>
-            </a:r>
-            <a:r>
-              <a:rPr lang="nl-NL" sz="2000" noProof="0" dirty="0" err="1">
-                <a:latin typeface="Courier New" panose="02070309020205020404" pitchFamily="49" charset="0"/>
-                <a:cs typeface="Courier New" panose="02070309020205020404" pitchFamily="49" charset="0"/>
-              </a:rPr>
-              <a:t>self</a:t>
-            </a:r>
-            <a:r>
-              <a:rPr lang="nl-NL" sz="2000" noProof="0" dirty="0"/>
-              <a:t> niet nodig heeft.</a:t>
-            </a:r>
-          </a:p>
-          <a:p>
-            <a:pPr marL="0" indent="0">
-              <a:buNone/>
-            </a:pPr>
-            <a:endParaRPr lang="nl-NL" sz="2000" dirty="0"/>
-          </a:p>
-          <a:p>
-            <a:pPr marL="0" indent="0">
-              <a:buNone/>
-            </a:pPr>
-            <a:endParaRPr lang="nl-NL" sz="2000" noProof="0" dirty="0"/>
-          </a:p>
-          <a:p>
-            <a:pPr marL="0" indent="0">
-              <a:buNone/>
-            </a:pPr>
-            <a:endParaRPr lang="nl-NL" sz="2000" dirty="0"/>
-          </a:p>
-          <a:p>
-            <a:pPr marL="0" indent="0">
-              <a:buNone/>
-            </a:pPr>
-            <a:r>
-              <a:rPr lang="nl-NL" sz="2000" dirty="0"/>
-              <a:t>Private methodes of attributen bestaan niet in Python.</a:t>
-            </a:r>
-          </a:p>
-          <a:p>
-            <a:pPr marL="0" indent="0">
-              <a:buNone/>
-            </a:pPr>
-            <a:endParaRPr lang="nl-NL" sz="2000" noProof="0" dirty="0"/>
-          </a:p>
-          <a:p>
-            <a:pPr marL="0" indent="0">
-              <a:buNone/>
-            </a:pPr>
-            <a:r>
-              <a:rPr lang="nl-NL" sz="2000" noProof="0" dirty="0"/>
-              <a:t>Gebruik een </a:t>
+              <a:t>Conventie: Attributen die beginnen met een </a:t>
             </a:r>
             <a:r>
               <a:rPr lang="nl-NL" sz="2000" noProof="0" dirty="0" err="1"/>
@@ -23347,9 +23342,68 @@
             </a:r>
             <a:r>
               <a:rPr lang="nl-NL" sz="2000" dirty="0"/>
-              <a:t>ore om te signaleren dat een methode privaat is.</a:t>
-            </a:r>
+              <a:t>ore zijn privaat.</a:t>
+            </a:r>
+          </a:p>
+          <a:p>
+            <a:pPr marL="0" indent="0">
+              <a:buNone/>
+            </a:pPr>
             <a:endParaRPr lang="nl-NL" sz="2000" noProof="0" dirty="0"/>
+          </a:p>
+          <a:p>
+            <a:pPr marL="0" indent="0">
+              <a:buNone/>
+            </a:pPr>
+            <a:r>
+              <a:rPr lang="nl-NL" sz="2000" dirty="0"/>
+              <a:t>Een dubbele </a:t>
+            </a:r>
+            <a:r>
+              <a:rPr lang="nl-NL" sz="2000" dirty="0" err="1"/>
+              <a:t>underscore</a:t>
+            </a:r>
+            <a:r>
+              <a:rPr lang="nl-NL" sz="2000" dirty="0"/>
+              <a:t> maakt het onmogelijk om het attribuut direct te gebruiken. </a:t>
+            </a:r>
+            <a:endParaRPr lang="nl-NL" sz="2000" noProof="0" dirty="0"/>
+          </a:p>
+          <a:p>
+            <a:pPr marL="0" indent="0">
+              <a:buNone/>
+            </a:pPr>
+            <a:endParaRPr lang="nl-NL" sz="2000" dirty="0"/>
+          </a:p>
+          <a:p>
+            <a:pPr marL="0" indent="0">
+              <a:buNone/>
+            </a:pPr>
+            <a:endParaRPr lang="nl-NL" sz="2000" dirty="0"/>
+          </a:p>
+          <a:p>
+            <a:pPr marL="0" indent="0">
+              <a:buNone/>
+            </a:pPr>
+            <a:endParaRPr lang="nl-NL" sz="2000" noProof="0" dirty="0"/>
+          </a:p>
+          <a:p>
+            <a:pPr marL="0" indent="0">
+              <a:buNone/>
+            </a:pPr>
+            <a:endParaRPr lang="nl-NL" sz="2000" dirty="0"/>
+          </a:p>
+          <a:p>
+            <a:pPr marL="0" indent="0">
+              <a:buNone/>
+            </a:pPr>
+            <a:endParaRPr lang="nl-NL" sz="2000" noProof="0" dirty="0"/>
+          </a:p>
+          <a:p>
+            <a:pPr marL="0" indent="0">
+              <a:buNone/>
+            </a:pPr>
+            <a:endParaRPr lang="nl-NL" sz="2000" dirty="0"/>
           </a:p>
         </p:txBody>
       </p:sp>
@@ -23550,19 +23604,19 @@
               <a:buNone/>
             </a:pPr>
             <a:r>
-              <a:rPr lang="nl-NL" sz="1600" b="1" dirty="0">
-                <a:latin typeface="Courier New" panose="02070309020205020404" pitchFamily="49" charset="0"/>
-                <a:cs typeface="Courier New" panose="02070309020205020404" pitchFamily="49" charset="0"/>
-              </a:rPr>
-              <a:t>class Persoon:</a:t>
-            </a:r>
-          </a:p>
-          <a:p>
-            <a:pPr marL="0" indent="0">
-              <a:buFont typeface="Arial" panose="020B0604020202020204" pitchFamily="34" charset="0"/>
-              <a:buNone/>
-            </a:pPr>
-            <a:endParaRPr lang="nl-NL" sz="1600" dirty="0">
+              <a:rPr lang="nl-NL" sz="1400" b="1" dirty="0">
+                <a:latin typeface="Courier New" panose="02070309020205020404" pitchFamily="49" charset="0"/>
+                <a:cs typeface="Courier New" panose="02070309020205020404" pitchFamily="49" charset="0"/>
+              </a:rPr>
+              <a:t>class Person:</a:t>
+            </a:r>
+          </a:p>
+          <a:p>
+            <a:pPr marL="0" indent="0">
+              <a:buFont typeface="Arial" panose="020B0604020202020204" pitchFamily="34" charset="0"/>
+              <a:buNone/>
+            </a:pPr>
+            <a:endParaRPr lang="nl-NL" sz="1400" dirty="0">
               <a:latin typeface="Courier New" panose="02070309020205020404" pitchFamily="49" charset="0"/>
               <a:cs typeface="Courier New" panose="02070309020205020404" pitchFamily="49" charset="0"/>
             </a:endParaRPr>
@@ -23573,101 +23627,19 @@
               <a:buNone/>
             </a:pPr>
             <a:r>
-              <a:rPr lang="nl-NL" sz="1600" dirty="0">
-                <a:latin typeface="Courier New" panose="02070309020205020404" pitchFamily="49" charset="0"/>
-                <a:cs typeface="Courier New" panose="02070309020205020404" pitchFamily="49" charset="0"/>
-              </a:rPr>
-              <a:t>  @staticmethod</a:t>
-            </a:r>
-          </a:p>
-          <a:p>
-            <a:pPr marL="0" indent="0">
-              <a:buFont typeface="Arial" panose="020B0604020202020204" pitchFamily="34" charset="0"/>
-              <a:buNone/>
-            </a:pPr>
-            <a:r>
-              <a:rPr lang="nl-NL" sz="1600" dirty="0">
-                <a:latin typeface="Courier New" panose="02070309020205020404" pitchFamily="49" charset="0"/>
-                <a:cs typeface="Courier New" panose="02070309020205020404" pitchFamily="49" charset="0"/>
-              </a:rPr>
-              <a:t>  </a:t>
-            </a:r>
-            <a:r>
-              <a:rPr lang="nl-NL" sz="1600" b="1" dirty="0" err="1">
-                <a:latin typeface="Courier New" panose="02070309020205020404" pitchFamily="49" charset="0"/>
-                <a:cs typeface="Courier New" panose="02070309020205020404" pitchFamily="49" charset="0"/>
-              </a:rPr>
-              <a:t>def</a:t>
-            </a:r>
-            <a:r>
-              <a:rPr lang="nl-NL" sz="1600" b="1" dirty="0">
-                <a:latin typeface="Courier New" panose="02070309020205020404" pitchFamily="49" charset="0"/>
-                <a:cs typeface="Courier New" panose="02070309020205020404" pitchFamily="49" charset="0"/>
-              </a:rPr>
-              <a:t> </a:t>
-            </a:r>
-            <a:r>
-              <a:rPr lang="nl-NL" sz="1600" b="1" dirty="0" err="1">
-                <a:latin typeface="Courier New" panose="02070309020205020404" pitchFamily="49" charset="0"/>
-                <a:cs typeface="Courier New" panose="02070309020205020404" pitchFamily="49" charset="0"/>
-              </a:rPr>
-              <a:t>bewerk_naam</a:t>
-            </a:r>
-            <a:r>
-              <a:rPr lang="nl-NL" sz="1600" b="1" dirty="0">
-                <a:latin typeface="Courier New" panose="02070309020205020404" pitchFamily="49" charset="0"/>
-                <a:cs typeface="Courier New" panose="02070309020205020404" pitchFamily="49" charset="0"/>
-              </a:rPr>
-              <a:t>(naam): </a:t>
-            </a:r>
-          </a:p>
-          <a:p>
-            <a:pPr marL="0" indent="0">
-              <a:buFont typeface="Arial" panose="020B0604020202020204" pitchFamily="34" charset="0"/>
-              <a:buNone/>
-            </a:pPr>
-            <a:r>
-              <a:rPr lang="nl-NL" sz="1600" dirty="0">
-                <a:latin typeface="Courier New" panose="02070309020205020404" pitchFamily="49" charset="0"/>
-                <a:cs typeface="Courier New" panose="02070309020205020404" pitchFamily="49" charset="0"/>
-              </a:rPr>
-              <a:t>    return </a:t>
-            </a:r>
-            <a:r>
-              <a:rPr lang="nl-NL" sz="1600" dirty="0" err="1">
-                <a:latin typeface="Courier New" panose="02070309020205020404" pitchFamily="49" charset="0"/>
-                <a:cs typeface="Courier New" panose="02070309020205020404" pitchFamily="49" charset="0"/>
-              </a:rPr>
-              <a:t>naam.strip</a:t>
-            </a:r>
-            <a:r>
-              <a:rPr lang="nl-NL" sz="1600" dirty="0">
-                <a:latin typeface="Courier New" panose="02070309020205020404" pitchFamily="49" charset="0"/>
-                <a:cs typeface="Courier New" panose="02070309020205020404" pitchFamily="49" charset="0"/>
-              </a:rPr>
-              <a:t>().</a:t>
-            </a:r>
-            <a:r>
-              <a:rPr lang="nl-NL" sz="1600" dirty="0" err="1">
-                <a:latin typeface="Courier New" panose="02070309020205020404" pitchFamily="49" charset="0"/>
-                <a:cs typeface="Courier New" panose="02070309020205020404" pitchFamily="49" charset="0"/>
-              </a:rPr>
-              <a:t>capitalize</a:t>
-            </a:r>
-            <a:r>
-              <a:rPr lang="nl-NL" sz="1600" dirty="0">
-                <a:latin typeface="Courier New" panose="02070309020205020404" pitchFamily="49" charset="0"/>
-                <a:cs typeface="Courier New" panose="02070309020205020404" pitchFamily="49" charset="0"/>
-              </a:rPr>
-              <a:t>()</a:t>
-            </a:r>
-          </a:p>
-          <a:p>
-            <a:pPr marL="0" indent="0">
-              <a:buFont typeface="Arial" panose="020B0604020202020204" pitchFamily="34" charset="0"/>
-              <a:buNone/>
-            </a:pPr>
-            <a:endParaRPr lang="nl-NL" sz="1600" dirty="0">
+              <a:rPr lang="nl-NL" sz="1400" b="1" dirty="0">
+                <a:latin typeface="Courier New" panose="02070309020205020404" pitchFamily="49" charset="0"/>
+                <a:cs typeface="Courier New" panose="02070309020205020404" pitchFamily="49" charset="0"/>
+              </a:rPr>
+              <a:t>  ...</a:t>
+            </a:r>
+          </a:p>
+          <a:p>
+            <a:pPr marL="0" indent="0">
+              <a:buFont typeface="Arial" panose="020B0604020202020204" pitchFamily="34" charset="0"/>
+              <a:buNone/>
+            </a:pPr>
+            <a:endParaRPr lang="nl-NL" sz="1400" b="1" dirty="0">
               <a:latin typeface="Courier New" panose="02070309020205020404" pitchFamily="49" charset="0"/>
               <a:cs typeface="Courier New" panose="02070309020205020404" pitchFamily="49" charset="0"/>
             </a:endParaRPr>
@@ -23677,7 +23649,7 @@
               <a:buFont typeface="Arial" panose="020B0604020202020204" pitchFamily="34" charset="0"/>
               <a:buNone/>
             </a:pPr>
-            <a:endParaRPr lang="nl-NL" sz="1600" dirty="0">
+            <a:endParaRPr lang="nl-NL" sz="1400" b="1" dirty="0">
               <a:latin typeface="Courier New" panose="02070309020205020404" pitchFamily="49" charset="0"/>
               <a:cs typeface="Courier New" panose="02070309020205020404" pitchFamily="49" charset="0"/>
             </a:endParaRPr>
@@ -23687,7 +23659,75 @@
               <a:buFont typeface="Arial" panose="020B0604020202020204" pitchFamily="34" charset="0"/>
               <a:buNone/>
             </a:pPr>
-            <a:endParaRPr lang="nl-NL" sz="1600" dirty="0">
+            <a:r>
+              <a:rPr lang="nl-NL" sz="1400" b="1" dirty="0">
+                <a:latin typeface="Courier New" panose="02070309020205020404" pitchFamily="49" charset="0"/>
+                <a:cs typeface="Courier New" panose="02070309020205020404" pitchFamily="49" charset="0"/>
+              </a:rPr>
+              <a:t>  </a:t>
+            </a:r>
+            <a:r>
+              <a:rPr lang="nl-NL" sz="1400" b="1" dirty="0" err="1">
+                <a:latin typeface="Courier New" panose="02070309020205020404" pitchFamily="49" charset="0"/>
+                <a:cs typeface="Courier New" panose="02070309020205020404" pitchFamily="49" charset="0"/>
+              </a:rPr>
+              <a:t>def</a:t>
+            </a:r>
+            <a:r>
+              <a:rPr lang="nl-NL" sz="1400" b="1" dirty="0">
+                <a:latin typeface="Courier New" panose="02070309020205020404" pitchFamily="49" charset="0"/>
+                <a:cs typeface="Courier New" panose="02070309020205020404" pitchFamily="49" charset="0"/>
+              </a:rPr>
+              <a:t> _</a:t>
+            </a:r>
+            <a:r>
+              <a:rPr lang="nl-NL" sz="1400" b="1" dirty="0" err="1">
+                <a:latin typeface="Courier New" panose="02070309020205020404" pitchFamily="49" charset="0"/>
+                <a:cs typeface="Courier New" panose="02070309020205020404" pitchFamily="49" charset="0"/>
+              </a:rPr>
+              <a:t>is_valid_name</a:t>
+            </a:r>
+            <a:r>
+              <a:rPr lang="nl-NL" sz="1400" b="1" dirty="0">
+                <a:latin typeface="Courier New" panose="02070309020205020404" pitchFamily="49" charset="0"/>
+                <a:cs typeface="Courier New" panose="02070309020205020404" pitchFamily="49" charset="0"/>
+              </a:rPr>
+              <a:t>(name): </a:t>
+            </a:r>
+          </a:p>
+          <a:p>
+            <a:pPr marL="0" indent="0">
+              <a:buFont typeface="Arial" panose="020B0604020202020204" pitchFamily="34" charset="0"/>
+              <a:buNone/>
+            </a:pPr>
+            <a:r>
+              <a:rPr lang="nl-NL" sz="1400" dirty="0">
+                <a:latin typeface="Courier New" panose="02070309020205020404" pitchFamily="49" charset="0"/>
+                <a:cs typeface="Courier New" panose="02070309020205020404" pitchFamily="49" charset="0"/>
+              </a:rPr>
+              <a:t>    return </a:t>
+            </a:r>
+            <a:r>
+              <a:rPr lang="nl-NL" sz="1400" dirty="0" err="1">
+                <a:latin typeface="Courier New" panose="02070309020205020404" pitchFamily="49" charset="0"/>
+                <a:cs typeface="Courier New" panose="02070309020205020404" pitchFamily="49" charset="0"/>
+              </a:rPr>
+              <a:t>len</a:t>
+            </a:r>
+            <a:r>
+              <a:rPr lang="nl-NL" sz="1400" dirty="0">
+                <a:latin typeface="Courier New" panose="02070309020205020404" pitchFamily="49" charset="0"/>
+                <a:cs typeface="Courier New" panose="02070309020205020404" pitchFamily="49" charset="0"/>
+              </a:rPr>
+              <a:t>(name) &gt; 3</a:t>
+            </a:r>
+          </a:p>
+          <a:p>
+            <a:pPr marL="0" indent="0">
+              <a:buFont typeface="Arial" panose="020B0604020202020204" pitchFamily="34" charset="0"/>
+              <a:buNone/>
+            </a:pPr>
+            <a:endParaRPr lang="nl-NL" sz="1400" dirty="0">
               <a:latin typeface="Courier New" panose="02070309020205020404" pitchFamily="49" charset="0"/>
               <a:cs typeface="Courier New" panose="02070309020205020404" pitchFamily="49" charset="0"/>
             </a:endParaRPr>
@@ -23698,80 +23738,119 @@
               <a:buNone/>
             </a:pPr>
             <a:r>
-              <a:rPr lang="nl-NL" sz="1600" b="1" dirty="0">
+              <a:rPr lang="nl-NL" sz="1400" dirty="0">
                 <a:latin typeface="Courier New" panose="02070309020205020404" pitchFamily="49" charset="0"/>
                 <a:cs typeface="Courier New" panose="02070309020205020404" pitchFamily="49" charset="0"/>
               </a:rPr>
               <a:t>  </a:t>
             </a:r>
             <a:r>
-              <a:rPr lang="nl-NL" sz="1600" b="1" dirty="0" err="1">
+              <a:rPr lang="nl-NL" sz="1400" b="1" dirty="0" err="1">
                 <a:latin typeface="Courier New" panose="02070309020205020404" pitchFamily="49" charset="0"/>
                 <a:cs typeface="Courier New" panose="02070309020205020404" pitchFamily="49" charset="0"/>
               </a:rPr>
               <a:t>def</a:t>
             </a:r>
             <a:r>
-              <a:rPr lang="nl-NL" sz="1600" b="1" dirty="0">
-                <a:latin typeface="Courier New" panose="02070309020205020404" pitchFamily="49" charset="0"/>
-                <a:cs typeface="Courier New" panose="02070309020205020404" pitchFamily="49" charset="0"/>
-              </a:rPr>
-              <a:t> _</a:t>
-            </a:r>
-            <a:r>
-              <a:rPr lang="nl-NL" sz="1600" b="1" dirty="0" err="1">
-                <a:latin typeface="Courier New" panose="02070309020205020404" pitchFamily="49" charset="0"/>
-                <a:cs typeface="Courier New" panose="02070309020205020404" pitchFamily="49" charset="0"/>
-              </a:rPr>
-              <a:t>geldige_naam</a:t>
-            </a:r>
-            <a:r>
-              <a:rPr lang="nl-NL" sz="1600" b="1" dirty="0">
-                <a:latin typeface="Courier New" panose="02070309020205020404" pitchFamily="49" charset="0"/>
-                <a:cs typeface="Courier New" panose="02070309020205020404" pitchFamily="49" charset="0"/>
-              </a:rPr>
-              <a:t>(naam): </a:t>
-            </a:r>
-          </a:p>
-          <a:p>
-            <a:pPr marL="0" indent="0">
-              <a:buFont typeface="Arial" panose="020B0604020202020204" pitchFamily="34" charset="0"/>
-              <a:buNone/>
-            </a:pPr>
-            <a:r>
-              <a:rPr lang="nl-NL" sz="1600" dirty="0">
-                <a:latin typeface="Courier New" panose="02070309020205020404" pitchFamily="49" charset="0"/>
-                <a:cs typeface="Courier New" panose="02070309020205020404" pitchFamily="49" charset="0"/>
-              </a:rPr>
-              <a:t>    return </a:t>
-            </a:r>
-            <a:r>
-              <a:rPr lang="nl-NL" sz="1600" dirty="0" err="1">
-                <a:latin typeface="Courier New" panose="02070309020205020404" pitchFamily="49" charset="0"/>
-                <a:cs typeface="Courier New" panose="02070309020205020404" pitchFamily="49" charset="0"/>
-              </a:rPr>
-              <a:t>len</a:t>
-            </a:r>
-            <a:r>
-              <a:rPr lang="nl-NL" sz="1600" dirty="0">
-                <a:latin typeface="Courier New" panose="02070309020205020404" pitchFamily="49" charset="0"/>
-                <a:cs typeface="Courier New" panose="02070309020205020404" pitchFamily="49" charset="0"/>
-              </a:rPr>
-              <a:t>(naam) &gt; 3</a:t>
-            </a:r>
-          </a:p>
-          <a:p>
-            <a:pPr marL="0" indent="0">
-              <a:buFont typeface="Arial" panose="020B0604020202020204" pitchFamily="34" charset="0"/>
-              <a:buNone/>
-            </a:pPr>
-            <a:r>
-              <a:rPr lang="nl-NL" sz="1600" b="1" dirty="0">
-                <a:latin typeface="Courier New" panose="02070309020205020404" pitchFamily="49" charset="0"/>
-                <a:cs typeface="Courier New" panose="02070309020205020404" pitchFamily="49" charset="0"/>
-              </a:rPr>
-              <a:t>      </a:t>
-            </a:r>
+              <a:rPr lang="nl-NL" sz="1400" b="1" dirty="0">
+                <a:latin typeface="Courier New" panose="02070309020205020404" pitchFamily="49" charset="0"/>
+                <a:cs typeface="Courier New" panose="02070309020205020404" pitchFamily="49" charset="0"/>
+              </a:rPr>
+              <a:t> __</a:t>
+            </a:r>
+            <a:r>
+              <a:rPr lang="nl-NL" sz="1400" b="1" dirty="0" err="1">
+                <a:latin typeface="Courier New" panose="02070309020205020404" pitchFamily="49" charset="0"/>
+                <a:cs typeface="Courier New" panose="02070309020205020404" pitchFamily="49" charset="0"/>
+              </a:rPr>
+              <a:t>restricted</a:t>
+            </a:r>
+            <a:r>
+              <a:rPr lang="nl-NL" sz="1400" b="1" dirty="0">
+                <a:latin typeface="Courier New" panose="02070309020205020404" pitchFamily="49" charset="0"/>
+                <a:cs typeface="Courier New" panose="02070309020205020404" pitchFamily="49" charset="0"/>
+              </a:rPr>
+              <a:t>(</a:t>
+            </a:r>
+            <a:r>
+              <a:rPr lang="nl-NL" sz="1400" b="1" dirty="0" err="1">
+                <a:latin typeface="Courier New" panose="02070309020205020404" pitchFamily="49" charset="0"/>
+                <a:cs typeface="Courier New" panose="02070309020205020404" pitchFamily="49" charset="0"/>
+              </a:rPr>
+              <a:t>self</a:t>
+            </a:r>
+            <a:r>
+              <a:rPr lang="nl-NL" sz="1400" b="1" dirty="0">
+                <a:latin typeface="Courier New" panose="02070309020205020404" pitchFamily="49" charset="0"/>
+                <a:cs typeface="Courier New" panose="02070309020205020404" pitchFamily="49" charset="0"/>
+              </a:rPr>
+              <a:t>):</a:t>
+            </a:r>
+          </a:p>
+          <a:p>
+            <a:pPr marL="0" indent="0">
+              <a:buFont typeface="Arial" panose="020B0604020202020204" pitchFamily="34" charset="0"/>
+              <a:buNone/>
+            </a:pPr>
+            <a:r>
+              <a:rPr lang="nl-NL" sz="1400" dirty="0">
+                <a:latin typeface="Courier New" panose="02070309020205020404" pitchFamily="49" charset="0"/>
+                <a:cs typeface="Courier New" panose="02070309020205020404" pitchFamily="49" charset="0"/>
+              </a:rPr>
+              <a:t>    print("</a:t>
+            </a:r>
+            <a:r>
+              <a:rPr lang="nl-NL" sz="1400" dirty="0" err="1">
+                <a:latin typeface="Courier New" panose="02070309020205020404" pitchFamily="49" charset="0"/>
+                <a:cs typeface="Courier New" panose="02070309020205020404" pitchFamily="49" charset="0"/>
+              </a:rPr>
+              <a:t>Cannot</a:t>
+            </a:r>
+            <a:r>
+              <a:rPr lang="nl-NL" sz="1400" dirty="0">
+                <a:latin typeface="Courier New" panose="02070309020205020404" pitchFamily="49" charset="0"/>
+                <a:cs typeface="Courier New" panose="02070309020205020404" pitchFamily="49" charset="0"/>
+              </a:rPr>
+              <a:t> access </a:t>
+            </a:r>
+            <a:r>
+              <a:rPr lang="nl-NL" sz="1400" dirty="0" err="1">
+                <a:latin typeface="Courier New" panose="02070309020205020404" pitchFamily="49" charset="0"/>
+                <a:cs typeface="Courier New" panose="02070309020205020404" pitchFamily="49" charset="0"/>
+              </a:rPr>
+              <a:t>from</a:t>
+            </a:r>
+            <a:r>
+              <a:rPr lang="nl-NL" sz="1400" dirty="0">
+                <a:latin typeface="Courier New" panose="02070309020205020404" pitchFamily="49" charset="0"/>
+                <a:cs typeface="Courier New" panose="02070309020205020404" pitchFamily="49" charset="0"/>
+              </a:rPr>
+              <a:t> </a:t>
+            </a:r>
+            <a:r>
+              <a:rPr lang="nl-NL" sz="1400" dirty="0" err="1">
+                <a:latin typeface="Courier New" panose="02070309020205020404" pitchFamily="49" charset="0"/>
+                <a:cs typeface="Courier New" panose="02070309020205020404" pitchFamily="49" charset="0"/>
+              </a:rPr>
+              <a:t>outside</a:t>
+            </a:r>
+            <a:r>
+              <a:rPr lang="nl-NL" sz="1400" dirty="0">
+                <a:latin typeface="Courier New" panose="02070309020205020404" pitchFamily="49" charset="0"/>
+                <a:cs typeface="Courier New" panose="02070309020205020404" pitchFamily="49" charset="0"/>
+              </a:rPr>
+              <a:t>")</a:t>
+            </a:r>
+          </a:p>
+          <a:p>
+            <a:pPr marL="0" indent="0">
+              <a:buFont typeface="Arial" panose="020B0604020202020204" pitchFamily="34" charset="0"/>
+              <a:buNone/>
+            </a:pPr>
+            <a:endParaRPr lang="nl-NL" sz="1400" b="1" dirty="0">
+              <a:latin typeface="Courier New" panose="02070309020205020404" pitchFamily="49" charset="0"/>
+              <a:cs typeface="Courier New" panose="02070309020205020404" pitchFamily="49" charset="0"/>
+            </a:endParaRPr>
           </a:p>
         </p:txBody>
       </p:sp>
@@ -23872,8 +23951,12 @@
           <a:lstStyle/>
           <a:p>
             <a:r>
+              <a:rPr lang="nl-NL" sz="3600" noProof="0" dirty="0" err="1"/>
+              <a:t>Static</a:t>
+            </a:r>
+            <a:r>
               <a:rPr lang="nl-NL" sz="3600" noProof="0" dirty="0"/>
-              <a:t>Class methodes</a:t>
+              <a:t> en class methodes</a:t>
             </a:r>
           </a:p>
         </p:txBody>
@@ -23909,10 +23992,54 @@
             <a:pPr marL="0" indent="0">
               <a:buNone/>
             </a:pPr>
+            <a:endParaRPr lang="nl-NL" sz="2000" noProof="0" dirty="0"/>
+          </a:p>
+          <a:p>
+            <a:pPr marL="0" indent="0">
+              <a:buNone/>
+            </a:pPr>
+            <a:endParaRPr lang="nl-NL" sz="2000" noProof="0" dirty="0"/>
+          </a:p>
+          <a:p>
+            <a:pPr marL="0" indent="0">
+              <a:buNone/>
+            </a:pPr>
+            <a:r>
+              <a:rPr lang="nl-NL" sz="2000" noProof="0" dirty="0">
+                <a:latin typeface="Courier New" panose="02070309020205020404" pitchFamily="49" charset="0"/>
+                <a:cs typeface="Courier New" panose="02070309020205020404" pitchFamily="49" charset="0"/>
+              </a:rPr>
+              <a:t>@staticmethod</a:t>
+            </a:r>
             <a:r>
               <a:rPr lang="nl-NL" sz="2000" noProof="0" dirty="0"/>
-              <a:t>Normale methodes worden gebruikt op een instantie…</a:t>
-            </a:r>
+              <a:t> </a:t>
+            </a:r>
+          </a:p>
+          <a:p>
+            <a:pPr marL="0" indent="0">
+              <a:buNone/>
+            </a:pPr>
+            <a:r>
+              <a:rPr lang="nl-NL" sz="2000" noProof="0" dirty="0"/>
+              <a:t>Statische methodes</a:t>
+            </a:r>
+            <a:r>
+              <a:rPr lang="nl-NL" sz="2000" dirty="0"/>
+              <a:t> waarin </a:t>
+            </a:r>
+            <a:r>
+              <a:rPr lang="nl-NL" sz="2000" dirty="0" err="1">
+                <a:latin typeface="Courier New" panose="02070309020205020404" pitchFamily="49" charset="0"/>
+                <a:cs typeface="Courier New" panose="02070309020205020404" pitchFamily="49" charset="0"/>
+              </a:rPr>
+              <a:t>self</a:t>
+            </a:r>
+            <a:r>
+              <a:rPr lang="nl-NL" sz="2000" dirty="0"/>
+              <a:t> niet nodig / beschikbaar is.</a:t>
+            </a:r>
+            <a:endParaRPr lang="nl-NL" sz="2000" noProof="0" dirty="0"/>
           </a:p>
           <a:p>
             <a:pPr marL="0" indent="0">
@@ -23925,38 +24052,28 @@
               <a:buNone/>
             </a:pPr>
             <a:r>
+              <a:rPr lang="nl-NL" sz="2000" noProof="0" dirty="0">
+                <a:latin typeface="Courier New" panose="02070309020205020404" pitchFamily="49" charset="0"/>
+                <a:cs typeface="Courier New" panose="02070309020205020404" pitchFamily="49" charset="0"/>
+              </a:rPr>
+              <a:t>@classmethod</a:t>
+            </a:r>
+            <a:r>
+              <a:rPr lang="nl-NL" sz="2000" noProof="0" dirty="0"/>
+              <a:t> </a:t>
+            </a:r>
+          </a:p>
+          <a:p>
+            <a:pPr marL="0" indent="0">
+              <a:buNone/>
+            </a:pPr>
+            <a:r>
+              <a:rPr lang="nl-NL" sz="2000" noProof="0" dirty="0"/>
+              <a:t>Methodes die op een class werken (i.p.v. een object). Eerste argument verwijst naar de class. </a:t>
+            </a:r>
+            <a:r>
               <a:rPr lang="nl-NL" sz="2000" dirty="0"/>
-              <a:t>Met </a:t>
-            </a:r>
-            <a:r>
-              <a:rPr lang="nl-NL" sz="2000" noProof="0" dirty="0">
-                <a:latin typeface="Courier New" panose="02070309020205020404" pitchFamily="49" charset="0"/>
-                <a:cs typeface="Courier New" panose="02070309020205020404" pitchFamily="49" charset="0"/>
-              </a:rPr>
-              <a:t>@classmethod</a:t>
-            </a:r>
-            <a:r>
-              <a:rPr lang="nl-NL" sz="2000" noProof="0" dirty="0"/>
-              <a:t> definieer je methodes die op de class zelf werken.</a:t>
-            </a:r>
-          </a:p>
-          <a:p>
-            <a:pPr marL="0" indent="0">
-              <a:buNone/>
-            </a:pPr>
-            <a:endParaRPr lang="nl-NL" sz="2000" dirty="0"/>
-          </a:p>
-          <a:p>
-            <a:pPr marL="0" indent="0">
-              <a:buNone/>
-            </a:pPr>
-            <a:r>
-              <a:rPr lang="nl-NL" sz="2000" noProof="0" dirty="0" err="1"/>
-              <a:t>Clas</a:t>
-            </a:r>
-            <a:r>
-              <a:rPr lang="nl-NL" sz="2000" dirty="0"/>
-              <a:t>s methodes worden vaak gebruikt voor "</a:t>
+              <a:t>Vaak gebruikt voor "</a:t>
             </a:r>
             <a:r>
               <a:rPr lang="nl-NL" sz="2000" dirty="0" err="1"/>
@@ -23995,7 +24112,7 @@
         </p:spPr>
         <p:txBody>
           <a:bodyPr vert="horz" lIns="91440" tIns="45720" rIns="91440" bIns="45720" rtlCol="0">
-            <a:normAutofit lnSpcReduction="10000"/>
+            <a:normAutofit/>
           </a:bodyPr>
           <a:lstStyle>
             <a:lvl1pPr marL="228600" indent="-228600" algn="l" defTabSz="914400" rtl="0" eaLnBrk="1" latinLnBrk="0" hangingPunct="1">
@@ -24167,20 +24284,20 @@
               <a:buNone/>
             </a:pPr>
             <a:r>
-              <a:rPr lang="nl-NL" sz="1600" b="1" dirty="0">
-                <a:latin typeface="Courier New" panose="02070309020205020404" pitchFamily="49" charset="0"/>
-                <a:cs typeface="Courier New" panose="02070309020205020404" pitchFamily="49" charset="0"/>
-              </a:rPr>
-              <a:t>class Persoon:</a:t>
-            </a:r>
-          </a:p>
-          <a:p>
-            <a:pPr marL="0" indent="0">
-              <a:buFont typeface="Arial" panose="020B0604020202020204" pitchFamily="34" charset="0"/>
-              <a:buNone/>
-            </a:pPr>
-            <a:r>
-              <a:rPr lang="nl-NL" sz="1600" dirty="0">
+              <a:rPr lang="nl-NL" sz="1400" b="1" dirty="0">
+                <a:latin typeface="Courier New" panose="02070309020205020404" pitchFamily="49" charset="0"/>
+                <a:cs typeface="Courier New" panose="02070309020205020404" pitchFamily="49" charset="0"/>
+              </a:rPr>
+              <a:t>class Person:</a:t>
+            </a:r>
+          </a:p>
+          <a:p>
+            <a:pPr marL="0" indent="0">
+              <a:buFont typeface="Arial" panose="020B0604020202020204" pitchFamily="34" charset="0"/>
+              <a:buNone/>
+            </a:pPr>
+            <a:r>
+              <a:rPr lang="nl-NL" sz="1400" dirty="0">
                 <a:latin typeface="Courier New" panose="02070309020205020404" pitchFamily="49" charset="0"/>
                 <a:cs typeface="Courier New" panose="02070309020205020404" pitchFamily="49" charset="0"/>
               </a:rPr>
@@ -24193,115 +24310,87 @@
               <a:buNone/>
             </a:pPr>
             <a:r>
-              <a:rPr lang="nl-NL" sz="1600" b="1" dirty="0">
+              <a:rPr lang="nl-NL" sz="1400" dirty="0">
+                <a:latin typeface="Courier New" panose="02070309020205020404" pitchFamily="49" charset="0"/>
+                <a:cs typeface="Courier New" panose="02070309020205020404" pitchFamily="49" charset="0"/>
+              </a:rPr>
+              <a:t>  @staticmethod</a:t>
+            </a:r>
+          </a:p>
+          <a:p>
+            <a:pPr marL="0" indent="0">
+              <a:buFont typeface="Arial" panose="020B0604020202020204" pitchFamily="34" charset="0"/>
+              <a:buNone/>
+            </a:pPr>
+            <a:r>
+              <a:rPr lang="nl-NL" sz="1400" b="1" dirty="0">
                 <a:latin typeface="Courier New" panose="02070309020205020404" pitchFamily="49" charset="0"/>
                 <a:cs typeface="Courier New" panose="02070309020205020404" pitchFamily="49" charset="0"/>
               </a:rPr>
               <a:t>  </a:t>
             </a:r>
             <a:r>
-              <a:rPr lang="nl-NL" sz="1600" b="1" dirty="0" err="1">
+              <a:rPr lang="nl-NL" sz="1400" b="1" dirty="0" err="1">
                 <a:latin typeface="Courier New" panose="02070309020205020404" pitchFamily="49" charset="0"/>
                 <a:cs typeface="Courier New" panose="02070309020205020404" pitchFamily="49" charset="0"/>
               </a:rPr>
               <a:t>def</a:t>
             </a:r>
             <a:r>
-              <a:rPr lang="nl-NL" sz="1600" b="1" dirty="0">
-                <a:latin typeface="Courier New" panose="02070309020205020404" pitchFamily="49" charset="0"/>
-                <a:cs typeface="Courier New" panose="02070309020205020404" pitchFamily="49" charset="0"/>
-              </a:rPr>
-              <a:t> __</a:t>
-            </a:r>
-            <a:r>
-              <a:rPr lang="nl-NL" sz="1600" b="1" dirty="0" err="1">
-                <a:latin typeface="Courier New" panose="02070309020205020404" pitchFamily="49" charset="0"/>
-                <a:cs typeface="Courier New" panose="02070309020205020404" pitchFamily="49" charset="0"/>
-              </a:rPr>
-              <a:t>init</a:t>
-            </a:r>
-            <a:r>
-              <a:rPr lang="nl-NL" sz="1600" b="1" dirty="0">
-                <a:latin typeface="Courier New" panose="02070309020205020404" pitchFamily="49" charset="0"/>
-                <a:cs typeface="Courier New" panose="02070309020205020404" pitchFamily="49" charset="0"/>
-              </a:rPr>
-              <a:t>__(</a:t>
-            </a:r>
-            <a:r>
-              <a:rPr lang="nl-NL" sz="1600" b="1" dirty="0" err="1">
-                <a:latin typeface="Courier New" panose="02070309020205020404" pitchFamily="49" charset="0"/>
-                <a:cs typeface="Courier New" panose="02070309020205020404" pitchFamily="49" charset="0"/>
-              </a:rPr>
-              <a:t>self</a:t>
-            </a:r>
-            <a:r>
-              <a:rPr lang="nl-NL" sz="1600" b="1" dirty="0">
-                <a:latin typeface="Courier New" panose="02070309020205020404" pitchFamily="49" charset="0"/>
-                <a:cs typeface="Courier New" panose="02070309020205020404" pitchFamily="49" charset="0"/>
-              </a:rPr>
-              <a:t>, naam, achternaam): </a:t>
-            </a:r>
-          </a:p>
-          <a:p>
-            <a:pPr marL="0" indent="0">
-              <a:buFont typeface="Arial" panose="020B0604020202020204" pitchFamily="34" charset="0"/>
-              <a:buNone/>
-            </a:pPr>
-            <a:r>
-              <a:rPr lang="nl-NL" sz="1600" dirty="0">
-                <a:latin typeface="Courier New" panose="02070309020205020404" pitchFamily="49" charset="0"/>
-                <a:cs typeface="Courier New" panose="02070309020205020404" pitchFamily="49" charset="0"/>
-              </a:rPr>
-              <a:t>    </a:t>
-            </a:r>
-            <a:r>
-              <a:rPr lang="nl-NL" sz="1600" dirty="0" err="1">
-                <a:latin typeface="Courier New" panose="02070309020205020404" pitchFamily="49" charset="0"/>
-                <a:cs typeface="Courier New" panose="02070309020205020404" pitchFamily="49" charset="0"/>
-              </a:rPr>
-              <a:t>self.voornaam</a:t>
-            </a:r>
-            <a:r>
-              <a:rPr lang="nl-NL" sz="1600" dirty="0">
-                <a:latin typeface="Courier New" panose="02070309020205020404" pitchFamily="49" charset="0"/>
-                <a:cs typeface="Courier New" panose="02070309020205020404" pitchFamily="49" charset="0"/>
-              </a:rPr>
-              <a:t> = naam</a:t>
-            </a:r>
-          </a:p>
-          <a:p>
-            <a:pPr marL="0" indent="0">
-              <a:buFont typeface="Arial" panose="020B0604020202020204" pitchFamily="34" charset="0"/>
-              <a:buNone/>
-            </a:pPr>
-            <a:r>
-              <a:rPr lang="nl-NL" sz="1600" dirty="0">
-                <a:latin typeface="Courier New" panose="02070309020205020404" pitchFamily="49" charset="0"/>
-                <a:cs typeface="Courier New" panose="02070309020205020404" pitchFamily="49" charset="0"/>
-              </a:rPr>
-              <a:t>    </a:t>
-            </a:r>
-            <a:r>
-              <a:rPr lang="nl-NL" sz="1600" dirty="0" err="1">
-                <a:latin typeface="Courier New" panose="02070309020205020404" pitchFamily="49" charset="0"/>
-                <a:cs typeface="Courier New" panose="02070309020205020404" pitchFamily="49" charset="0"/>
-              </a:rPr>
-              <a:t>self.achternaam</a:t>
-            </a:r>
-            <a:r>
-              <a:rPr lang="nl-NL" sz="1600" dirty="0">
-                <a:latin typeface="Courier New" panose="02070309020205020404" pitchFamily="49" charset="0"/>
-                <a:cs typeface="Courier New" panose="02070309020205020404" pitchFamily="49" charset="0"/>
-              </a:rPr>
-              <a:t> = achternaam</a:t>
-            </a:r>
-          </a:p>
-          <a:p>
-            <a:pPr marL="0" indent="0">
-              <a:buFont typeface="Arial" panose="020B0604020202020204" pitchFamily="34" charset="0"/>
-              <a:buNone/>
-            </a:pPr>
-            <a:endParaRPr lang="nl-NL" sz="1600" dirty="0">
+              <a:rPr lang="nl-NL" sz="1400" b="1" dirty="0">
+                <a:latin typeface="Courier New" panose="02070309020205020404" pitchFamily="49" charset="0"/>
+                <a:cs typeface="Courier New" panose="02070309020205020404" pitchFamily="49" charset="0"/>
+              </a:rPr>
+              <a:t> _</a:t>
+            </a:r>
+            <a:r>
+              <a:rPr lang="nl-NL" sz="1400" b="1" dirty="0" err="1">
+                <a:latin typeface="Courier New" panose="02070309020205020404" pitchFamily="49" charset="0"/>
+                <a:cs typeface="Courier New" panose="02070309020205020404" pitchFamily="49" charset="0"/>
+              </a:rPr>
+              <a:t>is_valid_name</a:t>
+            </a:r>
+            <a:r>
+              <a:rPr lang="nl-NL" sz="1400" b="1" dirty="0">
+                <a:latin typeface="Courier New" panose="02070309020205020404" pitchFamily="49" charset="0"/>
+                <a:cs typeface="Courier New" panose="02070309020205020404" pitchFamily="49" charset="0"/>
+              </a:rPr>
+              <a:t>(name): </a:t>
+            </a:r>
+          </a:p>
+          <a:p>
+            <a:pPr marL="0" indent="0">
+              <a:buFont typeface="Arial" panose="020B0604020202020204" pitchFamily="34" charset="0"/>
+              <a:buNone/>
+            </a:pPr>
+            <a:r>
+              <a:rPr lang="nl-NL" sz="1400" dirty="0">
+                <a:latin typeface="Courier New" panose="02070309020205020404" pitchFamily="49" charset="0"/>
+                <a:cs typeface="Courier New" panose="02070309020205020404" pitchFamily="49" charset="0"/>
+              </a:rPr>
+              <a:t>    return </a:t>
+            </a:r>
+            <a:r>
+              <a:rPr lang="nl-NL" sz="1400" dirty="0" err="1">
+                <a:latin typeface="Courier New" panose="02070309020205020404" pitchFamily="49" charset="0"/>
+                <a:cs typeface="Courier New" panose="02070309020205020404" pitchFamily="49" charset="0"/>
+              </a:rPr>
+              <a:t>len</a:t>
+            </a:r>
+            <a:r>
+              <a:rPr lang="nl-NL" sz="1400" dirty="0">
+                <a:latin typeface="Courier New" panose="02070309020205020404" pitchFamily="49" charset="0"/>
+                <a:cs typeface="Courier New" panose="02070309020205020404" pitchFamily="49" charset="0"/>
+              </a:rPr>
+              <a:t>(name) &gt; 3</a:t>
+            </a:r>
+          </a:p>
+          <a:p>
+            <a:pPr marL="0" indent="0">
+              <a:buFont typeface="Arial" panose="020B0604020202020204" pitchFamily="34" charset="0"/>
+              <a:buNone/>
+            </a:pPr>
+            <a:endParaRPr lang="nl-NL" sz="1400" dirty="0">
               <a:latin typeface="Courier New" panose="02070309020205020404" pitchFamily="49" charset="0"/>
               <a:cs typeface="Courier New" panose="02070309020205020404" pitchFamily="49" charset="0"/>
             </a:endParaRPr>
@@ -24312,7 +24401,7 @@
               <a:buNone/>
             </a:pPr>
             <a:r>
-              <a:rPr lang="nl-NL" sz="1600" dirty="0">
+              <a:rPr lang="nl-NL" sz="1400" dirty="0">
                 <a:latin typeface="Courier New" panose="02070309020205020404" pitchFamily="49" charset="0"/>
                 <a:cs typeface="Courier New" panose="02070309020205020404" pitchFamily="49" charset="0"/>
               </a:rPr>
@@ -24325,63 +24414,63 @@
               <a:buNone/>
             </a:pPr>
             <a:r>
-              <a:rPr lang="nl-NL" sz="1600" dirty="0">
+              <a:rPr lang="nl-NL" sz="1400" dirty="0">
                 <a:latin typeface="Courier New" panose="02070309020205020404" pitchFamily="49" charset="0"/>
                 <a:cs typeface="Courier New" panose="02070309020205020404" pitchFamily="49" charset="0"/>
               </a:rPr>
               <a:t>  </a:t>
             </a:r>
             <a:r>
-              <a:rPr lang="nl-NL" sz="1600" b="1" dirty="0" err="1">
+              <a:rPr lang="nl-NL" sz="1400" b="1" dirty="0" err="1">
                 <a:latin typeface="Courier New" panose="02070309020205020404" pitchFamily="49" charset="0"/>
                 <a:cs typeface="Courier New" panose="02070309020205020404" pitchFamily="49" charset="0"/>
               </a:rPr>
               <a:t>def</a:t>
             </a:r>
             <a:r>
-              <a:rPr lang="nl-NL" sz="1600" b="1" dirty="0">
+              <a:rPr lang="nl-NL" sz="1400" b="1" dirty="0">
                 <a:latin typeface="Courier New" panose="02070309020205020404" pitchFamily="49" charset="0"/>
                 <a:cs typeface="Courier New" panose="02070309020205020404" pitchFamily="49" charset="0"/>
               </a:rPr>
               <a:t> </a:t>
             </a:r>
             <a:r>
-              <a:rPr lang="nl-NL" sz="1600" b="1" dirty="0" err="1">
-                <a:latin typeface="Courier New" panose="02070309020205020404" pitchFamily="49" charset="0"/>
-                <a:cs typeface="Courier New" panose="02070309020205020404" pitchFamily="49" charset="0"/>
-              </a:rPr>
-              <a:t>van_csv</a:t>
-            </a:r>
-            <a:r>
-              <a:rPr lang="nl-NL" sz="1600" b="1" dirty="0">
+              <a:rPr lang="nl-NL" sz="1400" b="1" dirty="0" err="1">
+                <a:latin typeface="Courier New" panose="02070309020205020404" pitchFamily="49" charset="0"/>
+                <a:cs typeface="Courier New" panose="02070309020205020404" pitchFamily="49" charset="0"/>
+              </a:rPr>
+              <a:t>from_str</a:t>
+            </a:r>
+            <a:r>
+              <a:rPr lang="nl-NL" sz="1400" b="1" dirty="0">
                 <a:latin typeface="Courier New" panose="02070309020205020404" pitchFamily="49" charset="0"/>
                 <a:cs typeface="Courier New" panose="02070309020205020404" pitchFamily="49" charset="0"/>
               </a:rPr>
               <a:t>(</a:t>
             </a:r>
             <a:r>
-              <a:rPr lang="nl-NL" sz="1600" b="1" dirty="0" err="1">
+              <a:rPr lang="nl-NL" sz="1400" b="1" dirty="0" err="1">
                 <a:latin typeface="Courier New" panose="02070309020205020404" pitchFamily="49" charset="0"/>
                 <a:cs typeface="Courier New" panose="02070309020205020404" pitchFamily="49" charset="0"/>
               </a:rPr>
               <a:t>cls</a:t>
             </a:r>
             <a:r>
-              <a:rPr lang="nl-NL" sz="1600" b="1" dirty="0">
+              <a:rPr lang="nl-NL" sz="1400" b="1" dirty="0">
                 <a:latin typeface="Courier New" panose="02070309020205020404" pitchFamily="49" charset="0"/>
                 <a:cs typeface="Courier New" panose="02070309020205020404" pitchFamily="49" charset="0"/>
               </a:rPr>
               <a:t>, </a:t>
             </a:r>
             <a:r>
-              <a:rPr lang="nl-NL" sz="1600" b="1" dirty="0" err="1">
-                <a:latin typeface="Courier New" panose="02070309020205020404" pitchFamily="49" charset="0"/>
-                <a:cs typeface="Courier New" panose="02070309020205020404" pitchFamily="49" charset="0"/>
-              </a:rPr>
-              <a:t>csv</a:t>
-            </a:r>
-            <a:r>
-              <a:rPr lang="nl-NL" sz="1600" b="1" dirty="0">
+              <a:rPr lang="nl-NL" sz="1400" b="1" dirty="0" err="1">
+                <a:latin typeface="Courier New" panose="02070309020205020404" pitchFamily="49" charset="0"/>
+                <a:cs typeface="Courier New" panose="02070309020205020404" pitchFamily="49" charset="0"/>
+              </a:rPr>
+              <a:t>person_str</a:t>
+            </a:r>
+            <a:r>
+              <a:rPr lang="nl-NL" sz="1400" b="1" dirty="0">
                 <a:latin typeface="Courier New" panose="02070309020205020404" pitchFamily="49" charset="0"/>
                 <a:cs typeface="Courier New" panose="02070309020205020404" pitchFamily="49" charset="0"/>
               </a:rPr>
@@ -24394,21 +24483,35 @@
               <a:buNone/>
             </a:pPr>
             <a:r>
-              <a:rPr lang="nl-NL" sz="1600" dirty="0">
-                <a:latin typeface="Courier New" panose="02070309020205020404" pitchFamily="49" charset="0"/>
-                <a:cs typeface="Courier New" panose="02070309020205020404" pitchFamily="49" charset="0"/>
-              </a:rPr>
-              <a:t>    voor, achter = </a:t>
-            </a:r>
-            <a:r>
-              <a:rPr lang="nl-NL" sz="1600" dirty="0" err="1">
-                <a:latin typeface="Courier New" panose="02070309020205020404" pitchFamily="49" charset="0"/>
-                <a:cs typeface="Courier New" panose="02070309020205020404" pitchFamily="49" charset="0"/>
-              </a:rPr>
-              <a:t>csv.split</a:t>
-            </a:r>
-            <a:r>
-              <a:rPr lang="nl-NL" sz="1600" dirty="0">
+              <a:rPr lang="nl-NL" sz="1400" dirty="0">
+                <a:latin typeface="Courier New" panose="02070309020205020404" pitchFamily="49" charset="0"/>
+                <a:cs typeface="Courier New" panose="02070309020205020404" pitchFamily="49" charset="0"/>
+              </a:rPr>
+              <a:t>    name, </a:t>
+            </a:r>
+            <a:r>
+              <a:rPr lang="nl-NL" sz="1400" dirty="0" err="1">
+                <a:latin typeface="Courier New" panose="02070309020205020404" pitchFamily="49" charset="0"/>
+                <a:cs typeface="Courier New" panose="02070309020205020404" pitchFamily="49" charset="0"/>
+              </a:rPr>
+              <a:t>lastname</a:t>
+            </a:r>
+            <a:r>
+              <a:rPr lang="nl-NL" sz="1400" dirty="0">
+                <a:latin typeface="Courier New" panose="02070309020205020404" pitchFamily="49" charset="0"/>
+                <a:cs typeface="Courier New" panose="02070309020205020404" pitchFamily="49" charset="0"/>
+              </a:rPr>
+              <a:t> = </a:t>
+            </a:r>
+            <a:r>
+              <a:rPr lang="nl-NL" sz="1400" dirty="0" err="1">
+                <a:latin typeface="Courier New" panose="02070309020205020404" pitchFamily="49" charset="0"/>
+                <a:cs typeface="Courier New" panose="02070309020205020404" pitchFamily="49" charset="0"/>
+              </a:rPr>
+              <a:t>person_str.split</a:t>
+            </a:r>
+            <a:r>
+              <a:rPr lang="nl-NL" sz="1400" dirty="0">
                 <a:latin typeface="Courier New" panose="02070309020205020404" pitchFamily="49" charset="0"/>
                 <a:cs typeface="Courier New" panose="02070309020205020404" pitchFamily="49" charset="0"/>
               </a:rPr>
@@ -24421,33 +24524,47 @@
               <a:buNone/>
             </a:pPr>
             <a:r>
-              <a:rPr lang="nl-NL" sz="1600" dirty="0">
+              <a:rPr lang="nl-NL" sz="1400" dirty="0">
                 <a:latin typeface="Courier New" panose="02070309020205020404" pitchFamily="49" charset="0"/>
                 <a:cs typeface="Courier New" panose="02070309020205020404" pitchFamily="49" charset="0"/>
               </a:rPr>
               <a:t>    return </a:t>
             </a:r>
             <a:r>
-              <a:rPr lang="nl-NL" sz="1600" dirty="0" err="1">
+              <a:rPr lang="nl-NL" sz="1400" dirty="0" err="1">
                 <a:latin typeface="Courier New" panose="02070309020205020404" pitchFamily="49" charset="0"/>
                 <a:cs typeface="Courier New" panose="02070309020205020404" pitchFamily="49" charset="0"/>
               </a:rPr>
               <a:t>cls</a:t>
             </a:r>
             <a:r>
-              <a:rPr lang="nl-NL" sz="1600" dirty="0">
-                <a:latin typeface="Courier New" panose="02070309020205020404" pitchFamily="49" charset="0"/>
-                <a:cs typeface="Courier New" panose="02070309020205020404" pitchFamily="49" charset="0"/>
-              </a:rPr>
-              <a:t>(voor, achter)</a:t>
-            </a:r>
-          </a:p>
-          <a:p>
-            <a:pPr marL="0" indent="0">
-              <a:buFont typeface="Arial" panose="020B0604020202020204" pitchFamily="34" charset="0"/>
-              <a:buNone/>
-            </a:pPr>
-            <a:endParaRPr lang="nl-NL" sz="1600" dirty="0">
+              <a:rPr lang="nl-NL" sz="1400" dirty="0">
+                <a:latin typeface="Courier New" panose="02070309020205020404" pitchFamily="49" charset="0"/>
+                <a:cs typeface="Courier New" panose="02070309020205020404" pitchFamily="49" charset="0"/>
+              </a:rPr>
+              <a:t>(name, </a:t>
+            </a:r>
+            <a:r>
+              <a:rPr lang="nl-NL" sz="1400" dirty="0" err="1">
+                <a:latin typeface="Courier New" panose="02070309020205020404" pitchFamily="49" charset="0"/>
+                <a:cs typeface="Courier New" panose="02070309020205020404" pitchFamily="49" charset="0"/>
+              </a:rPr>
+              <a:t>lastname</a:t>
+            </a:r>
+            <a:r>
+              <a:rPr lang="nl-NL" sz="1400" dirty="0">
+                <a:latin typeface="Courier New" panose="02070309020205020404" pitchFamily="49" charset="0"/>
+                <a:cs typeface="Courier New" panose="02070309020205020404" pitchFamily="49" charset="0"/>
+              </a:rPr>
+              <a:t>)</a:t>
+            </a:r>
+          </a:p>
+          <a:p>
+            <a:pPr marL="0" indent="0">
+              <a:buFont typeface="Arial" panose="020B0604020202020204" pitchFamily="34" charset="0"/>
+              <a:buNone/>
+            </a:pPr>
+            <a:endParaRPr lang="nl-NL" sz="1400" dirty="0">
               <a:latin typeface="Courier New" panose="02070309020205020404" pitchFamily="49" charset="0"/>
               <a:cs typeface="Courier New" panose="02070309020205020404" pitchFamily="49" charset="0"/>
             </a:endParaRPr>
@@ -24457,7 +24574,7 @@
               <a:buFont typeface="Arial" panose="020B0604020202020204" pitchFamily="34" charset="0"/>
               <a:buNone/>
             </a:pPr>
-            <a:endParaRPr lang="nl-NL" sz="1600" dirty="0">
+            <a:endParaRPr lang="nl-NL" sz="1400" dirty="0">
               <a:latin typeface="Courier New" panose="02070309020205020404" pitchFamily="49" charset="0"/>
               <a:cs typeface="Courier New" panose="02070309020205020404" pitchFamily="49" charset="0"/>
             </a:endParaRPr>
@@ -24468,55 +24585,42 @@
               <a:buNone/>
             </a:pPr>
             <a:r>
-              <a:rPr lang="nl-NL" sz="1600" dirty="0">
-                <a:latin typeface="Courier New" panose="02070309020205020404" pitchFamily="49" charset="0"/>
-                <a:cs typeface="Courier New" panose="02070309020205020404" pitchFamily="49" charset="0"/>
-              </a:rPr>
-              <a:t># Maak persoon aan vanuit CSV</a:t>
-            </a:r>
-          </a:p>
-          <a:p>
-            <a:pPr marL="0" indent="0">
-              <a:buFont typeface="Arial" panose="020B0604020202020204" pitchFamily="34" charset="0"/>
-              <a:buNone/>
-            </a:pPr>
-            <a:r>
-              <a:rPr lang="nl-NL" sz="1600" dirty="0" err="1">
-                <a:latin typeface="Courier New" panose="02070309020205020404" pitchFamily="49" charset="0"/>
-                <a:cs typeface="Courier New" panose="02070309020205020404" pitchFamily="49" charset="0"/>
-              </a:rPr>
-              <a:t>henk</a:t>
-            </a:r>
-            <a:r>
-              <a:rPr lang="nl-NL" sz="1600" dirty="0">
+              <a:rPr lang="nl-NL" sz="1400" dirty="0" err="1">
+                <a:latin typeface="Courier New" panose="02070309020205020404" pitchFamily="49" charset="0"/>
+                <a:cs typeface="Courier New" panose="02070309020205020404" pitchFamily="49" charset="0"/>
+              </a:rPr>
+              <a:t>john</a:t>
+            </a:r>
+            <a:r>
+              <a:rPr lang="nl-NL" sz="1400" dirty="0">
                 <a:latin typeface="Courier New" panose="02070309020205020404" pitchFamily="49" charset="0"/>
                 <a:cs typeface="Courier New" panose="02070309020205020404" pitchFamily="49" charset="0"/>
               </a:rPr>
               <a:t> = </a:t>
             </a:r>
             <a:r>
-              <a:rPr lang="nl-NL" sz="1600" b="1" dirty="0" err="1">
-                <a:latin typeface="Courier New" panose="02070309020205020404" pitchFamily="49" charset="0"/>
-                <a:cs typeface="Courier New" panose="02070309020205020404" pitchFamily="49" charset="0"/>
-              </a:rPr>
-              <a:t>Persoon.van_csv</a:t>
-            </a:r>
-            <a:r>
-              <a:rPr lang="nl-NL" sz="1600" dirty="0">
+              <a:rPr lang="nl-NL" sz="1400" b="1" dirty="0" err="1">
+                <a:latin typeface="Courier New" panose="02070309020205020404" pitchFamily="49" charset="0"/>
+                <a:cs typeface="Courier New" panose="02070309020205020404" pitchFamily="49" charset="0"/>
+              </a:rPr>
+              <a:t>Person.from_str</a:t>
+            </a:r>
+            <a:r>
+              <a:rPr lang="nl-NL" sz="1400" dirty="0">
                 <a:latin typeface="Courier New" panose="02070309020205020404" pitchFamily="49" charset="0"/>
                 <a:cs typeface="Courier New" panose="02070309020205020404" pitchFamily="49" charset="0"/>
               </a:rPr>
               <a:t>("</a:t>
             </a:r>
             <a:r>
-              <a:rPr lang="nl-NL" sz="1600" dirty="0" err="1">
-                <a:latin typeface="Courier New" panose="02070309020205020404" pitchFamily="49" charset="0"/>
-                <a:cs typeface="Courier New" panose="02070309020205020404" pitchFamily="49" charset="0"/>
-              </a:rPr>
-              <a:t>Henk,Jansen</a:t>
-            </a:r>
-            <a:r>
-              <a:rPr lang="nl-NL" sz="1600" dirty="0">
+              <a:rPr lang="nl-NL" sz="1400" dirty="0" err="1">
+                <a:latin typeface="Courier New" panose="02070309020205020404" pitchFamily="49" charset="0"/>
+                <a:cs typeface="Courier New" panose="02070309020205020404" pitchFamily="49" charset="0"/>
+              </a:rPr>
+              <a:t>John,Doe</a:t>
+            </a:r>
+            <a:r>
+              <a:rPr lang="nl-NL" sz="1400" dirty="0">
                 <a:latin typeface="Courier New" panose="02070309020205020404" pitchFamily="49" charset="0"/>
                 <a:cs typeface="Courier New" panose="02070309020205020404" pitchFamily="49" charset="0"/>
               </a:rPr>

</xml_diff>

<commit_message>
Update Python trainees part 2
</commit_message>
<xml_diff>
--- a/python_trainees/1_basics_classes/python_traineeship_1.pptx
+++ b/python_trainees/1_basics_classes/python_traineeship_1.pptx
@@ -17865,7 +17865,7 @@
 </file>
 
 <file path=ppt/slides/slide4.xml><?xml version="1.0" encoding="utf-8"?>
-<p:sld xmlns:a="http://schemas.openxmlformats.org/drawingml/2006/main" xmlns:r="http://schemas.openxmlformats.org/officeDocument/2006/relationships" xmlns:p="http://schemas.openxmlformats.org/presentationml/2006/main">
+<p:sld xmlns:a="http://schemas.openxmlformats.org/drawingml/2006/main" xmlns:r="http://schemas.openxmlformats.org/officeDocument/2006/relationships" xmlns:p="http://schemas.openxmlformats.org/presentationml/2006/main" show="0">
   <p:cSld>
     <p:spTree>
       <p:nvGrpSpPr>
@@ -19103,7 +19103,35 @@
                 <a:latin typeface="Courier New" panose="02070309020205020404" pitchFamily="49" charset="0"/>
                 <a:cs typeface="Courier New" panose="02070309020205020404" pitchFamily="49" charset="0"/>
               </a:rPr>
-              <a:t>g = "globale variabele"</a:t>
+              <a:t>g = "</a:t>
+            </a:r>
+            <a:r>
+              <a:rPr lang="nl-NL" sz="2000" dirty="0" err="1">
+                <a:latin typeface="Courier New" panose="02070309020205020404" pitchFamily="49" charset="0"/>
+                <a:cs typeface="Courier New" panose="02070309020205020404" pitchFamily="49" charset="0"/>
+              </a:rPr>
+              <a:t>global</a:t>
+            </a:r>
+            <a:r>
+              <a:rPr lang="nl-NL" sz="2000" dirty="0">
+                <a:latin typeface="Courier New" panose="02070309020205020404" pitchFamily="49" charset="0"/>
+                <a:cs typeface="Courier New" panose="02070309020205020404" pitchFamily="49" charset="0"/>
+              </a:rPr>
+              <a:t> </a:t>
+            </a:r>
+            <a:r>
+              <a:rPr lang="nl-NL" sz="2000" dirty="0" err="1">
+                <a:latin typeface="Courier New" panose="02070309020205020404" pitchFamily="49" charset="0"/>
+                <a:cs typeface="Courier New" panose="02070309020205020404" pitchFamily="49" charset="0"/>
+              </a:rPr>
+              <a:t>variable</a:t>
+            </a:r>
+            <a:r>
+              <a:rPr lang="nl-NL" sz="2000" dirty="0">
+                <a:latin typeface="Courier New" panose="02070309020205020404" pitchFamily="49" charset="0"/>
+                <a:cs typeface="Courier New" panose="02070309020205020404" pitchFamily="49" charset="0"/>
+              </a:rPr>
+              <a:t>"</a:t>
             </a:r>
           </a:p>
           <a:p>
@@ -19146,7 +19174,35 @@
                 <a:latin typeface="Courier New" panose="02070309020205020404" pitchFamily="49" charset="0"/>
                 <a:cs typeface="Courier New" panose="02070309020205020404" pitchFamily="49" charset="0"/>
               </a:rPr>
-              <a:t>    l = "lokale variabele"</a:t>
+              <a:t>    l = "</a:t>
+            </a:r>
+            <a:r>
+              <a:rPr lang="nl-NL" sz="2000" dirty="0" err="1">
+                <a:latin typeface="Courier New" panose="02070309020205020404" pitchFamily="49" charset="0"/>
+                <a:cs typeface="Courier New" panose="02070309020205020404" pitchFamily="49" charset="0"/>
+              </a:rPr>
+              <a:t>lokal</a:t>
+            </a:r>
+            <a:r>
+              <a:rPr lang="nl-NL" sz="2000" dirty="0">
+                <a:latin typeface="Courier New" panose="02070309020205020404" pitchFamily="49" charset="0"/>
+                <a:cs typeface="Courier New" panose="02070309020205020404" pitchFamily="49" charset="0"/>
+              </a:rPr>
+              <a:t> </a:t>
+            </a:r>
+            <a:r>
+              <a:rPr lang="nl-NL" sz="2000" dirty="0" err="1">
+                <a:latin typeface="Courier New" panose="02070309020205020404" pitchFamily="49" charset="0"/>
+                <a:cs typeface="Courier New" panose="02070309020205020404" pitchFamily="49" charset="0"/>
+              </a:rPr>
+              <a:t>variable</a:t>
+            </a:r>
+            <a:r>
+              <a:rPr lang="nl-NL" sz="2000" dirty="0">
+                <a:latin typeface="Courier New" panose="02070309020205020404" pitchFamily="49" charset="0"/>
+                <a:cs typeface="Courier New" panose="02070309020205020404" pitchFamily="49" charset="0"/>
+              </a:rPr>
+              <a:t>"</a:t>
             </a:r>
           </a:p>
         </p:txBody>
@@ -19558,7 +19614,21 @@
                 <a:latin typeface="Courier New" panose="02070309020205020404" pitchFamily="49" charset="0"/>
                 <a:cs typeface="Courier New" panose="02070309020205020404" pitchFamily="49" charset="0"/>
               </a:rPr>
-              <a:t>x = "globale x"</a:t>
+              <a:t>x = "</a:t>
+            </a:r>
+            <a:r>
+              <a:rPr lang="nl-NL" sz="1600" dirty="0" err="1">
+                <a:latin typeface="Courier New" panose="02070309020205020404" pitchFamily="49" charset="0"/>
+                <a:cs typeface="Courier New" panose="02070309020205020404" pitchFamily="49" charset="0"/>
+              </a:rPr>
+              <a:t>global</a:t>
+            </a:r>
+            <a:r>
+              <a:rPr lang="nl-NL" sz="1600" dirty="0">
+                <a:latin typeface="Courier New" panose="02070309020205020404" pitchFamily="49" charset="0"/>
+                <a:cs typeface="Courier New" panose="02070309020205020404" pitchFamily="49" charset="0"/>
+              </a:rPr>
+              <a:t> x"</a:t>
             </a:r>
           </a:p>
           <a:p>
@@ -19588,7 +19658,21 @@
                 <a:latin typeface="Courier New" panose="02070309020205020404" pitchFamily="49" charset="0"/>
                 <a:cs typeface="Courier New" panose="02070309020205020404" pitchFamily="49" charset="0"/>
               </a:rPr>
-              <a:t> buitenste():</a:t>
+              <a:t> </a:t>
+            </a:r>
+            <a:r>
+              <a:rPr lang="nl-NL" sz="1600" b="1" dirty="0" err="1">
+                <a:latin typeface="Courier New" panose="02070309020205020404" pitchFamily="49" charset="0"/>
+                <a:cs typeface="Courier New" panose="02070309020205020404" pitchFamily="49" charset="0"/>
+              </a:rPr>
+              <a:t>outer</a:t>
+            </a:r>
+            <a:r>
+              <a:rPr lang="nl-NL" sz="1600" b="1" dirty="0">
+                <a:latin typeface="Courier New" panose="02070309020205020404" pitchFamily="49" charset="0"/>
+                <a:cs typeface="Courier New" panose="02070309020205020404" pitchFamily="49" charset="0"/>
+              </a:rPr>
+              <a:t>():</a:t>
             </a:r>
           </a:p>
           <a:p>
@@ -19601,7 +19685,21 @@
                 <a:latin typeface="Courier New" panose="02070309020205020404" pitchFamily="49" charset="0"/>
                 <a:cs typeface="Courier New" panose="02070309020205020404" pitchFamily="49" charset="0"/>
               </a:rPr>
-              <a:t>    x = "buitenste x"</a:t>
+              <a:t>    x = "</a:t>
+            </a:r>
+            <a:r>
+              <a:rPr lang="nl-NL" sz="1600" dirty="0" err="1">
+                <a:latin typeface="Courier New" panose="02070309020205020404" pitchFamily="49" charset="0"/>
+                <a:cs typeface="Courier New" panose="02070309020205020404" pitchFamily="49" charset="0"/>
+              </a:rPr>
+              <a:t>outer</a:t>
+            </a:r>
+            <a:r>
+              <a:rPr lang="nl-NL" sz="1600" dirty="0">
+                <a:latin typeface="Courier New" panose="02070309020205020404" pitchFamily="49" charset="0"/>
+                <a:cs typeface="Courier New" panose="02070309020205020404" pitchFamily="49" charset="0"/>
+              </a:rPr>
+              <a:t> x"</a:t>
             </a:r>
           </a:p>
           <a:p>
@@ -19638,7 +19736,21 @@
                 <a:latin typeface="Courier New" panose="02070309020205020404" pitchFamily="49" charset="0"/>
                 <a:cs typeface="Courier New" panose="02070309020205020404" pitchFamily="49" charset="0"/>
               </a:rPr>
-              <a:t> binnenste()</a:t>
+              <a:t> </a:t>
+            </a:r>
+            <a:r>
+              <a:rPr lang="nl-NL" sz="1600" b="1" dirty="0" err="1">
+                <a:latin typeface="Courier New" panose="02070309020205020404" pitchFamily="49" charset="0"/>
+                <a:cs typeface="Courier New" panose="02070309020205020404" pitchFamily="49" charset="0"/>
+              </a:rPr>
+              <a:t>inner</a:t>
+            </a:r>
+            <a:r>
+              <a:rPr lang="nl-NL" sz="1600" b="1" dirty="0">
+                <a:latin typeface="Courier New" panose="02070309020205020404" pitchFamily="49" charset="0"/>
+                <a:cs typeface="Courier New" panose="02070309020205020404" pitchFamily="49" charset="0"/>
+              </a:rPr>
+              <a:t>()</a:t>
             </a:r>
           </a:p>
           <a:p>
@@ -20321,7 +20433,7 @@
                 <a:latin typeface="Courier New" panose="02070309020205020404" pitchFamily="49" charset="0"/>
                 <a:cs typeface="Courier New" panose="02070309020205020404" pitchFamily="49" charset="0"/>
               </a:rPr>
-              <a:t>functie_a</a:t>
+              <a:t>function_a</a:t>
             </a:r>
             <a:r>
               <a:rPr lang="en-US" sz="1600" b="1" dirty="0">
@@ -20381,7 +20493,7 @@
                 <a:latin typeface="Courier New" panose="02070309020205020404" pitchFamily="49" charset="0"/>
                 <a:cs typeface="Courier New" panose="02070309020205020404" pitchFamily="49" charset="0"/>
               </a:rPr>
-              <a:t>functie_b</a:t>
+              <a:t>function_b</a:t>
             </a:r>
             <a:r>
               <a:rPr lang="en-US" sz="1600" b="1" dirty="0">
@@ -20459,7 +20571,7 @@
                 <a:latin typeface="Courier New" panose="02070309020205020404" pitchFamily="49" charset="0"/>
                 <a:cs typeface="Courier New" panose="02070309020205020404" pitchFamily="49" charset="0"/>
               </a:rPr>
-              <a:t>functie_a</a:t>
+              <a:t>function_a</a:t>
             </a:r>
             <a:r>
               <a:rPr lang="en-US" sz="1600" dirty="0">
@@ -20492,7 +20604,7 @@
                 <a:latin typeface="Courier New" panose="02070309020205020404" pitchFamily="49" charset="0"/>
                 <a:cs typeface="Courier New" panose="02070309020205020404" pitchFamily="49" charset="0"/>
               </a:rPr>
-              <a:t>functie_b</a:t>
+              <a:t>function_b</a:t>
             </a:r>
             <a:r>
               <a:rPr lang="en-US" sz="1600" dirty="0">
@@ -31854,48 +31966,6 @@
       </p:sp>
       <p:cxnSp>
         <p:nvCxnSpPr>
-          <p:cNvPr id="22" name="Straight Arrow Connector 21">
-            <a:extLst>
-              <a:ext uri="{FF2B5EF4-FFF2-40B4-BE49-F238E27FC236}">
-                <a16:creationId xmlns:a16="http://schemas.microsoft.com/office/drawing/2014/main" id="{10BD495C-FAD0-8929-5171-4AA6C25602D0}"/>
-              </a:ext>
-            </a:extLst>
-          </p:cNvPr>
-          <p:cNvCxnSpPr>
-            <a:stCxn id="19" idx="1"/>
-            <a:endCxn id="8" idx="2"/>
-          </p:cNvCxnSpPr>
-          <p:nvPr/>
-        </p:nvCxnSpPr>
-        <p:spPr>
-          <a:xfrm flipH="1" flipV="1">
-            <a:off x="1672167" y="2650068"/>
-            <a:ext cx="5064476" cy="1236133"/>
-          </a:xfrm>
-          <a:prstGeom prst="straightConnector1">
-            <a:avLst/>
-          </a:prstGeom>
-          <a:ln>
-            <a:tailEnd type="triangle"/>
-          </a:ln>
-        </p:spPr>
-        <p:style>
-          <a:lnRef idx="2">
-            <a:schemeClr val="dk1"/>
-          </a:lnRef>
-          <a:fillRef idx="0">
-            <a:schemeClr val="dk1"/>
-          </a:fillRef>
-          <a:effectRef idx="1">
-            <a:schemeClr val="dk1"/>
-          </a:effectRef>
-          <a:fontRef idx="minor">
-            <a:schemeClr val="tx1"/>
-          </a:fontRef>
-        </p:style>
-      </p:cxnSp>
-      <p:cxnSp>
-        <p:nvCxnSpPr>
           <p:cNvPr id="24" name="Straight Arrow Connector 23">
             <a:extLst>
               <a:ext uri="{FF2B5EF4-FFF2-40B4-BE49-F238E27FC236}">
@@ -31918,6 +31988,49 @@
             <a:avLst/>
           </a:prstGeom>
           <a:ln>
+            <a:tailEnd type="triangle"/>
+          </a:ln>
+        </p:spPr>
+        <p:style>
+          <a:lnRef idx="3">
+            <a:schemeClr val="dk1"/>
+          </a:lnRef>
+          <a:fillRef idx="0">
+            <a:schemeClr val="dk1"/>
+          </a:fillRef>
+          <a:effectRef idx="2">
+            <a:schemeClr val="dk1"/>
+          </a:effectRef>
+          <a:fontRef idx="minor">
+            <a:schemeClr val="tx1"/>
+          </a:fontRef>
+        </p:style>
+      </p:cxnSp>
+      <p:cxnSp>
+        <p:nvCxnSpPr>
+          <p:cNvPr id="5" name="Straight Arrow Connector 4">
+            <a:extLst>
+              <a:ext uri="{FF2B5EF4-FFF2-40B4-BE49-F238E27FC236}">
+                <a16:creationId xmlns:a16="http://schemas.microsoft.com/office/drawing/2014/main" id="{F5F6AC21-2E86-1126-DD5E-0604773AC96E}"/>
+              </a:ext>
+            </a:extLst>
+          </p:cNvPr>
+          <p:cNvCxnSpPr>
+            <a:stCxn id="19" idx="1"/>
+            <a:endCxn id="3" idx="3"/>
+          </p:cNvCxnSpPr>
+          <p:nvPr/>
+        </p:nvCxnSpPr>
+        <p:spPr>
+          <a:xfrm flipH="1">
+            <a:off x="2506132" y="3886201"/>
+            <a:ext cx="4230511" cy="0"/>
+          </a:xfrm>
+          <a:prstGeom prst="straightConnector1">
+            <a:avLst/>
+          </a:prstGeom>
+          <a:ln>
+            <a:headEnd type="triangle"/>
             <a:tailEnd type="triangle"/>
           </a:ln>
         </p:spPr>

</xml_diff>

<commit_message>
Finalize Python trainees part 1
</commit_message>
<xml_diff>
--- a/python_trainees/1_basics_classes/python_traineeship_1.pptx
+++ b/python_trainees/1_basics_classes/python_traineeship_1.pptx
@@ -315,7 +315,7 @@
           <a:p>
             <a:fld id="{0EBB069A-003F-4FC0-8534-236B0C5C7B5F}" type="datetimeFigureOut">
               <a:rPr lang="en-NL" smtClean="0"/>
-              <a:t>04/03/2023</a:t>
+              <a:t>07/03/2023</a:t>
             </a:fld>
             <a:endParaRPr lang="en-NL"/>
           </a:p>
@@ -515,7 +515,7 @@
           <a:p>
             <a:fld id="{0EBB069A-003F-4FC0-8534-236B0C5C7B5F}" type="datetimeFigureOut">
               <a:rPr lang="en-NL" smtClean="0"/>
-              <a:t>04/03/2023</a:t>
+              <a:t>07/03/2023</a:t>
             </a:fld>
             <a:endParaRPr lang="en-NL"/>
           </a:p>
@@ -725,7 +725,7 @@
           <a:p>
             <a:fld id="{0EBB069A-003F-4FC0-8534-236B0C5C7B5F}" type="datetimeFigureOut">
               <a:rPr lang="en-NL" smtClean="0"/>
-              <a:t>04/03/2023</a:t>
+              <a:t>07/03/2023</a:t>
             </a:fld>
             <a:endParaRPr lang="en-NL"/>
           </a:p>
@@ -925,7 +925,7 @@
           <a:p>
             <a:fld id="{0EBB069A-003F-4FC0-8534-236B0C5C7B5F}" type="datetimeFigureOut">
               <a:rPr lang="en-NL" smtClean="0"/>
-              <a:t>04/03/2023</a:t>
+              <a:t>07/03/2023</a:t>
             </a:fld>
             <a:endParaRPr lang="en-NL"/>
           </a:p>
@@ -1201,7 +1201,7 @@
           <a:p>
             <a:fld id="{0EBB069A-003F-4FC0-8534-236B0C5C7B5F}" type="datetimeFigureOut">
               <a:rPr lang="en-NL" smtClean="0"/>
-              <a:t>04/03/2023</a:t>
+              <a:t>07/03/2023</a:t>
             </a:fld>
             <a:endParaRPr lang="en-NL"/>
           </a:p>
@@ -1469,7 +1469,7 @@
           <a:p>
             <a:fld id="{0EBB069A-003F-4FC0-8534-236B0C5C7B5F}" type="datetimeFigureOut">
               <a:rPr lang="en-NL" smtClean="0"/>
-              <a:t>04/03/2023</a:t>
+              <a:t>07/03/2023</a:t>
             </a:fld>
             <a:endParaRPr lang="en-NL"/>
           </a:p>
@@ -1884,7 +1884,7 @@
           <a:p>
             <a:fld id="{0EBB069A-003F-4FC0-8534-236B0C5C7B5F}" type="datetimeFigureOut">
               <a:rPr lang="en-NL" smtClean="0"/>
-              <a:t>04/03/2023</a:t>
+              <a:t>07/03/2023</a:t>
             </a:fld>
             <a:endParaRPr lang="en-NL"/>
           </a:p>
@@ -2026,7 +2026,7 @@
           <a:p>
             <a:fld id="{0EBB069A-003F-4FC0-8534-236B0C5C7B5F}" type="datetimeFigureOut">
               <a:rPr lang="en-NL" smtClean="0"/>
-              <a:t>04/03/2023</a:t>
+              <a:t>07/03/2023</a:t>
             </a:fld>
             <a:endParaRPr lang="en-NL"/>
           </a:p>
@@ -2139,7 +2139,7 @@
           <a:p>
             <a:fld id="{0EBB069A-003F-4FC0-8534-236B0C5C7B5F}" type="datetimeFigureOut">
               <a:rPr lang="en-NL" smtClean="0"/>
-              <a:t>04/03/2023</a:t>
+              <a:t>07/03/2023</a:t>
             </a:fld>
             <a:endParaRPr lang="en-NL"/>
           </a:p>
@@ -2452,7 +2452,7 @@
           <a:p>
             <a:fld id="{0EBB069A-003F-4FC0-8534-236B0C5C7B5F}" type="datetimeFigureOut">
               <a:rPr lang="en-NL" smtClean="0"/>
-              <a:t>04/03/2023</a:t>
+              <a:t>07/03/2023</a:t>
             </a:fld>
             <a:endParaRPr lang="en-NL"/>
           </a:p>
@@ -2741,7 +2741,7 @@
           <a:p>
             <a:fld id="{0EBB069A-003F-4FC0-8534-236B0C5C7B5F}" type="datetimeFigureOut">
               <a:rPr lang="en-NL" smtClean="0"/>
-              <a:t>04/03/2023</a:t>
+              <a:t>07/03/2023</a:t>
             </a:fld>
             <a:endParaRPr lang="en-NL"/>
           </a:p>
@@ -2984,7 +2984,7 @@
           <a:p>
             <a:fld id="{0EBB069A-003F-4FC0-8534-236B0C5C7B5F}" type="datetimeFigureOut">
               <a:rPr lang="en-NL" smtClean="0"/>
-              <a:t>04/03/2023</a:t>
+              <a:t>07/03/2023</a:t>
             </a:fld>
             <a:endParaRPr lang="en-NL"/>
           </a:p>
@@ -11370,7 +11370,7 @@
                 <a:latin typeface="Courier New" panose="02070309020205020404" pitchFamily="49" charset="0"/>
                 <a:cs typeface="Courier New" panose="02070309020205020404" pitchFamily="49" charset="0"/>
               </a:rPr>
-              <a:t>John,Jane".split</a:t>
+              <a:t>Doe,John".split</a:t>
             </a:r>
             <a:r>
               <a:rPr lang="nl-NL" sz="2000" noProof="0" dirty="0">
@@ -11418,7 +11418,7 @@
                 <a:latin typeface="Courier New" panose="02070309020205020404" pitchFamily="49" charset="0"/>
                 <a:cs typeface="Courier New" panose="02070309020205020404" pitchFamily="49" charset="0"/>
               </a:rPr>
-              <a:t>(["John", "Jane"])</a:t>
+              <a:t>(["Doe", "John"])</a:t>
             </a:r>
           </a:p>
           <a:p>

</xml_diff>

<commit_message>
Typo Python trainees part 1
</commit_message>
<xml_diff>
--- a/python_trainees/1_basics_classes/python_traineeship_1.pptx
+++ b/python_trainees/1_basics_classes/python_traineeship_1.pptx
@@ -315,7 +315,7 @@
           <a:p>
             <a:fld id="{0EBB069A-003F-4FC0-8534-236B0C5C7B5F}" type="datetimeFigureOut">
               <a:rPr lang="en-NL" smtClean="0"/>
-              <a:t>07/03/2023</a:t>
+              <a:t>08/03/2023</a:t>
             </a:fld>
             <a:endParaRPr lang="en-NL"/>
           </a:p>
@@ -515,7 +515,7 @@
           <a:p>
             <a:fld id="{0EBB069A-003F-4FC0-8534-236B0C5C7B5F}" type="datetimeFigureOut">
               <a:rPr lang="en-NL" smtClean="0"/>
-              <a:t>07/03/2023</a:t>
+              <a:t>08/03/2023</a:t>
             </a:fld>
             <a:endParaRPr lang="en-NL"/>
           </a:p>
@@ -725,7 +725,7 @@
           <a:p>
             <a:fld id="{0EBB069A-003F-4FC0-8534-236B0C5C7B5F}" type="datetimeFigureOut">
               <a:rPr lang="en-NL" smtClean="0"/>
-              <a:t>07/03/2023</a:t>
+              <a:t>08/03/2023</a:t>
             </a:fld>
             <a:endParaRPr lang="en-NL"/>
           </a:p>
@@ -925,7 +925,7 @@
           <a:p>
             <a:fld id="{0EBB069A-003F-4FC0-8534-236B0C5C7B5F}" type="datetimeFigureOut">
               <a:rPr lang="en-NL" smtClean="0"/>
-              <a:t>07/03/2023</a:t>
+              <a:t>08/03/2023</a:t>
             </a:fld>
             <a:endParaRPr lang="en-NL"/>
           </a:p>
@@ -1201,7 +1201,7 @@
           <a:p>
             <a:fld id="{0EBB069A-003F-4FC0-8534-236B0C5C7B5F}" type="datetimeFigureOut">
               <a:rPr lang="en-NL" smtClean="0"/>
-              <a:t>07/03/2023</a:t>
+              <a:t>08/03/2023</a:t>
             </a:fld>
             <a:endParaRPr lang="en-NL"/>
           </a:p>
@@ -1469,7 +1469,7 @@
           <a:p>
             <a:fld id="{0EBB069A-003F-4FC0-8534-236B0C5C7B5F}" type="datetimeFigureOut">
               <a:rPr lang="en-NL" smtClean="0"/>
-              <a:t>07/03/2023</a:t>
+              <a:t>08/03/2023</a:t>
             </a:fld>
             <a:endParaRPr lang="en-NL"/>
           </a:p>
@@ -1884,7 +1884,7 @@
           <a:p>
             <a:fld id="{0EBB069A-003F-4FC0-8534-236B0C5C7B5F}" type="datetimeFigureOut">
               <a:rPr lang="en-NL" smtClean="0"/>
-              <a:t>07/03/2023</a:t>
+              <a:t>08/03/2023</a:t>
             </a:fld>
             <a:endParaRPr lang="en-NL"/>
           </a:p>
@@ -2026,7 +2026,7 @@
           <a:p>
             <a:fld id="{0EBB069A-003F-4FC0-8534-236B0C5C7B5F}" type="datetimeFigureOut">
               <a:rPr lang="en-NL" smtClean="0"/>
-              <a:t>07/03/2023</a:t>
+              <a:t>08/03/2023</a:t>
             </a:fld>
             <a:endParaRPr lang="en-NL"/>
           </a:p>
@@ -2139,7 +2139,7 @@
           <a:p>
             <a:fld id="{0EBB069A-003F-4FC0-8534-236B0C5C7B5F}" type="datetimeFigureOut">
               <a:rPr lang="en-NL" smtClean="0"/>
-              <a:t>07/03/2023</a:t>
+              <a:t>08/03/2023</a:t>
             </a:fld>
             <a:endParaRPr lang="en-NL"/>
           </a:p>
@@ -2452,7 +2452,7 @@
           <a:p>
             <a:fld id="{0EBB069A-003F-4FC0-8534-236B0C5C7B5F}" type="datetimeFigureOut">
               <a:rPr lang="en-NL" smtClean="0"/>
-              <a:t>07/03/2023</a:t>
+              <a:t>08/03/2023</a:t>
             </a:fld>
             <a:endParaRPr lang="en-NL"/>
           </a:p>
@@ -2741,7 +2741,7 @@
           <a:p>
             <a:fld id="{0EBB069A-003F-4FC0-8534-236B0C5C7B5F}" type="datetimeFigureOut">
               <a:rPr lang="en-NL" smtClean="0"/>
-              <a:t>07/03/2023</a:t>
+              <a:t>08/03/2023</a:t>
             </a:fld>
             <a:endParaRPr lang="en-NL"/>
           </a:p>
@@ -2984,7 +2984,7 @@
           <a:p>
             <a:fld id="{0EBB069A-003F-4FC0-8534-236B0C5C7B5F}" type="datetimeFigureOut">
               <a:rPr lang="en-NL" smtClean="0"/>
-              <a:t>07/03/2023</a:t>
+              <a:t>08/03/2023</a:t>
             </a:fld>
             <a:endParaRPr lang="en-NL"/>
           </a:p>
@@ -19750,7 +19750,7 @@
                 <a:latin typeface="Courier New" panose="02070309020205020404" pitchFamily="49" charset="0"/>
                 <a:cs typeface="Courier New" panose="02070309020205020404" pitchFamily="49" charset="0"/>
               </a:rPr>
-              <a:t>()</a:t>
+              <a:t>():</a:t>
             </a:r>
           </a:p>
           <a:p>
@@ -31974,15 +31974,16 @@
             </a:extLst>
           </p:cNvPr>
           <p:cNvCxnSpPr>
+            <a:cxnSpLocks/>
             <a:stCxn id="19" idx="0"/>
-            <a:endCxn id="10" idx="2"/>
+            <a:endCxn id="11" idx="1"/>
           </p:cNvCxnSpPr>
           <p:nvPr/>
         </p:nvCxnSpPr>
         <p:spPr>
           <a:xfrm flipV="1">
-            <a:off x="7570610" y="2650068"/>
-            <a:ext cx="1" cy="745066"/>
+            <a:off x="7570610" y="2159001"/>
+            <a:ext cx="2115257" cy="1236133"/>
           </a:xfrm>
           <a:prstGeom prst="straightConnector1">
             <a:avLst/>

</xml_diff>

<commit_message>
Finalize Python trainees part 2
</commit_message>
<xml_diff>
--- a/python_trainees/1_basics_classes/python_traineeship_1.pptx
+++ b/python_trainees/1_basics_classes/python_traineeship_1.pptx
@@ -257,7 +257,7 @@
           <a:p>
             <a:fld id="{3BADDCAA-88FC-44D4-A91A-DD0530AB88E0}" type="datetimeFigureOut">
               <a:rPr lang="en-NL" smtClean="0"/>
-              <a:t>20/09/2023</a:t>
+              <a:t>25/09/2023</a:t>
             </a:fld>
             <a:endParaRPr lang="en-NL"/>
           </a:p>
@@ -758,7 +758,7 @@
           <a:p>
             <a:fld id="{0EBB069A-003F-4FC0-8534-236B0C5C7B5F}" type="datetimeFigureOut">
               <a:rPr lang="en-NL" smtClean="0"/>
-              <a:t>20/09/2023</a:t>
+              <a:t>25/09/2023</a:t>
             </a:fld>
             <a:endParaRPr lang="en-NL"/>
           </a:p>
@@ -958,7 +958,7 @@
           <a:p>
             <a:fld id="{0EBB069A-003F-4FC0-8534-236B0C5C7B5F}" type="datetimeFigureOut">
               <a:rPr lang="en-NL" smtClean="0"/>
-              <a:t>20/09/2023</a:t>
+              <a:t>25/09/2023</a:t>
             </a:fld>
             <a:endParaRPr lang="en-NL"/>
           </a:p>
@@ -1168,7 +1168,7 @@
           <a:p>
             <a:fld id="{0EBB069A-003F-4FC0-8534-236B0C5C7B5F}" type="datetimeFigureOut">
               <a:rPr lang="en-NL" smtClean="0"/>
-              <a:t>20/09/2023</a:t>
+              <a:t>25/09/2023</a:t>
             </a:fld>
             <a:endParaRPr lang="en-NL"/>
           </a:p>
@@ -1368,7 +1368,7 @@
           <a:p>
             <a:fld id="{0EBB069A-003F-4FC0-8534-236B0C5C7B5F}" type="datetimeFigureOut">
               <a:rPr lang="en-NL" smtClean="0"/>
-              <a:t>20/09/2023</a:t>
+              <a:t>25/09/2023</a:t>
             </a:fld>
             <a:endParaRPr lang="en-NL"/>
           </a:p>
@@ -1644,7 +1644,7 @@
           <a:p>
             <a:fld id="{0EBB069A-003F-4FC0-8534-236B0C5C7B5F}" type="datetimeFigureOut">
               <a:rPr lang="en-NL" smtClean="0"/>
-              <a:t>20/09/2023</a:t>
+              <a:t>25/09/2023</a:t>
             </a:fld>
             <a:endParaRPr lang="en-NL"/>
           </a:p>
@@ -1912,7 +1912,7 @@
           <a:p>
             <a:fld id="{0EBB069A-003F-4FC0-8534-236B0C5C7B5F}" type="datetimeFigureOut">
               <a:rPr lang="en-NL" smtClean="0"/>
-              <a:t>20/09/2023</a:t>
+              <a:t>25/09/2023</a:t>
             </a:fld>
             <a:endParaRPr lang="en-NL"/>
           </a:p>
@@ -2327,7 +2327,7 @@
           <a:p>
             <a:fld id="{0EBB069A-003F-4FC0-8534-236B0C5C7B5F}" type="datetimeFigureOut">
               <a:rPr lang="en-NL" smtClean="0"/>
-              <a:t>20/09/2023</a:t>
+              <a:t>25/09/2023</a:t>
             </a:fld>
             <a:endParaRPr lang="en-NL"/>
           </a:p>
@@ -2469,7 +2469,7 @@
           <a:p>
             <a:fld id="{0EBB069A-003F-4FC0-8534-236B0C5C7B5F}" type="datetimeFigureOut">
               <a:rPr lang="en-NL" smtClean="0"/>
-              <a:t>20/09/2023</a:t>
+              <a:t>25/09/2023</a:t>
             </a:fld>
             <a:endParaRPr lang="en-NL"/>
           </a:p>
@@ -2582,7 +2582,7 @@
           <a:p>
             <a:fld id="{0EBB069A-003F-4FC0-8534-236B0C5C7B5F}" type="datetimeFigureOut">
               <a:rPr lang="en-NL" smtClean="0"/>
-              <a:t>20/09/2023</a:t>
+              <a:t>25/09/2023</a:t>
             </a:fld>
             <a:endParaRPr lang="en-NL"/>
           </a:p>
@@ -2895,7 +2895,7 @@
           <a:p>
             <a:fld id="{0EBB069A-003F-4FC0-8534-236B0C5C7B5F}" type="datetimeFigureOut">
               <a:rPr lang="en-NL" smtClean="0"/>
-              <a:t>20/09/2023</a:t>
+              <a:t>25/09/2023</a:t>
             </a:fld>
             <a:endParaRPr lang="en-NL"/>
           </a:p>
@@ -3184,7 +3184,7 @@
           <a:p>
             <a:fld id="{0EBB069A-003F-4FC0-8534-236B0C5C7B5F}" type="datetimeFigureOut">
               <a:rPr lang="en-NL" smtClean="0"/>
-              <a:t>20/09/2023</a:t>
+              <a:t>25/09/2023</a:t>
             </a:fld>
             <a:endParaRPr lang="en-NL"/>
           </a:p>
@@ -3427,7 +3427,7 @@
           <a:p>
             <a:fld id="{0EBB069A-003F-4FC0-8534-236B0C5C7B5F}" type="datetimeFigureOut">
               <a:rPr lang="en-NL" smtClean="0"/>
-              <a:t>20/09/2023</a:t>
+              <a:t>25/09/2023</a:t>
             </a:fld>
             <a:endParaRPr lang="en-NL"/>
           </a:p>
@@ -18973,7 +18973,7 @@
                 <a:latin typeface="Courier New" panose="02070309020205020404" pitchFamily="49" charset="0"/>
                 <a:cs typeface="Courier New" panose="02070309020205020404" pitchFamily="49" charset="0"/>
               </a:rPr>
-              <a:t> n % 2 </a:t>
+              <a:t> n % 2 == 0 </a:t>
             </a:r>
             <a:r>
               <a:rPr lang="en-US" sz="1600" b="1" noProof="0" dirty="0">
@@ -19163,7 +19163,14 @@
                 <a:latin typeface="Courier New" panose="02070309020205020404" pitchFamily="49" charset="0"/>
                 <a:cs typeface="Courier New" panose="02070309020205020404" pitchFamily="49" charset="0"/>
               </a:rPr>
-              <a:t> n % 2 </a:t>
+              <a:t> n </a:t>
+            </a:r>
+            <a:r>
+              <a:rPr lang="en-US" sz="1600">
+                <a:latin typeface="Courier New" panose="02070309020205020404" pitchFamily="49" charset="0"/>
+                <a:cs typeface="Courier New" panose="02070309020205020404" pitchFamily="49" charset="0"/>
+              </a:rPr>
+              <a:t>% 2 == 0 </a:t>
             </a:r>
             <a:r>
               <a:rPr lang="en-US" sz="1600" b="1" dirty="0">

</xml_diff>